<commit_message>
Continued Work on Presentation
</commit_message>
<xml_diff>
--- a/F-Seminar/Zwischenpräsentation.pptx
+++ b/F-Seminar/Zwischenpräsentation.pptx
@@ -5,10 +5,10 @@
     <p:sldMasterId id="2147483693" r:id="rId1"/>
   </p:sldMasterIdLst>
   <p:notesMasterIdLst>
-    <p:notesMasterId r:id="rId10"/>
+    <p:notesMasterId r:id="rId12"/>
   </p:notesMasterIdLst>
   <p:handoutMasterIdLst>
-    <p:handoutMasterId r:id="rId11"/>
+    <p:handoutMasterId r:id="rId13"/>
   </p:handoutMasterIdLst>
   <p:sldIdLst>
     <p:sldId id="430" r:id="rId2"/>
@@ -18,12 +18,14 @@
     <p:sldId id="433" r:id="rId6"/>
     <p:sldId id="434" r:id="rId7"/>
     <p:sldId id="435" r:id="rId8"/>
-    <p:sldId id="429" r:id="rId9"/>
+    <p:sldId id="436" r:id="rId9"/>
+    <p:sldId id="437" r:id="rId10"/>
+    <p:sldId id="429" r:id="rId11"/>
   </p:sldIdLst>
   <p:sldSz cx="12192000" cy="6858000"/>
   <p:notesSz cx="6858000" cy="9144000"/>
   <p:custDataLst>
-    <p:tags r:id="rId12"/>
+    <p:tags r:id="rId14"/>
   </p:custDataLst>
   <p:defaultTextStyle>
     <a:defPPr>
@@ -26878,6 +26880,177 @@
 </p:sld>
 </file>
 
+<file path=ppt/slides/slide10.xml><?xml version="1.0" encoding="utf-8"?>
+<p:sld xmlns:a="http://schemas.openxmlformats.org/drawingml/2006/main" xmlns:r="http://schemas.openxmlformats.org/officeDocument/2006/relationships" xmlns:p="http://schemas.openxmlformats.org/presentationml/2006/main">
+  <p:cSld>
+    <p:spTree>
+      <p:nvGrpSpPr>
+        <p:cNvPr id="1" name=""/>
+        <p:cNvGrpSpPr/>
+        <p:nvPr/>
+      </p:nvGrpSpPr>
+      <p:grpSpPr>
+        <a:xfrm>
+          <a:off x="0" y="0"/>
+          <a:ext cx="0" cy="0"/>
+          <a:chOff x="0" y="0"/>
+          <a:chExt cx="0" cy="0"/>
+        </a:xfrm>
+      </p:grpSpPr>
+      <p:sp>
+        <p:nvSpPr>
+          <p:cNvPr id="32" name="Textplatzhalter 31">
+            <a:extLst>
+              <a:ext uri="{FF2B5EF4-FFF2-40B4-BE49-F238E27FC236}">
+                <a16:creationId xmlns:a16="http://schemas.microsoft.com/office/drawing/2014/main" id="{822F10C4-5C7B-EB1B-6862-AE72076F0EAE}"/>
+              </a:ext>
+            </a:extLst>
+          </p:cNvPr>
+          <p:cNvSpPr>
+            <a:spLocks noGrp="1"/>
+          </p:cNvSpPr>
+          <p:nvPr>
+            <p:ph type="body" sz="quarter" idx="13"/>
+          </p:nvPr>
+        </p:nvSpPr>
+        <p:spPr>
+          <a:xfrm>
+            <a:off x="518317" y="2647985"/>
+            <a:ext cx="11157745" cy="1562031"/>
+          </a:xfrm>
+        </p:spPr>
+        <p:txBody>
+          <a:bodyPr/>
+          <a:lstStyle/>
+          <a:p>
+            <a:r>
+              <a:rPr lang="de-DE" dirty="0"/>
+              <a:t>Vielen Dank für eure </a:t>
+            </a:r>
+          </a:p>
+          <a:p>
+            <a:r>
+              <a:rPr lang="de-DE" dirty="0"/>
+              <a:t>Aufmerksamkeit</a:t>
+            </a:r>
+          </a:p>
+        </p:txBody>
+      </p:sp>
+      <p:sp>
+        <p:nvSpPr>
+          <p:cNvPr id="2" name="Datumsplatzhalter 1">
+            <a:extLst>
+              <a:ext uri="{FF2B5EF4-FFF2-40B4-BE49-F238E27FC236}">
+                <a16:creationId xmlns:a16="http://schemas.microsoft.com/office/drawing/2014/main" id="{F982CCC3-22A8-43D8-9D7F-0A6E2AC8C337}"/>
+              </a:ext>
+            </a:extLst>
+          </p:cNvPr>
+          <p:cNvSpPr>
+            <a:spLocks noGrp="1"/>
+          </p:cNvSpPr>
+          <p:nvPr>
+            <p:ph type="dt" sz="half" idx="4294967295"/>
+          </p:nvPr>
+        </p:nvSpPr>
+        <p:spPr>
+          <a:xfrm>
+            <a:off x="11342688" y="6634163"/>
+            <a:ext cx="849312" cy="123825"/>
+          </a:xfrm>
+        </p:spPr>
+        <p:txBody>
+          <a:bodyPr/>
+          <a:lstStyle/>
+          <a:p>
+            <a:fld id="{974F31EF-6EA6-4A24-8992-69DC7A69151C}" type="datetime4">
+              <a:rPr lang="de-DE" smtClean="0"/>
+              <a:t>14. Dezember 2022</a:t>
+            </a:fld>
+            <a:endParaRPr lang="de-DE"/>
+          </a:p>
+        </p:txBody>
+      </p:sp>
+      <p:sp>
+        <p:nvSpPr>
+          <p:cNvPr id="3" name="Fußzeilenplatzhalter 2">
+            <a:extLst>
+              <a:ext uri="{FF2B5EF4-FFF2-40B4-BE49-F238E27FC236}">
+                <a16:creationId xmlns:a16="http://schemas.microsoft.com/office/drawing/2014/main" id="{2E068204-A6FE-F4ED-690E-22872D79D6E7}"/>
+              </a:ext>
+            </a:extLst>
+          </p:cNvPr>
+          <p:cNvSpPr>
+            <a:spLocks noGrp="1"/>
+          </p:cNvSpPr>
+          <p:nvPr>
+            <p:ph type="ftr" sz="quarter" idx="4294967295"/>
+          </p:nvPr>
+        </p:nvSpPr>
+        <p:spPr>
+          <a:xfrm>
+            <a:off x="0" y="6634163"/>
+            <a:ext cx="9574213" cy="123825"/>
+          </a:xfrm>
+        </p:spPr>
+        <p:txBody>
+          <a:bodyPr/>
+          <a:lstStyle/>
+          <a:p>
+            <a:r>
+              <a:rPr lang="de-DE"/>
+              <a:t>Wirtschafts- und Sozialwissenschaften | WiSo</a:t>
+            </a:r>
+          </a:p>
+        </p:txBody>
+      </p:sp>
+      <p:sp>
+        <p:nvSpPr>
+          <p:cNvPr id="4" name="Foliennummernplatzhalter 3">
+            <a:extLst>
+              <a:ext uri="{FF2B5EF4-FFF2-40B4-BE49-F238E27FC236}">
+                <a16:creationId xmlns:a16="http://schemas.microsoft.com/office/drawing/2014/main" id="{CB11C3A7-7FEE-011D-55D5-B3A80CEF0818}"/>
+              </a:ext>
+            </a:extLst>
+          </p:cNvPr>
+          <p:cNvSpPr>
+            <a:spLocks noGrp="1"/>
+          </p:cNvSpPr>
+          <p:nvPr>
+            <p:ph type="sldNum" sz="quarter" idx="4294967295"/>
+          </p:nvPr>
+        </p:nvSpPr>
+        <p:spPr>
+          <a:xfrm>
+            <a:off x="11998325" y="6634163"/>
+            <a:ext cx="193675" cy="123825"/>
+          </a:xfrm>
+        </p:spPr>
+        <p:txBody>
+          <a:bodyPr/>
+          <a:lstStyle/>
+          <a:p>
+            <a:fld id="{D949F9DF-37BD-4CD6-BF49-65BA579E1D7A}" type="slidenum">
+              <a:rPr lang="de-DE" smtClean="0"/>
+              <a:pPr/>
+              <a:t>10</a:t>
+            </a:fld>
+            <a:endParaRPr lang="de-DE"/>
+          </a:p>
+        </p:txBody>
+      </p:sp>
+    </p:spTree>
+    <p:extLst>
+      <p:ext uri="{BB962C8B-B14F-4D97-AF65-F5344CB8AC3E}">
+        <p14:creationId xmlns:p14="http://schemas.microsoft.com/office/powerpoint/2010/main" val="661126707"/>
+      </p:ext>
+    </p:extLst>
+  </p:cSld>
+  <p:clrMapOvr>
+    <a:masterClrMapping/>
+  </p:clrMapOvr>
+</p:sld>
+</file>
+
 <file path=ppt/slides/slide2.xml><?xml version="1.0" encoding="utf-8"?>
 <p:sld xmlns:a="http://schemas.openxmlformats.org/drawingml/2006/main" xmlns:r="http://schemas.openxmlformats.org/officeDocument/2006/relationships" xmlns:p="http://schemas.openxmlformats.org/presentationml/2006/main">
   <p:cSld>
@@ -30001,10 +30174,347 @@
       </p:grpSpPr>
       <p:sp>
         <p:nvSpPr>
-          <p:cNvPr id="32" name="Textplatzhalter 31">
-            <a:extLst>
-              <a:ext uri="{FF2B5EF4-FFF2-40B4-BE49-F238E27FC236}">
-                <a16:creationId xmlns:a16="http://schemas.microsoft.com/office/drawing/2014/main" id="{822F10C4-5C7B-EB1B-6862-AE72076F0EAE}"/>
+          <p:cNvPr id="21" name="Titel 20">
+            <a:extLst>
+              <a:ext uri="{FF2B5EF4-FFF2-40B4-BE49-F238E27FC236}">
+                <a16:creationId xmlns:a16="http://schemas.microsoft.com/office/drawing/2014/main" id="{3018BD05-96D8-43F2-A6AA-CC40E7C32CCE}"/>
+              </a:ext>
+            </a:extLst>
+          </p:cNvPr>
+          <p:cNvSpPr>
+            <a:spLocks noGrp="1"/>
+          </p:cNvSpPr>
+          <p:nvPr>
+            <p:ph type="title"/>
+          </p:nvPr>
+        </p:nvSpPr>
+        <p:spPr>
+          <a:xfrm>
+            <a:off x="518318" y="3152001"/>
+            <a:ext cx="11157743" cy="553998"/>
+          </a:xfrm>
+        </p:spPr>
+        <p:txBody>
+          <a:bodyPr/>
+          <a:lstStyle/>
+          <a:p>
+            <a:r>
+              <a:rPr lang="de-DE" dirty="0"/>
+              <a:t>Experimente</a:t>
+            </a:r>
+          </a:p>
+        </p:txBody>
+      </p:sp>
+      <p:sp>
+        <p:nvSpPr>
+          <p:cNvPr id="2" name="Datumsplatzhalter 1">
+            <a:extLst>
+              <a:ext uri="{FF2B5EF4-FFF2-40B4-BE49-F238E27FC236}">
+                <a16:creationId xmlns:a16="http://schemas.microsoft.com/office/drawing/2014/main" id="{FE7214E1-5D14-4D0B-BADD-2E239FECEC10}"/>
+              </a:ext>
+            </a:extLst>
+          </p:cNvPr>
+          <p:cNvSpPr>
+            <a:spLocks noGrp="1"/>
+          </p:cNvSpPr>
+          <p:nvPr>
+            <p:ph type="dt" sz="half" idx="10"/>
+          </p:nvPr>
+        </p:nvSpPr>
+        <p:spPr/>
+        <p:txBody>
+          <a:bodyPr/>
+          <a:lstStyle/>
+          <a:p>
+            <a:fld id="{D529D632-EE07-48FA-B475-B0D49CBC7F92}" type="datetime4">
+              <a:rPr lang="de-DE" smtClean="0"/>
+              <a:pPr/>
+              <a:t>14. Dezember 2022</a:t>
+            </a:fld>
+            <a:endParaRPr lang="de-DE" dirty="0"/>
+          </a:p>
+        </p:txBody>
+      </p:sp>
+      <p:sp>
+        <p:nvSpPr>
+          <p:cNvPr id="3" name="Fußzeilenplatzhalter 2">
+            <a:extLst>
+              <a:ext uri="{FF2B5EF4-FFF2-40B4-BE49-F238E27FC236}">
+                <a16:creationId xmlns:a16="http://schemas.microsoft.com/office/drawing/2014/main" id="{6A6AD034-0F65-47AF-9CAA-C4B0CEB30D4D}"/>
+              </a:ext>
+            </a:extLst>
+          </p:cNvPr>
+          <p:cNvSpPr>
+            <a:spLocks noGrp="1"/>
+          </p:cNvSpPr>
+          <p:nvPr>
+            <p:ph type="ftr" sz="quarter" idx="11"/>
+          </p:nvPr>
+        </p:nvSpPr>
+        <p:spPr/>
+        <p:txBody>
+          <a:bodyPr/>
+          <a:lstStyle/>
+          <a:p>
+            <a:r>
+              <a:rPr lang="de-DE"/>
+              <a:t>… | Lehrstuhl für Digital Industrial Service Systems | Prof. Dr. Martin Matzner </a:t>
+            </a:r>
+            <a:endParaRPr lang="de-DE" dirty="0"/>
+          </a:p>
+        </p:txBody>
+      </p:sp>
+      <p:sp>
+        <p:nvSpPr>
+          <p:cNvPr id="4" name="Foliennummernplatzhalter 3">
+            <a:extLst>
+              <a:ext uri="{FF2B5EF4-FFF2-40B4-BE49-F238E27FC236}">
+                <a16:creationId xmlns:a16="http://schemas.microsoft.com/office/drawing/2014/main" id="{00F7E098-F740-40F7-A085-7034627D9148}"/>
+              </a:ext>
+            </a:extLst>
+          </p:cNvPr>
+          <p:cNvSpPr>
+            <a:spLocks noGrp="1"/>
+          </p:cNvSpPr>
+          <p:nvPr>
+            <p:ph type="sldNum" sz="quarter" idx="12"/>
+          </p:nvPr>
+        </p:nvSpPr>
+        <p:spPr/>
+        <p:txBody>
+          <a:bodyPr/>
+          <a:lstStyle/>
+          <a:p>
+            <a:fld id="{D949F9DF-37BD-4CD6-BF49-65BA579E1D7A}" type="slidenum">
+              <a:rPr lang="de-DE" smtClean="0"/>
+              <a:pPr/>
+              <a:t>8</a:t>
+            </a:fld>
+            <a:endParaRPr lang="de-DE"/>
+          </a:p>
+        </p:txBody>
+      </p:sp>
+    </p:spTree>
+    <p:extLst>
+      <p:ext uri="{BB962C8B-B14F-4D97-AF65-F5344CB8AC3E}">
+        <p14:creationId xmlns:p14="http://schemas.microsoft.com/office/powerpoint/2010/main" val="2846759775"/>
+      </p:ext>
+    </p:extLst>
+  </p:cSld>
+  <p:clrMapOvr>
+    <a:masterClrMapping/>
+  </p:clrMapOvr>
+</p:sld>
+</file>
+
+<file path=ppt/slides/slide9.xml><?xml version="1.0" encoding="utf-8"?>
+<p:sld xmlns:a="http://schemas.openxmlformats.org/drawingml/2006/main" xmlns:r="http://schemas.openxmlformats.org/officeDocument/2006/relationships" xmlns:p="http://schemas.openxmlformats.org/presentationml/2006/main">
+  <p:cSld>
+    <p:spTree>
+      <p:nvGrpSpPr>
+        <p:cNvPr id="1" name=""/>
+        <p:cNvGrpSpPr/>
+        <p:nvPr/>
+      </p:nvGrpSpPr>
+      <p:grpSpPr>
+        <a:xfrm>
+          <a:off x="0" y="0"/>
+          <a:ext cx="0" cy="0"/>
+          <a:chOff x="0" y="0"/>
+          <a:chExt cx="0" cy="0"/>
+        </a:xfrm>
+      </p:grpSpPr>
+      <p:sp>
+        <p:nvSpPr>
+          <p:cNvPr id="3" name="Datumsplatzhalter 2">
+            <a:extLst>
+              <a:ext uri="{FF2B5EF4-FFF2-40B4-BE49-F238E27FC236}">
+                <a16:creationId xmlns:a16="http://schemas.microsoft.com/office/drawing/2014/main" id="{2A351964-2BB6-97F3-6B22-336C5567411D}"/>
+              </a:ext>
+            </a:extLst>
+          </p:cNvPr>
+          <p:cNvSpPr>
+            <a:spLocks noGrp="1"/>
+          </p:cNvSpPr>
+          <p:nvPr>
+            <p:ph type="dt" sz="half" idx="10"/>
+          </p:nvPr>
+        </p:nvSpPr>
+        <p:spPr/>
+        <p:txBody>
+          <a:bodyPr/>
+          <a:lstStyle/>
+          <a:p>
+            <a:fld id="{5C89B0C6-E378-43D9-87B6-F295F13B6DA2}" type="datetime4">
+              <a:rPr lang="de-DE" smtClean="0"/>
+              <a:t>14. Dezember 2022</a:t>
+            </a:fld>
+            <a:endParaRPr lang="de-DE" dirty="0"/>
+          </a:p>
+        </p:txBody>
+      </p:sp>
+      <p:sp>
+        <p:nvSpPr>
+          <p:cNvPr id="4" name="Fußzeilenplatzhalter 3">
+            <a:extLst>
+              <a:ext uri="{FF2B5EF4-FFF2-40B4-BE49-F238E27FC236}">
+                <a16:creationId xmlns:a16="http://schemas.microsoft.com/office/drawing/2014/main" id="{1408DCD8-0AA7-E516-1759-8D2382782060}"/>
+              </a:ext>
+            </a:extLst>
+          </p:cNvPr>
+          <p:cNvSpPr>
+            <a:spLocks noGrp="1"/>
+          </p:cNvSpPr>
+          <p:nvPr>
+            <p:ph type="ftr" sz="quarter" idx="11"/>
+          </p:nvPr>
+        </p:nvSpPr>
+        <p:spPr/>
+        <p:txBody>
+          <a:bodyPr/>
+          <a:lstStyle/>
+          <a:p>
+            <a:r>
+              <a:rPr lang="de-DE" dirty="0"/>
+              <a:t>Rene Jokiel</a:t>
+            </a:r>
+          </a:p>
+        </p:txBody>
+      </p:sp>
+      <p:sp>
+        <p:nvSpPr>
+          <p:cNvPr id="5" name="Foliennummernplatzhalter 4">
+            <a:extLst>
+              <a:ext uri="{FF2B5EF4-FFF2-40B4-BE49-F238E27FC236}">
+                <a16:creationId xmlns:a16="http://schemas.microsoft.com/office/drawing/2014/main" id="{7CC781B4-8E2A-7EAA-0553-BD86241E8C36}"/>
+              </a:ext>
+            </a:extLst>
+          </p:cNvPr>
+          <p:cNvSpPr>
+            <a:spLocks noGrp="1"/>
+          </p:cNvSpPr>
+          <p:nvPr>
+            <p:ph type="sldNum" sz="quarter" idx="12"/>
+          </p:nvPr>
+        </p:nvSpPr>
+        <p:spPr/>
+        <p:txBody>
+          <a:bodyPr/>
+          <a:lstStyle/>
+          <a:p>
+            <a:fld id="{D949F9DF-37BD-4CD6-BF49-65BA579E1D7A}" type="slidenum">
+              <a:rPr lang="de-DE" smtClean="0"/>
+              <a:pPr/>
+              <a:t>9</a:t>
+            </a:fld>
+            <a:endParaRPr lang="de-DE"/>
+          </a:p>
+        </p:txBody>
+      </p:sp>
+      <p:sp>
+        <p:nvSpPr>
+          <p:cNvPr id="2" name="Textplatzhalter 1">
+            <a:extLst>
+              <a:ext uri="{FF2B5EF4-FFF2-40B4-BE49-F238E27FC236}">
+                <a16:creationId xmlns:a16="http://schemas.microsoft.com/office/drawing/2014/main" id="{59DE7A27-14AD-4004-2A27-E615802DFDA4}"/>
+              </a:ext>
+            </a:extLst>
+          </p:cNvPr>
+          <p:cNvSpPr>
+            <a:spLocks noGrp="1"/>
+          </p:cNvSpPr>
+          <p:nvPr>
+            <p:ph type="body" sz="quarter" idx="37"/>
+          </p:nvPr>
+        </p:nvSpPr>
+        <p:spPr/>
+        <p:txBody>
+          <a:bodyPr/>
+          <a:lstStyle/>
+          <a:p>
+            <a:r>
+              <a:rPr lang="de-DE" sz="1800" u="sng" dirty="0"/>
+              <a:t>1. Datensatz mit bekannten </a:t>
+            </a:r>
+            <a:r>
+              <a:rPr lang="de-DE" sz="1800" u="sng" dirty="0" err="1"/>
+              <a:t>Biases</a:t>
+            </a:r>
+            <a:endParaRPr lang="de-DE" sz="1800" u="sng" dirty="0"/>
+          </a:p>
+          <a:p>
+            <a:r>
+              <a:rPr lang="de-DE" sz="1400" dirty="0"/>
+              <a:t>Der Datensatz wird dem Artefakt mit dem benötigten Kontext übergeben, das Ergebnis des Artefakts wird mit dem Metawissen über den Datensatz verglichen.</a:t>
+            </a:r>
+          </a:p>
+          <a:p>
+            <a:r>
+              <a:rPr lang="de-DE" sz="1400" dirty="0"/>
+              <a:t>Bsp. Wenn ein Datensatz Frauen bei Beförderungen benachteiligen sollte, wir überprüft, ob das Artefakt das auch herausfinden kann</a:t>
+            </a:r>
+          </a:p>
+        </p:txBody>
+      </p:sp>
+      <p:sp>
+        <p:nvSpPr>
+          <p:cNvPr id="8" name="Textplatzhalter 7">
+            <a:extLst>
+              <a:ext uri="{FF2B5EF4-FFF2-40B4-BE49-F238E27FC236}">
+                <a16:creationId xmlns:a16="http://schemas.microsoft.com/office/drawing/2014/main" id="{562E0F8F-00E0-2826-FBFA-E6581884CC87}"/>
+              </a:ext>
+            </a:extLst>
+          </p:cNvPr>
+          <p:cNvSpPr>
+            <a:spLocks noGrp="1"/>
+          </p:cNvSpPr>
+          <p:nvPr>
+            <p:ph type="body" sz="quarter" idx="39"/>
+          </p:nvPr>
+        </p:nvSpPr>
+        <p:spPr/>
+        <p:txBody>
+          <a:bodyPr/>
+          <a:lstStyle/>
+          <a:p>
+            <a:endParaRPr lang="de-DE" dirty="0"/>
+          </a:p>
+        </p:txBody>
+      </p:sp>
+      <p:sp>
+        <p:nvSpPr>
+          <p:cNvPr id="6" name="Titel 5">
+            <a:extLst>
+              <a:ext uri="{FF2B5EF4-FFF2-40B4-BE49-F238E27FC236}">
+                <a16:creationId xmlns:a16="http://schemas.microsoft.com/office/drawing/2014/main" id="{141A52E9-C3AF-262C-EBCF-F1578441CFAF}"/>
+              </a:ext>
+            </a:extLst>
+          </p:cNvPr>
+          <p:cNvSpPr>
+            <a:spLocks noGrp="1"/>
+          </p:cNvSpPr>
+          <p:nvPr>
+            <p:ph type="title"/>
+          </p:nvPr>
+        </p:nvSpPr>
+        <p:spPr/>
+        <p:txBody>
+          <a:bodyPr/>
+          <a:lstStyle/>
+          <a:p>
+            <a:r>
+              <a:rPr lang="de-DE" dirty="0"/>
+              <a:t>Insgesamt werden 3 verschiedene Experimentarten durchgeführt</a:t>
+            </a:r>
+          </a:p>
+        </p:txBody>
+      </p:sp>
+      <p:sp>
+        <p:nvSpPr>
+          <p:cNvPr id="7" name="Textplatzhalter 6">
+            <a:extLst>
+              <a:ext uri="{FF2B5EF4-FFF2-40B4-BE49-F238E27FC236}">
+                <a16:creationId xmlns:a16="http://schemas.microsoft.com/office/drawing/2014/main" id="{729D91F5-AF69-2294-FA98-A806524F9A08}"/>
               </a:ext>
             </a:extLst>
           </p:cNvPr>
@@ -30015,35 +30525,24 @@
             <p:ph type="body" sz="quarter" idx="13"/>
           </p:nvPr>
         </p:nvSpPr>
-        <p:spPr>
-          <a:xfrm>
-            <a:off x="518317" y="2647985"/>
-            <a:ext cx="11157745" cy="1562031"/>
-          </a:xfrm>
-        </p:spPr>
+        <p:spPr/>
         <p:txBody>
           <a:bodyPr/>
           <a:lstStyle/>
           <a:p>
             <a:r>
               <a:rPr lang="de-DE" dirty="0"/>
-              <a:t>Vielen Dank für eure </a:t>
-            </a:r>
-          </a:p>
-          <a:p>
-            <a:r>
-              <a:rPr lang="de-DE" dirty="0"/>
-              <a:t>Aufmerksamkeit</a:t>
-            </a:r>
-          </a:p>
-        </p:txBody>
-      </p:sp>
-      <p:sp>
-        <p:nvSpPr>
-          <p:cNvPr id="2" name="Datumsplatzhalter 1">
-            <a:extLst>
-              <a:ext uri="{FF2B5EF4-FFF2-40B4-BE49-F238E27FC236}">
-                <a16:creationId xmlns:a16="http://schemas.microsoft.com/office/drawing/2014/main" id="{F982CCC3-22A8-43D8-9D7F-0A6E2AC8C337}"/>
+              <a:t>Experimentarten</a:t>
+            </a:r>
+          </a:p>
+        </p:txBody>
+      </p:sp>
+      <p:sp>
+        <p:nvSpPr>
+          <p:cNvPr id="9" name="Textplatzhalter 8">
+            <a:extLst>
+              <a:ext uri="{FF2B5EF4-FFF2-40B4-BE49-F238E27FC236}">
+                <a16:creationId xmlns:a16="http://schemas.microsoft.com/office/drawing/2014/main" id="{83C1BF3B-BEAC-C014-D807-B06F45FFBF2D}"/>
               </a:ext>
             </a:extLst>
           </p:cNvPr>
@@ -30051,33 +30550,47 @@
             <a:spLocks noGrp="1"/>
           </p:cNvSpPr>
           <p:nvPr>
-            <p:ph type="dt" sz="half" idx="4294967295"/>
+            <p:ph type="body" sz="quarter" idx="40"/>
           </p:nvPr>
         </p:nvSpPr>
-        <p:spPr>
-          <a:xfrm>
-            <a:off x="11342688" y="6634163"/>
-            <a:ext cx="849312" cy="123825"/>
-          </a:xfrm>
-        </p:spPr>
+        <p:spPr/>
         <p:txBody>
           <a:bodyPr/>
           <a:lstStyle/>
           <a:p>
-            <a:fld id="{974F31EF-6EA6-4A24-8992-69DC7A69151C}" type="datetime4">
-              <a:rPr lang="de-DE" smtClean="0"/>
-              <a:t>14. Dezember 2022</a:t>
-            </a:fld>
-            <a:endParaRPr lang="de-DE"/>
-          </a:p>
-        </p:txBody>
-      </p:sp>
-      <p:sp>
-        <p:nvSpPr>
-          <p:cNvPr id="3" name="Fußzeilenplatzhalter 2">
-            <a:extLst>
-              <a:ext uri="{FF2B5EF4-FFF2-40B4-BE49-F238E27FC236}">
-                <a16:creationId xmlns:a16="http://schemas.microsoft.com/office/drawing/2014/main" id="{2E068204-A6FE-F4ED-690E-22872D79D6E7}"/>
+            <a:r>
+              <a:rPr lang="de-DE" sz="1800" u="sng" dirty="0"/>
+              <a:t>2. Datensatz mit bekannten </a:t>
+            </a:r>
+            <a:r>
+              <a:rPr lang="de-DE" sz="1800" u="sng" dirty="0" err="1"/>
+              <a:t>Biases</a:t>
+            </a:r>
+            <a:r>
+              <a:rPr lang="de-DE" sz="1800" u="sng" dirty="0"/>
+              <a:t> und bereinigte Version des Datensatzes</a:t>
+            </a:r>
+          </a:p>
+          <a:p>
+            <a:r>
+              <a:rPr lang="de-DE" sz="1400" dirty="0"/>
+              <a:t>Gleiches Prozedere wie bei der ersten Art, aber darauffolgend wird dem Artefakt noch eine bereinigte Version von dem Datensatz übergeben. Die beiden Ergebnisse werden danach verglichen.</a:t>
+            </a:r>
+          </a:p>
+          <a:p>
+            <a:r>
+              <a:rPr lang="de-DE" sz="1400" dirty="0"/>
+              <a:t>Bsp. Wenn ein Datensatz Frauen benachteiligt, der bereinigte Datensatz benachteiligt Frauen nicht mehr. Das Artefakt sollte bei beiden Datensätzen nicht das selbe Ergebnis liefern</a:t>
+            </a:r>
+          </a:p>
+        </p:txBody>
+      </p:sp>
+      <p:sp>
+        <p:nvSpPr>
+          <p:cNvPr id="10" name="Textplatzhalter 9">
+            <a:extLst>
+              <a:ext uri="{FF2B5EF4-FFF2-40B4-BE49-F238E27FC236}">
+                <a16:creationId xmlns:a16="http://schemas.microsoft.com/office/drawing/2014/main" id="{E9A932B5-760B-69D3-280A-45479359BD4D}"/>
               </a:ext>
             </a:extLst>
           </p:cNvPr>
@@ -30085,65 +30598,32 @@
             <a:spLocks noGrp="1"/>
           </p:cNvSpPr>
           <p:nvPr>
-            <p:ph type="ftr" sz="quarter" idx="4294967295"/>
+            <p:ph type="body" sz="quarter" idx="41"/>
           </p:nvPr>
         </p:nvSpPr>
-        <p:spPr>
-          <a:xfrm>
-            <a:off x="0" y="6634163"/>
-            <a:ext cx="9574213" cy="123825"/>
-          </a:xfrm>
-        </p:spPr>
+        <p:spPr/>
         <p:txBody>
           <a:bodyPr/>
           <a:lstStyle/>
           <a:p>
             <a:r>
-              <a:rPr lang="de-DE"/>
-              <a:t>Wirtschafts- und Sozialwissenschaften | WiSo</a:t>
-            </a:r>
-          </a:p>
-        </p:txBody>
-      </p:sp>
-      <p:sp>
-        <p:nvSpPr>
-          <p:cNvPr id="4" name="Foliennummernplatzhalter 3">
-            <a:extLst>
-              <a:ext uri="{FF2B5EF4-FFF2-40B4-BE49-F238E27FC236}">
-                <a16:creationId xmlns:a16="http://schemas.microsoft.com/office/drawing/2014/main" id="{CB11C3A7-7FEE-011D-55D5-B3A80CEF0818}"/>
-              </a:ext>
-            </a:extLst>
-          </p:cNvPr>
-          <p:cNvSpPr>
-            <a:spLocks noGrp="1"/>
-          </p:cNvSpPr>
-          <p:nvPr>
-            <p:ph type="sldNum" sz="quarter" idx="4294967295"/>
-          </p:nvPr>
-        </p:nvSpPr>
-        <p:spPr>
-          <a:xfrm>
-            <a:off x="11998325" y="6634163"/>
-            <a:ext cx="193675" cy="123825"/>
-          </a:xfrm>
-        </p:spPr>
-        <p:txBody>
-          <a:bodyPr/>
-          <a:lstStyle/>
-          <a:p>
-            <a:fld id="{D949F9DF-37BD-4CD6-BF49-65BA579E1D7A}" type="slidenum">
-              <a:rPr lang="de-DE" smtClean="0"/>
-              <a:pPr/>
-              <a:t>8</a:t>
-            </a:fld>
-            <a:endParaRPr lang="de-DE"/>
+              <a:rPr lang="de-DE" sz="1800" u="sng" dirty="0"/>
+              <a:t>3. Datensatz ohne bekannten Bias</a:t>
+            </a:r>
+          </a:p>
+          <a:p>
+            <a:r>
+              <a:rPr lang="de-DE" sz="1400" dirty="0"/>
+              <a:t>Gleicher Ablauf wie bei der ersten Art, nur sind keine Metainformationen vorhanden. Die Ergebnisse werden dann erfasst.</a:t>
+            </a:r>
+            <a:endParaRPr lang="de-DE" dirty="0"/>
           </a:p>
         </p:txBody>
       </p:sp>
     </p:spTree>
     <p:extLst>
       <p:ext uri="{BB962C8B-B14F-4D97-AF65-F5344CB8AC3E}">
-        <p14:creationId xmlns:p14="http://schemas.microsoft.com/office/powerpoint/2010/main" val="661126707"/>
+        <p14:creationId xmlns:p14="http://schemas.microsoft.com/office/powerpoint/2010/main" val="3182649975"/>
       </p:ext>
     </p:extLst>
   </p:cSld>

</xml_diff>

<commit_message>
Added Sources to Presentation
</commit_message>
<xml_diff>
--- a/F-Seminar/Zwischenpräsentation.pptx
+++ b/F-Seminar/Zwischenpräsentation.pptx
@@ -29,11 +29,11 @@
     <p:sldId id="438" r:id="rId17"/>
     <p:sldId id="436" r:id="rId18"/>
     <p:sldId id="437" r:id="rId19"/>
-    <p:sldId id="453" r:id="rId20"/>
-    <p:sldId id="445" r:id="rId21"/>
-    <p:sldId id="446" r:id="rId22"/>
-    <p:sldId id="447" r:id="rId23"/>
-    <p:sldId id="429" r:id="rId24"/>
+    <p:sldId id="445" r:id="rId20"/>
+    <p:sldId id="446" r:id="rId21"/>
+    <p:sldId id="447" r:id="rId22"/>
+    <p:sldId id="429" r:id="rId23"/>
+    <p:sldId id="454" r:id="rId24"/>
   </p:sldIdLst>
   <p:sldSz cx="12192000" cy="6858000"/>
   <p:notesSz cx="6858000" cy="9144000"/>
@@ -907,757 +907,6 @@
 </file>
 
 <file path=ppt/diagrams/colors2.xml><?xml version="1.0" encoding="utf-8"?>
-<dgm:colorsDef xmlns:dgm="http://schemas.openxmlformats.org/drawingml/2006/diagram" xmlns:a="http://schemas.openxmlformats.org/drawingml/2006/main" uniqueId="urn:microsoft.com/office/officeart/2005/8/colors/accent0_3">
-  <dgm:title val=""/>
-  <dgm:desc val=""/>
-  <dgm:catLst>
-    <dgm:cat type="mainScheme" pri="10300"/>
-  </dgm:catLst>
-  <dgm:styleLbl name="node0">
-    <dgm:fillClrLst meth="repeat">
-      <a:schemeClr val="dk2"/>
-    </dgm:fillClrLst>
-    <dgm:linClrLst meth="repeat">
-      <a:schemeClr val="lt2"/>
-    </dgm:linClrLst>
-    <dgm:effectClrLst/>
-    <dgm:txLinClrLst/>
-    <dgm:txFillClrLst/>
-    <dgm:txEffectClrLst/>
-  </dgm:styleLbl>
-  <dgm:styleLbl name="alignNode1">
-    <dgm:fillClrLst meth="repeat">
-      <a:schemeClr val="dk2"/>
-    </dgm:fillClrLst>
-    <dgm:linClrLst meth="repeat">
-      <a:schemeClr val="dk2"/>
-    </dgm:linClrLst>
-    <dgm:effectClrLst/>
-    <dgm:txLinClrLst/>
-    <dgm:txFillClrLst/>
-    <dgm:txEffectClrLst/>
-  </dgm:styleLbl>
-  <dgm:styleLbl name="node1">
-    <dgm:fillClrLst meth="repeat">
-      <a:schemeClr val="dk2"/>
-    </dgm:fillClrLst>
-    <dgm:linClrLst meth="repeat">
-      <a:schemeClr val="lt2"/>
-    </dgm:linClrLst>
-    <dgm:effectClrLst/>
-    <dgm:txLinClrLst/>
-    <dgm:txFillClrLst/>
-    <dgm:txEffectClrLst/>
-  </dgm:styleLbl>
-  <dgm:styleLbl name="lnNode1">
-    <dgm:fillClrLst meth="repeat">
-      <a:schemeClr val="dk2"/>
-    </dgm:fillClrLst>
-    <dgm:linClrLst meth="repeat">
-      <a:schemeClr val="lt2"/>
-    </dgm:linClrLst>
-    <dgm:effectClrLst/>
-    <dgm:txLinClrLst/>
-    <dgm:txFillClrLst/>
-    <dgm:txEffectClrLst/>
-  </dgm:styleLbl>
-  <dgm:styleLbl name="vennNode1">
-    <dgm:fillClrLst meth="repeat">
-      <a:schemeClr val="dk2">
-        <a:alpha val="50000"/>
-      </a:schemeClr>
-    </dgm:fillClrLst>
-    <dgm:linClrLst meth="repeat">
-      <a:schemeClr val="lt2"/>
-    </dgm:linClrLst>
-    <dgm:effectClrLst/>
-    <dgm:txLinClrLst/>
-    <dgm:txFillClrLst/>
-    <dgm:txEffectClrLst/>
-  </dgm:styleLbl>
-  <dgm:styleLbl name="node2">
-    <dgm:fillClrLst meth="repeat">
-      <a:schemeClr val="dk2"/>
-    </dgm:fillClrLst>
-    <dgm:linClrLst meth="repeat">
-      <a:schemeClr val="lt2"/>
-    </dgm:linClrLst>
-    <dgm:effectClrLst/>
-    <dgm:txLinClrLst/>
-    <dgm:txFillClrLst/>
-    <dgm:txEffectClrLst/>
-  </dgm:styleLbl>
-  <dgm:styleLbl name="node3">
-    <dgm:fillClrLst meth="repeat">
-      <a:schemeClr val="dk2"/>
-    </dgm:fillClrLst>
-    <dgm:linClrLst meth="repeat">
-      <a:schemeClr val="lt2"/>
-    </dgm:linClrLst>
-    <dgm:effectClrLst/>
-    <dgm:txLinClrLst/>
-    <dgm:txFillClrLst/>
-    <dgm:txEffectClrLst/>
-  </dgm:styleLbl>
-  <dgm:styleLbl name="node4">
-    <dgm:fillClrLst meth="repeat">
-      <a:schemeClr val="dk2"/>
-    </dgm:fillClrLst>
-    <dgm:linClrLst meth="repeat">
-      <a:schemeClr val="lt2"/>
-    </dgm:linClrLst>
-    <dgm:effectClrLst/>
-    <dgm:txLinClrLst/>
-    <dgm:txFillClrLst/>
-    <dgm:txEffectClrLst/>
-  </dgm:styleLbl>
-  <dgm:styleLbl name="fgImgPlace1">
-    <dgm:fillClrLst meth="repeat">
-      <a:schemeClr val="dk2">
-        <a:tint val="50000"/>
-      </a:schemeClr>
-    </dgm:fillClrLst>
-    <dgm:linClrLst meth="repeat">
-      <a:schemeClr val="lt2"/>
-    </dgm:linClrLst>
-    <dgm:effectClrLst/>
-    <dgm:txLinClrLst/>
-    <dgm:txFillClrLst meth="repeat">
-      <a:schemeClr val="lt2"/>
-    </dgm:txFillClrLst>
-    <dgm:txEffectClrLst/>
-  </dgm:styleLbl>
-  <dgm:styleLbl name="alignImgPlace1">
-    <dgm:fillClrLst meth="repeat">
-      <a:schemeClr val="dk2">
-        <a:tint val="50000"/>
-      </a:schemeClr>
-    </dgm:fillClrLst>
-    <dgm:linClrLst meth="repeat">
-      <a:schemeClr val="dk2">
-        <a:shade val="80000"/>
-      </a:schemeClr>
-    </dgm:linClrLst>
-    <dgm:effectClrLst/>
-    <dgm:txLinClrLst/>
-    <dgm:txFillClrLst meth="repeat">
-      <a:schemeClr val="lt2"/>
-    </dgm:txFillClrLst>
-    <dgm:txEffectClrLst/>
-  </dgm:styleLbl>
-  <dgm:styleLbl name="bgImgPlace1">
-    <dgm:fillClrLst meth="repeat">
-      <a:schemeClr val="dk2">
-        <a:tint val="50000"/>
-      </a:schemeClr>
-    </dgm:fillClrLst>
-    <dgm:linClrLst meth="repeat">
-      <a:schemeClr val="dk2">
-        <a:shade val="80000"/>
-      </a:schemeClr>
-    </dgm:linClrLst>
-    <dgm:effectClrLst/>
-    <dgm:txLinClrLst/>
-    <dgm:txFillClrLst meth="repeat">
-      <a:schemeClr val="lt2"/>
-    </dgm:txFillClrLst>
-    <dgm:txEffectClrLst/>
-  </dgm:styleLbl>
-  <dgm:styleLbl name="sibTrans2D1">
-    <dgm:fillClrLst meth="repeat">
-      <a:schemeClr val="dk2">
-        <a:tint val="60000"/>
-      </a:schemeClr>
-    </dgm:fillClrLst>
-    <dgm:linClrLst meth="repeat">
-      <a:schemeClr val="dk2">
-        <a:tint val="60000"/>
-      </a:schemeClr>
-    </dgm:linClrLst>
-    <dgm:effectClrLst/>
-    <dgm:txLinClrLst/>
-    <dgm:txFillClrLst/>
-    <dgm:txEffectClrLst/>
-  </dgm:styleLbl>
-  <dgm:styleLbl name="fgSibTrans2D1">
-    <dgm:fillClrLst meth="repeat">
-      <a:schemeClr val="dk2">
-        <a:tint val="60000"/>
-      </a:schemeClr>
-    </dgm:fillClrLst>
-    <dgm:linClrLst meth="repeat">
-      <a:schemeClr val="dk2">
-        <a:tint val="60000"/>
-      </a:schemeClr>
-    </dgm:linClrLst>
-    <dgm:effectClrLst/>
-    <dgm:txLinClrLst/>
-    <dgm:txFillClrLst/>
-    <dgm:txEffectClrLst/>
-  </dgm:styleLbl>
-  <dgm:styleLbl name="bgSibTrans2D1">
-    <dgm:fillClrLst meth="repeat">
-      <a:schemeClr val="dk2">
-        <a:tint val="60000"/>
-      </a:schemeClr>
-    </dgm:fillClrLst>
-    <dgm:linClrLst meth="repeat">
-      <a:schemeClr val="dk2">
-        <a:tint val="60000"/>
-      </a:schemeClr>
-    </dgm:linClrLst>
-    <dgm:effectClrLst/>
-    <dgm:txLinClrLst/>
-    <dgm:txFillClrLst/>
-    <dgm:txEffectClrLst/>
-  </dgm:styleLbl>
-  <dgm:styleLbl name="sibTrans1D1">
-    <dgm:fillClrLst meth="repeat">
-      <a:schemeClr val="dk2"/>
-    </dgm:fillClrLst>
-    <dgm:linClrLst meth="repeat">
-      <a:schemeClr val="dk2"/>
-    </dgm:linClrLst>
-    <dgm:effectClrLst/>
-    <dgm:txLinClrLst/>
-    <dgm:txFillClrLst meth="repeat">
-      <a:schemeClr val="lt2"/>
-    </dgm:txFillClrLst>
-    <dgm:txEffectClrLst/>
-  </dgm:styleLbl>
-  <dgm:styleLbl name="callout">
-    <dgm:fillClrLst meth="repeat">
-      <a:schemeClr val="dk2"/>
-    </dgm:fillClrLst>
-    <dgm:linClrLst meth="repeat">
-      <a:schemeClr val="dk2">
-        <a:tint val="50000"/>
-      </a:schemeClr>
-    </dgm:linClrLst>
-    <dgm:effectClrLst/>
-    <dgm:txLinClrLst/>
-    <dgm:txFillClrLst meth="repeat">
-      <a:schemeClr val="lt2"/>
-    </dgm:txFillClrLst>
-    <dgm:txEffectClrLst/>
-  </dgm:styleLbl>
-  <dgm:styleLbl name="asst0">
-    <dgm:fillClrLst meth="repeat">
-      <a:schemeClr val="dk2"/>
-    </dgm:fillClrLst>
-    <dgm:linClrLst meth="repeat">
-      <a:schemeClr val="lt2"/>
-    </dgm:linClrLst>
-    <dgm:effectClrLst/>
-    <dgm:txLinClrLst/>
-    <dgm:txFillClrLst/>
-    <dgm:txEffectClrLst/>
-  </dgm:styleLbl>
-  <dgm:styleLbl name="asst1">
-    <dgm:fillClrLst meth="repeat">
-      <a:schemeClr val="dk2"/>
-    </dgm:fillClrLst>
-    <dgm:linClrLst meth="repeat">
-      <a:schemeClr val="lt2"/>
-    </dgm:linClrLst>
-    <dgm:effectClrLst/>
-    <dgm:txLinClrLst/>
-    <dgm:txFillClrLst/>
-    <dgm:txEffectClrLst/>
-  </dgm:styleLbl>
-  <dgm:styleLbl name="asst2">
-    <dgm:fillClrLst meth="repeat">
-      <a:schemeClr val="dk2"/>
-    </dgm:fillClrLst>
-    <dgm:linClrLst meth="repeat">
-      <a:schemeClr val="lt2"/>
-    </dgm:linClrLst>
-    <dgm:effectClrLst/>
-    <dgm:txLinClrLst/>
-    <dgm:txFillClrLst/>
-    <dgm:txEffectClrLst/>
-  </dgm:styleLbl>
-  <dgm:styleLbl name="asst3">
-    <dgm:fillClrLst meth="repeat">
-      <a:schemeClr val="dk2"/>
-    </dgm:fillClrLst>
-    <dgm:linClrLst meth="repeat">
-      <a:schemeClr val="lt2"/>
-    </dgm:linClrLst>
-    <dgm:effectClrLst/>
-    <dgm:txLinClrLst/>
-    <dgm:txFillClrLst/>
-    <dgm:txEffectClrLst/>
-  </dgm:styleLbl>
-  <dgm:styleLbl name="asst4">
-    <dgm:fillClrLst meth="repeat">
-      <a:schemeClr val="dk2"/>
-    </dgm:fillClrLst>
-    <dgm:linClrLst meth="repeat">
-      <a:schemeClr val="lt2"/>
-    </dgm:linClrLst>
-    <dgm:effectClrLst/>
-    <dgm:txLinClrLst/>
-    <dgm:txFillClrLst/>
-    <dgm:txEffectClrLst/>
-  </dgm:styleLbl>
-  <dgm:styleLbl name="parChTrans2D1">
-    <dgm:fillClrLst meth="repeat">
-      <a:schemeClr val="dk2">
-        <a:tint val="60000"/>
-      </a:schemeClr>
-    </dgm:fillClrLst>
-    <dgm:linClrLst meth="repeat">
-      <a:schemeClr val="dk2">
-        <a:tint val="60000"/>
-      </a:schemeClr>
-    </dgm:linClrLst>
-    <dgm:effectClrLst/>
-    <dgm:txLinClrLst/>
-    <dgm:txFillClrLst meth="repeat">
-      <a:schemeClr val="lt2"/>
-    </dgm:txFillClrLst>
-    <dgm:txEffectClrLst/>
-  </dgm:styleLbl>
-  <dgm:styleLbl name="parChTrans2D2">
-    <dgm:fillClrLst meth="repeat">
-      <a:schemeClr val="dk2"/>
-    </dgm:fillClrLst>
-    <dgm:linClrLst meth="repeat">
-      <a:schemeClr val="dk2"/>
-    </dgm:linClrLst>
-    <dgm:effectClrLst/>
-    <dgm:txLinClrLst/>
-    <dgm:txFillClrLst meth="repeat">
-      <a:schemeClr val="lt2"/>
-    </dgm:txFillClrLst>
-    <dgm:txEffectClrLst/>
-  </dgm:styleLbl>
-  <dgm:styleLbl name="parChTrans2D3">
-    <dgm:fillClrLst meth="repeat">
-      <a:schemeClr val="dk2"/>
-    </dgm:fillClrLst>
-    <dgm:linClrLst meth="repeat">
-      <a:schemeClr val="dk2"/>
-    </dgm:linClrLst>
-    <dgm:effectClrLst/>
-    <dgm:txLinClrLst/>
-    <dgm:txFillClrLst meth="repeat">
-      <a:schemeClr val="lt2"/>
-    </dgm:txFillClrLst>
-    <dgm:txEffectClrLst/>
-  </dgm:styleLbl>
-  <dgm:styleLbl name="parChTrans2D4">
-    <dgm:fillClrLst meth="repeat">
-      <a:schemeClr val="dk2"/>
-    </dgm:fillClrLst>
-    <dgm:linClrLst meth="repeat">
-      <a:schemeClr val="dk2"/>
-    </dgm:linClrLst>
-    <dgm:effectClrLst/>
-    <dgm:txLinClrLst/>
-    <dgm:txFillClrLst meth="repeat">
-      <a:schemeClr val="lt2"/>
-    </dgm:txFillClrLst>
-    <dgm:txEffectClrLst/>
-  </dgm:styleLbl>
-  <dgm:styleLbl name="parChTrans1D1">
-    <dgm:fillClrLst meth="repeat">
-      <a:schemeClr val="dk2"/>
-    </dgm:fillClrLst>
-    <dgm:linClrLst meth="repeat">
-      <a:schemeClr val="dk2">
-        <a:shade val="60000"/>
-      </a:schemeClr>
-    </dgm:linClrLst>
-    <dgm:effectClrLst/>
-    <dgm:txLinClrLst/>
-    <dgm:txFillClrLst meth="repeat">
-      <a:schemeClr val="tx1"/>
-    </dgm:txFillClrLst>
-    <dgm:txEffectClrLst/>
-  </dgm:styleLbl>
-  <dgm:styleLbl name="parChTrans1D2">
-    <dgm:fillClrLst meth="repeat">
-      <a:schemeClr val="dk2"/>
-    </dgm:fillClrLst>
-    <dgm:linClrLst meth="repeat">
-      <a:schemeClr val="dk2">
-        <a:shade val="60000"/>
-      </a:schemeClr>
-    </dgm:linClrLst>
-    <dgm:effectClrLst/>
-    <dgm:txLinClrLst/>
-    <dgm:txFillClrLst meth="repeat">
-      <a:schemeClr val="tx1"/>
-    </dgm:txFillClrLst>
-    <dgm:txEffectClrLst/>
-  </dgm:styleLbl>
-  <dgm:styleLbl name="parChTrans1D3">
-    <dgm:fillClrLst meth="repeat">
-      <a:schemeClr val="dk2"/>
-    </dgm:fillClrLst>
-    <dgm:linClrLst meth="repeat">
-      <a:schemeClr val="dk2">
-        <a:shade val="80000"/>
-      </a:schemeClr>
-    </dgm:linClrLst>
-    <dgm:effectClrLst/>
-    <dgm:txLinClrLst/>
-    <dgm:txFillClrLst meth="repeat">
-      <a:schemeClr val="tx1"/>
-    </dgm:txFillClrLst>
-    <dgm:txEffectClrLst/>
-  </dgm:styleLbl>
-  <dgm:styleLbl name="parChTrans1D4">
-    <dgm:fillClrLst meth="repeat">
-      <a:schemeClr val="dk2"/>
-    </dgm:fillClrLst>
-    <dgm:linClrLst meth="repeat">
-      <a:schemeClr val="dk2">
-        <a:shade val="80000"/>
-      </a:schemeClr>
-    </dgm:linClrLst>
-    <dgm:effectClrLst/>
-    <dgm:txLinClrLst/>
-    <dgm:txFillClrLst meth="repeat">
-      <a:schemeClr val="tx1"/>
-    </dgm:txFillClrLst>
-    <dgm:txEffectClrLst/>
-  </dgm:styleLbl>
-  <dgm:styleLbl name="fgAcc1">
-    <dgm:fillClrLst meth="repeat">
-      <a:schemeClr val="lt2">
-        <a:alpha val="90000"/>
-      </a:schemeClr>
-    </dgm:fillClrLst>
-    <dgm:linClrLst meth="repeat">
-      <a:schemeClr val="dk2"/>
-    </dgm:linClrLst>
-    <dgm:effectClrLst/>
-    <dgm:txLinClrLst/>
-    <dgm:txFillClrLst meth="repeat">
-      <a:schemeClr val="dk1"/>
-    </dgm:txFillClrLst>
-    <dgm:txEffectClrLst/>
-  </dgm:styleLbl>
-  <dgm:styleLbl name="conFgAcc1">
-    <dgm:fillClrLst meth="repeat">
-      <a:schemeClr val="lt2">
-        <a:alpha val="90000"/>
-      </a:schemeClr>
-    </dgm:fillClrLst>
-    <dgm:linClrLst meth="repeat">
-      <a:schemeClr val="dk2"/>
-    </dgm:linClrLst>
-    <dgm:effectClrLst/>
-    <dgm:txLinClrLst/>
-    <dgm:txFillClrLst meth="repeat">
-      <a:schemeClr val="dk1"/>
-    </dgm:txFillClrLst>
-    <dgm:txEffectClrLst/>
-  </dgm:styleLbl>
-  <dgm:styleLbl name="alignAcc1">
-    <dgm:fillClrLst meth="repeat">
-      <a:schemeClr val="lt2">
-        <a:alpha val="90000"/>
-      </a:schemeClr>
-    </dgm:fillClrLst>
-    <dgm:linClrLst meth="repeat">
-      <a:schemeClr val="dk2"/>
-    </dgm:linClrLst>
-    <dgm:effectClrLst/>
-    <dgm:txLinClrLst/>
-    <dgm:txFillClrLst meth="repeat">
-      <a:schemeClr val="dk1"/>
-    </dgm:txFillClrLst>
-    <dgm:txEffectClrLst/>
-  </dgm:styleLbl>
-  <dgm:styleLbl name="trAlignAcc1">
-    <dgm:fillClrLst meth="repeat">
-      <a:schemeClr val="lt2">
-        <a:alpha val="40000"/>
-      </a:schemeClr>
-    </dgm:fillClrLst>
-    <dgm:linClrLst meth="repeat">
-      <a:schemeClr val="dk2"/>
-    </dgm:linClrLst>
-    <dgm:effectClrLst/>
-    <dgm:txLinClrLst/>
-    <dgm:txFillClrLst meth="repeat">
-      <a:schemeClr val="dk1"/>
-    </dgm:txFillClrLst>
-    <dgm:txEffectClrLst/>
-  </dgm:styleLbl>
-  <dgm:styleLbl name="bgAcc1">
-    <dgm:fillClrLst meth="repeat">
-      <a:schemeClr val="lt2">
-        <a:alpha val="90000"/>
-      </a:schemeClr>
-    </dgm:fillClrLst>
-    <dgm:linClrLst meth="repeat">
-      <a:schemeClr val="dk2"/>
-    </dgm:linClrLst>
-    <dgm:effectClrLst/>
-    <dgm:txLinClrLst/>
-    <dgm:txFillClrLst meth="repeat">
-      <a:schemeClr val="dk1"/>
-    </dgm:txFillClrLst>
-    <dgm:txEffectClrLst/>
-  </dgm:styleLbl>
-  <dgm:styleLbl name="solidFgAcc1">
-    <dgm:fillClrLst meth="repeat">
-      <a:schemeClr val="lt2"/>
-    </dgm:fillClrLst>
-    <dgm:linClrLst meth="repeat">
-      <a:schemeClr val="dk2"/>
-    </dgm:linClrLst>
-    <dgm:effectClrLst/>
-    <dgm:txLinClrLst/>
-    <dgm:txFillClrLst meth="repeat">
-      <a:schemeClr val="dk1"/>
-    </dgm:txFillClrLst>
-    <dgm:txEffectClrLst/>
-  </dgm:styleLbl>
-  <dgm:styleLbl name="solidAlignAcc1">
-    <dgm:fillClrLst meth="repeat">
-      <a:schemeClr val="lt2"/>
-    </dgm:fillClrLst>
-    <dgm:linClrLst meth="repeat">
-      <a:schemeClr val="dk2"/>
-    </dgm:linClrLst>
-    <dgm:effectClrLst/>
-    <dgm:txLinClrLst/>
-    <dgm:txFillClrLst meth="repeat">
-      <a:schemeClr val="dk1"/>
-    </dgm:txFillClrLst>
-    <dgm:txEffectClrLst/>
-  </dgm:styleLbl>
-  <dgm:styleLbl name="solidBgAcc1">
-    <dgm:fillClrLst meth="repeat">
-      <a:schemeClr val="lt2"/>
-    </dgm:fillClrLst>
-    <dgm:linClrLst meth="repeat">
-      <a:schemeClr val="dk2"/>
-    </dgm:linClrLst>
-    <dgm:effectClrLst/>
-    <dgm:txLinClrLst/>
-    <dgm:txFillClrLst meth="repeat">
-      <a:schemeClr val="dk1"/>
-    </dgm:txFillClrLst>
-    <dgm:txEffectClrLst/>
-  </dgm:styleLbl>
-  <dgm:styleLbl name="fgAccFollowNode1">
-    <dgm:fillClrLst meth="repeat">
-      <a:schemeClr val="dk2">
-        <a:alpha val="90000"/>
-        <a:tint val="40000"/>
-      </a:schemeClr>
-    </dgm:fillClrLst>
-    <dgm:linClrLst meth="repeat">
-      <a:schemeClr val="dk2">
-        <a:alpha val="90000"/>
-        <a:tint val="40000"/>
-      </a:schemeClr>
-    </dgm:linClrLst>
-    <dgm:effectClrLst/>
-    <dgm:txLinClrLst/>
-    <dgm:txFillClrLst meth="repeat">
-      <a:schemeClr val="dk1"/>
-    </dgm:txFillClrLst>
-    <dgm:txEffectClrLst/>
-  </dgm:styleLbl>
-  <dgm:styleLbl name="alignAccFollowNode1">
-    <dgm:fillClrLst meth="repeat">
-      <a:schemeClr val="dk2">
-        <a:alpha val="90000"/>
-        <a:tint val="40000"/>
-      </a:schemeClr>
-    </dgm:fillClrLst>
-    <dgm:linClrLst meth="repeat">
-      <a:schemeClr val="dk2">
-        <a:alpha val="90000"/>
-        <a:tint val="40000"/>
-      </a:schemeClr>
-    </dgm:linClrLst>
-    <dgm:effectClrLst/>
-    <dgm:txLinClrLst/>
-    <dgm:txFillClrLst meth="repeat">
-      <a:schemeClr val="dk1"/>
-    </dgm:txFillClrLst>
-    <dgm:txEffectClrLst/>
-  </dgm:styleLbl>
-  <dgm:styleLbl name="bgAccFollowNode1">
-    <dgm:fillClrLst meth="repeat">
-      <a:schemeClr val="dk2">
-        <a:alpha val="90000"/>
-        <a:tint val="40000"/>
-      </a:schemeClr>
-    </dgm:fillClrLst>
-    <dgm:linClrLst meth="repeat">
-      <a:schemeClr val="dk2">
-        <a:alpha val="90000"/>
-        <a:tint val="40000"/>
-      </a:schemeClr>
-    </dgm:linClrLst>
-    <dgm:effectClrLst/>
-    <dgm:txLinClrLst/>
-    <dgm:txFillClrLst meth="repeat">
-      <a:schemeClr val="dk1"/>
-    </dgm:txFillClrLst>
-    <dgm:txEffectClrLst/>
-  </dgm:styleLbl>
-  <dgm:styleLbl name="fgAcc0">
-    <dgm:fillClrLst meth="repeat">
-      <a:schemeClr val="lt2">
-        <a:alpha val="90000"/>
-      </a:schemeClr>
-    </dgm:fillClrLst>
-    <dgm:linClrLst meth="repeat">
-      <a:schemeClr val="dk2"/>
-    </dgm:linClrLst>
-    <dgm:effectClrLst/>
-    <dgm:txLinClrLst/>
-    <dgm:txFillClrLst meth="repeat">
-      <a:schemeClr val="dk1"/>
-    </dgm:txFillClrLst>
-    <dgm:txEffectClrLst/>
-  </dgm:styleLbl>
-  <dgm:styleLbl name="fgAcc2">
-    <dgm:fillClrLst meth="repeat">
-      <a:schemeClr val="lt2">
-        <a:alpha val="90000"/>
-      </a:schemeClr>
-    </dgm:fillClrLst>
-    <dgm:linClrLst meth="repeat">
-      <a:schemeClr val="dk2"/>
-    </dgm:linClrLst>
-    <dgm:effectClrLst/>
-    <dgm:txLinClrLst/>
-    <dgm:txFillClrLst meth="repeat">
-      <a:schemeClr val="dk1"/>
-    </dgm:txFillClrLst>
-    <dgm:txEffectClrLst/>
-  </dgm:styleLbl>
-  <dgm:styleLbl name="fgAcc3">
-    <dgm:fillClrLst meth="repeat">
-      <a:schemeClr val="lt2">
-        <a:alpha val="90000"/>
-      </a:schemeClr>
-    </dgm:fillClrLst>
-    <dgm:linClrLst meth="repeat">
-      <a:schemeClr val="dk2"/>
-    </dgm:linClrLst>
-    <dgm:effectClrLst/>
-    <dgm:txLinClrLst/>
-    <dgm:txFillClrLst meth="repeat">
-      <a:schemeClr val="dk1"/>
-    </dgm:txFillClrLst>
-    <dgm:txEffectClrLst/>
-  </dgm:styleLbl>
-  <dgm:styleLbl name="fgAcc4">
-    <dgm:fillClrLst meth="repeat">
-      <a:schemeClr val="lt2">
-        <a:alpha val="90000"/>
-      </a:schemeClr>
-    </dgm:fillClrLst>
-    <dgm:linClrLst meth="repeat">
-      <a:schemeClr val="dk2"/>
-    </dgm:linClrLst>
-    <dgm:effectClrLst/>
-    <dgm:txLinClrLst/>
-    <dgm:txFillClrLst meth="repeat">
-      <a:schemeClr val="dk1"/>
-    </dgm:txFillClrLst>
-    <dgm:txEffectClrLst/>
-  </dgm:styleLbl>
-  <dgm:styleLbl name="bgShp">
-    <dgm:fillClrLst meth="repeat">
-      <a:schemeClr val="dk2">
-        <a:tint val="40000"/>
-      </a:schemeClr>
-    </dgm:fillClrLst>
-    <dgm:linClrLst meth="repeat">
-      <a:schemeClr val="dk2"/>
-    </dgm:linClrLst>
-    <dgm:effectClrLst/>
-    <dgm:txLinClrLst/>
-    <dgm:txFillClrLst meth="repeat">
-      <a:schemeClr val="dk1"/>
-    </dgm:txFillClrLst>
-    <dgm:txEffectClrLst/>
-  </dgm:styleLbl>
-  <dgm:styleLbl name="dkBgShp">
-    <dgm:fillClrLst meth="repeat">
-      <a:schemeClr val="dk2">
-        <a:shade val="80000"/>
-      </a:schemeClr>
-    </dgm:fillClrLst>
-    <dgm:linClrLst meth="repeat">
-      <a:schemeClr val="dk2"/>
-    </dgm:linClrLst>
-    <dgm:effectClrLst/>
-    <dgm:txLinClrLst/>
-    <dgm:txFillClrLst meth="repeat">
-      <a:schemeClr val="lt1"/>
-    </dgm:txFillClrLst>
-    <dgm:txEffectClrLst/>
-  </dgm:styleLbl>
-  <dgm:styleLbl name="trBgShp">
-    <dgm:fillClrLst meth="repeat">
-      <a:schemeClr val="dk2">
-        <a:tint val="50000"/>
-        <a:alpha val="40000"/>
-      </a:schemeClr>
-    </dgm:fillClrLst>
-    <dgm:linClrLst meth="repeat">
-      <a:schemeClr val="dk2"/>
-    </dgm:linClrLst>
-    <dgm:effectClrLst/>
-    <dgm:txLinClrLst/>
-    <dgm:txFillClrLst meth="repeat">
-      <a:schemeClr val="lt1"/>
-    </dgm:txFillClrLst>
-    <dgm:txEffectClrLst/>
-  </dgm:styleLbl>
-  <dgm:styleLbl name="fgShp">
-    <dgm:fillClrLst meth="repeat">
-      <a:schemeClr val="dk2">
-        <a:tint val="60000"/>
-      </a:schemeClr>
-    </dgm:fillClrLst>
-    <dgm:linClrLst meth="repeat">
-      <a:schemeClr val="lt2"/>
-    </dgm:linClrLst>
-    <dgm:effectClrLst/>
-    <dgm:txLinClrLst/>
-    <dgm:txFillClrLst meth="repeat">
-      <a:schemeClr val="dk1"/>
-    </dgm:txFillClrLst>
-    <dgm:txEffectClrLst/>
-  </dgm:styleLbl>
-  <dgm:styleLbl name="revTx">
-    <dgm:fillClrLst meth="repeat">
-      <a:schemeClr val="lt2">
-        <a:alpha val="0"/>
-      </a:schemeClr>
-    </dgm:fillClrLst>
-    <dgm:linClrLst meth="repeat">
-      <a:schemeClr val="dk1">
-        <a:alpha val="0"/>
-      </a:schemeClr>
-    </dgm:linClrLst>
-    <dgm:effectClrLst/>
-    <dgm:txLinClrLst/>
-    <dgm:txFillClrLst meth="repeat">
-      <a:schemeClr val="tx1"/>
-    </dgm:txFillClrLst>
-    <dgm:txEffectClrLst/>
-  </dgm:styleLbl>
-</dgm:colorsDef>
-</file>
-
-<file path=ppt/diagrams/colors3.xml><?xml version="1.0" encoding="utf-8"?>
 <dgm:colorsDef xmlns:dgm="http://schemas.openxmlformats.org/drawingml/2006/diagram" xmlns:a="http://schemas.openxmlformats.org/drawingml/2006/main" uniqueId="urn:microsoft.com/office/officeart/2005/8/colors/accent0_3">
   <dgm:title val=""/>
   <dgm:desc val=""/>
@@ -3398,360 +2647,6 @@
 </dgm:dataModel>
 </file>
 
-<file path=ppt/diagrams/data3.xml><?xml version="1.0" encoding="utf-8"?>
-<dgm:dataModel xmlns:dgm="http://schemas.openxmlformats.org/drawingml/2006/diagram" xmlns:a="http://schemas.openxmlformats.org/drawingml/2006/main">
-  <dgm:ptLst>
-    <dgm:pt modelId="{95987CFB-C787-4212-A142-D0D372ADBA16}" type="doc">
-      <dgm:prSet loTypeId="urn:microsoft.com/office/officeart/2005/8/layout/vList2" loCatId="list" qsTypeId="urn:microsoft.com/office/officeart/2005/8/quickstyle/simple1" qsCatId="simple" csTypeId="urn:microsoft.com/office/officeart/2005/8/colors/accent0_3" csCatId="mainScheme" phldr="1"/>
-      <dgm:spPr/>
-      <dgm:t>
-        <a:bodyPr/>
-        <a:lstStyle/>
-        <a:p>
-          <a:endParaRPr lang="de-DE"/>
-        </a:p>
-      </dgm:t>
-    </dgm:pt>
-    <dgm:pt modelId="{EA0F1308-7CE9-4B0D-B605-59DAD9D9B472}">
-      <dgm:prSet phldrT="[Text]" custT="1"/>
-      <dgm:spPr/>
-      <dgm:t>
-        <a:bodyPr/>
-        <a:lstStyle/>
-        <a:p>
-          <a:r>
-            <a:rPr lang="de-DE" sz="2100" u="none" dirty="0"/>
-            <a:t>1. Datensatz mit bekannten </a:t>
-          </a:r>
-          <a:r>
-            <a:rPr lang="de-DE" sz="2100" u="none" dirty="0" err="1"/>
-            <a:t>Biases</a:t>
-          </a:r>
-          <a:endParaRPr lang="de-DE" sz="2100" u="none" dirty="0"/>
-        </a:p>
-      </dgm:t>
-    </dgm:pt>
-    <dgm:pt modelId="{D0C33266-534C-4478-B794-1DF68BF4E91C}" type="parTrans" cxnId="{DBF6B06D-CE83-4FE6-AB1E-94A412D92278}">
-      <dgm:prSet/>
-      <dgm:spPr/>
-      <dgm:t>
-        <a:bodyPr/>
-        <a:lstStyle/>
-        <a:p>
-          <a:endParaRPr lang="de-DE"/>
-        </a:p>
-      </dgm:t>
-    </dgm:pt>
-    <dgm:pt modelId="{3FF746AB-FF94-4C11-9565-124A17FC87BE}" type="sibTrans" cxnId="{DBF6B06D-CE83-4FE6-AB1E-94A412D92278}">
-      <dgm:prSet/>
-      <dgm:spPr/>
-      <dgm:t>
-        <a:bodyPr/>
-        <a:lstStyle/>
-        <a:p>
-          <a:endParaRPr lang="de-DE"/>
-        </a:p>
-      </dgm:t>
-    </dgm:pt>
-    <dgm:pt modelId="{515943EF-2265-4029-8F3B-D84FDE1F640A}">
-      <dgm:prSet custT="1"/>
-      <dgm:spPr/>
-      <dgm:t>
-        <a:bodyPr/>
-        <a:lstStyle/>
-        <a:p>
-          <a:pPr>
-            <a:buFont typeface="Arial" panose="020B0604020202020204" pitchFamily="34" charset="0"/>
-            <a:buChar char="•"/>
-          </a:pPr>
-          <a:r>
-            <a:rPr lang="de-DE" sz="1600" dirty="0"/>
-            <a:t>Der Datensatz wird dem Artefakt mit dem benötigten Kontext übergeben, das Ergebnis des Artefakts wird mit dem Metawissen über den Datensatz verglichen.</a:t>
-          </a:r>
-          <a:br>
-            <a:rPr lang="de-DE" sz="1600" dirty="0"/>
-          </a:br>
-          <a:r>
-            <a:rPr lang="de-DE" sz="1600" dirty="0"/>
-            <a:t>Bsp. Wenn ein Datensatz Frauen bei Beförderungen benachteiligen sollte, wir überprüft, ob das Artefakt das auch herausfinden kann</a:t>
-          </a:r>
-        </a:p>
-      </dgm:t>
-    </dgm:pt>
-    <dgm:pt modelId="{B65B5A59-8794-4D46-B4B6-F81628D6E7CB}" type="parTrans" cxnId="{D3846676-E3F8-436D-99F7-442468769D5C}">
-      <dgm:prSet/>
-      <dgm:spPr/>
-      <dgm:t>
-        <a:bodyPr/>
-        <a:lstStyle/>
-        <a:p>
-          <a:endParaRPr lang="de-DE"/>
-        </a:p>
-      </dgm:t>
-    </dgm:pt>
-    <dgm:pt modelId="{796F9AEA-2307-4E83-B031-843E229EF9B4}" type="sibTrans" cxnId="{D3846676-E3F8-436D-99F7-442468769D5C}">
-      <dgm:prSet/>
-      <dgm:spPr/>
-      <dgm:t>
-        <a:bodyPr/>
-        <a:lstStyle/>
-        <a:p>
-          <a:endParaRPr lang="de-DE"/>
-        </a:p>
-      </dgm:t>
-    </dgm:pt>
-    <dgm:pt modelId="{C7DB6D70-8185-4A8D-B6C4-31A38212C308}">
-      <dgm:prSet custT="1"/>
-      <dgm:spPr/>
-      <dgm:t>
-        <a:bodyPr/>
-        <a:lstStyle/>
-        <a:p>
-          <a:r>
-            <a:rPr lang="de-DE" sz="2100" u="none" dirty="0"/>
-            <a:t>2. Datensatz mit bekannten </a:t>
-          </a:r>
-          <a:r>
-            <a:rPr lang="de-DE" sz="2100" u="none" dirty="0" err="1"/>
-            <a:t>Biases</a:t>
-          </a:r>
-          <a:r>
-            <a:rPr lang="de-DE" sz="2100" u="none" dirty="0"/>
-            <a:t> und bereinigte Version des Datensatzes</a:t>
-          </a:r>
-        </a:p>
-      </dgm:t>
-    </dgm:pt>
-    <dgm:pt modelId="{C81ACE72-7B0A-4A37-A17D-9B9544AC20E3}" type="parTrans" cxnId="{2BA176E2-74B4-4346-A7EB-D8495407AFA7}">
-      <dgm:prSet/>
-      <dgm:spPr/>
-      <dgm:t>
-        <a:bodyPr/>
-        <a:lstStyle/>
-        <a:p>
-          <a:endParaRPr lang="de-DE"/>
-        </a:p>
-      </dgm:t>
-    </dgm:pt>
-    <dgm:pt modelId="{5E4D73C5-007E-47C3-BB5B-AF5C44C34551}" type="sibTrans" cxnId="{2BA176E2-74B4-4346-A7EB-D8495407AFA7}">
-      <dgm:prSet/>
-      <dgm:spPr/>
-      <dgm:t>
-        <a:bodyPr/>
-        <a:lstStyle/>
-        <a:p>
-          <a:endParaRPr lang="de-DE"/>
-        </a:p>
-      </dgm:t>
-    </dgm:pt>
-    <dgm:pt modelId="{CA4C151A-4C6E-43C5-AB33-6ADA8C9CC8A3}">
-      <dgm:prSet custT="1"/>
-      <dgm:spPr/>
-      <dgm:t>
-        <a:bodyPr/>
-        <a:lstStyle/>
-        <a:p>
-          <a:r>
-            <a:rPr lang="de-DE" sz="1600" dirty="0"/>
-            <a:t>Gleiches Prozedere wie bei der ersten Art, aber darauffolgend wird dem Artefakt noch eine bereinigte Version von dem Datensatz übergeben. Die beiden Ergebnisse werden danach verglichen.</a:t>
-          </a:r>
-          <a:br>
-            <a:rPr lang="de-DE" sz="1600" dirty="0"/>
-          </a:br>
-          <a:r>
-            <a:rPr lang="de-DE" sz="1600" dirty="0"/>
-            <a:t>Bsp. Wenn ein Datensatz Frauen benachteiligt, der bereinigte Datensatz benachteiligt Frauen nicht mehr. Das Artefakt sollte bei beiden Datensätzen nicht das selbe Ergebnis liefern</a:t>
-          </a:r>
-          <a:endParaRPr lang="de-DE" sz="1600" u="sng" dirty="0"/>
-        </a:p>
-      </dgm:t>
-    </dgm:pt>
-    <dgm:pt modelId="{961109DA-A8FB-4CD4-AA12-0974740B48F0}" type="parTrans" cxnId="{89B305D6-8757-41CB-ACFB-E2EAD9A16289}">
-      <dgm:prSet/>
-      <dgm:spPr/>
-      <dgm:t>
-        <a:bodyPr/>
-        <a:lstStyle/>
-        <a:p>
-          <a:endParaRPr lang="de-DE"/>
-        </a:p>
-      </dgm:t>
-    </dgm:pt>
-    <dgm:pt modelId="{F8FF074A-BBC9-4009-BD05-11F7C85389F5}" type="sibTrans" cxnId="{89B305D6-8757-41CB-ACFB-E2EAD9A16289}">
-      <dgm:prSet/>
-      <dgm:spPr/>
-      <dgm:t>
-        <a:bodyPr/>
-        <a:lstStyle/>
-        <a:p>
-          <a:endParaRPr lang="de-DE"/>
-        </a:p>
-      </dgm:t>
-    </dgm:pt>
-    <dgm:pt modelId="{3B880D4F-5B2C-4A76-B221-50C8D9B9A35E}">
-      <dgm:prSet custT="1"/>
-      <dgm:spPr/>
-      <dgm:t>
-        <a:bodyPr/>
-        <a:lstStyle/>
-        <a:p>
-          <a:r>
-            <a:rPr lang="de-DE" sz="2100" u="none" dirty="0"/>
-            <a:t>3. Datensatz ohne bekannten Bias</a:t>
-          </a:r>
-        </a:p>
-      </dgm:t>
-    </dgm:pt>
-    <dgm:pt modelId="{1ADBA4A6-36CA-41E7-BCBB-C17D26ECB14A}" type="parTrans" cxnId="{FF993EBB-98E3-4A44-8F56-827756B77265}">
-      <dgm:prSet/>
-      <dgm:spPr/>
-      <dgm:t>
-        <a:bodyPr/>
-        <a:lstStyle/>
-        <a:p>
-          <a:endParaRPr lang="de-DE"/>
-        </a:p>
-      </dgm:t>
-    </dgm:pt>
-    <dgm:pt modelId="{7D646712-F59E-40AC-8298-7F499A9554DC}" type="sibTrans" cxnId="{FF993EBB-98E3-4A44-8F56-827756B77265}">
-      <dgm:prSet/>
-      <dgm:spPr/>
-      <dgm:t>
-        <a:bodyPr/>
-        <a:lstStyle/>
-        <a:p>
-          <a:endParaRPr lang="de-DE"/>
-        </a:p>
-      </dgm:t>
-    </dgm:pt>
-    <dgm:pt modelId="{5B5D6497-48FC-4D4C-9CC9-58EDE2BFFE04}">
-      <dgm:prSet custT="1"/>
-      <dgm:spPr/>
-      <dgm:t>
-        <a:bodyPr/>
-        <a:lstStyle/>
-        <a:p>
-          <a:r>
-            <a:rPr lang="de-DE" sz="1600" dirty="0"/>
-            <a:t>Gleicher Ablauf wie bei der ersten Art, nur sind keine Metainformationen vorhanden. Die Ergebnisse werden dann erfasst.</a:t>
-          </a:r>
-        </a:p>
-      </dgm:t>
-    </dgm:pt>
-    <dgm:pt modelId="{87540B26-7DEB-4C77-AD13-9F3530D51DD1}" type="parTrans" cxnId="{28A5B6FF-179C-46B8-9764-2DB2AF8500D4}">
-      <dgm:prSet/>
-      <dgm:spPr/>
-      <dgm:t>
-        <a:bodyPr/>
-        <a:lstStyle/>
-        <a:p>
-          <a:endParaRPr lang="de-DE"/>
-        </a:p>
-      </dgm:t>
-    </dgm:pt>
-    <dgm:pt modelId="{F22E4507-5B55-46F2-A2DB-390E208B8B87}" type="sibTrans" cxnId="{28A5B6FF-179C-46B8-9764-2DB2AF8500D4}">
-      <dgm:prSet/>
-      <dgm:spPr/>
-      <dgm:t>
-        <a:bodyPr/>
-        <a:lstStyle/>
-        <a:p>
-          <a:endParaRPr lang="de-DE"/>
-        </a:p>
-      </dgm:t>
-    </dgm:pt>
-    <dgm:pt modelId="{C2FA5577-DE80-4AD9-A974-E44324A5B61C}" type="pres">
-      <dgm:prSet presAssocID="{95987CFB-C787-4212-A142-D0D372ADBA16}" presName="linear" presStyleCnt="0">
-        <dgm:presLayoutVars>
-          <dgm:animLvl val="lvl"/>
-          <dgm:resizeHandles val="exact"/>
-        </dgm:presLayoutVars>
-      </dgm:prSet>
-      <dgm:spPr/>
-    </dgm:pt>
-    <dgm:pt modelId="{A9B0BCAB-5CCE-4FC9-A54E-F50BCAF94814}" type="pres">
-      <dgm:prSet presAssocID="{EA0F1308-7CE9-4B0D-B605-59DAD9D9B472}" presName="parentText" presStyleLbl="node1" presStyleIdx="0" presStyleCnt="3">
-        <dgm:presLayoutVars>
-          <dgm:chMax val="0"/>
-          <dgm:bulletEnabled val="1"/>
-        </dgm:presLayoutVars>
-      </dgm:prSet>
-      <dgm:spPr/>
-    </dgm:pt>
-    <dgm:pt modelId="{32C9EE75-A0BE-4BD4-B39B-CC6BA884D281}" type="pres">
-      <dgm:prSet presAssocID="{EA0F1308-7CE9-4B0D-B605-59DAD9D9B472}" presName="childText" presStyleLbl="revTx" presStyleIdx="0" presStyleCnt="3" custLinFactNeighborY="5248">
-        <dgm:presLayoutVars>
-          <dgm:bulletEnabled val="1"/>
-        </dgm:presLayoutVars>
-      </dgm:prSet>
-      <dgm:spPr/>
-    </dgm:pt>
-    <dgm:pt modelId="{59A4E54E-7941-4883-9367-F8FA043E8803}" type="pres">
-      <dgm:prSet presAssocID="{C7DB6D70-8185-4A8D-B6C4-31A38212C308}" presName="parentText" presStyleLbl="node1" presStyleIdx="1" presStyleCnt="3" custLinFactNeighborY="4216">
-        <dgm:presLayoutVars>
-          <dgm:chMax val="0"/>
-          <dgm:bulletEnabled val="1"/>
-        </dgm:presLayoutVars>
-      </dgm:prSet>
-      <dgm:spPr/>
-    </dgm:pt>
-    <dgm:pt modelId="{85EABC74-0301-42D3-B6C6-B80A35738FDB}" type="pres">
-      <dgm:prSet presAssocID="{C7DB6D70-8185-4A8D-B6C4-31A38212C308}" presName="childText" presStyleLbl="revTx" presStyleIdx="1" presStyleCnt="3" custLinFactNeighborY="6560">
-        <dgm:presLayoutVars>
-          <dgm:bulletEnabled val="1"/>
-        </dgm:presLayoutVars>
-      </dgm:prSet>
-      <dgm:spPr/>
-    </dgm:pt>
-    <dgm:pt modelId="{19091E62-5FD3-42FE-B4C7-36B2500CEFBD}" type="pres">
-      <dgm:prSet presAssocID="{3B880D4F-5B2C-4A76-B221-50C8D9B9A35E}" presName="parentText" presStyleLbl="node1" presStyleIdx="2" presStyleCnt="3" custLinFactNeighborY="4710">
-        <dgm:presLayoutVars>
-          <dgm:chMax val="0"/>
-          <dgm:bulletEnabled val="1"/>
-        </dgm:presLayoutVars>
-      </dgm:prSet>
-      <dgm:spPr/>
-    </dgm:pt>
-    <dgm:pt modelId="{31B992FA-1C71-4F0A-A331-B854503DAEC2}" type="pres">
-      <dgm:prSet presAssocID="{3B880D4F-5B2C-4A76-B221-50C8D9B9A35E}" presName="childText" presStyleLbl="revTx" presStyleIdx="2" presStyleCnt="3" custScaleY="82495" custLinFactNeighborY="2948">
-        <dgm:presLayoutVars>
-          <dgm:bulletEnabled val="1"/>
-        </dgm:presLayoutVars>
-      </dgm:prSet>
-      <dgm:spPr/>
-    </dgm:pt>
-  </dgm:ptLst>
-  <dgm:cxnLst>
-    <dgm:cxn modelId="{0E08640D-C4E8-4823-B341-AE0BEF483C5E}" type="presOf" srcId="{EA0F1308-7CE9-4B0D-B605-59DAD9D9B472}" destId="{A9B0BCAB-5CCE-4FC9-A54E-F50BCAF94814}" srcOrd="0" destOrd="0" presId="urn:microsoft.com/office/officeart/2005/8/layout/vList2"/>
-    <dgm:cxn modelId="{FCCE843D-D8E5-46E2-AA8E-E65CDE476698}" type="presOf" srcId="{515943EF-2265-4029-8F3B-D84FDE1F640A}" destId="{32C9EE75-A0BE-4BD4-B39B-CC6BA884D281}" srcOrd="0" destOrd="0" presId="urn:microsoft.com/office/officeart/2005/8/layout/vList2"/>
-    <dgm:cxn modelId="{DBF6B06D-CE83-4FE6-AB1E-94A412D92278}" srcId="{95987CFB-C787-4212-A142-D0D372ADBA16}" destId="{EA0F1308-7CE9-4B0D-B605-59DAD9D9B472}" srcOrd="0" destOrd="0" parTransId="{D0C33266-534C-4478-B794-1DF68BF4E91C}" sibTransId="{3FF746AB-FF94-4C11-9565-124A17FC87BE}"/>
-    <dgm:cxn modelId="{9F0E4B51-37CD-48F3-911A-8DAA40DB6769}" type="presOf" srcId="{3B880D4F-5B2C-4A76-B221-50C8D9B9A35E}" destId="{19091E62-5FD3-42FE-B4C7-36B2500CEFBD}" srcOrd="0" destOrd="0" presId="urn:microsoft.com/office/officeart/2005/8/layout/vList2"/>
-    <dgm:cxn modelId="{19771974-3812-4512-B29B-DDE41210E8A0}" type="presOf" srcId="{5B5D6497-48FC-4D4C-9CC9-58EDE2BFFE04}" destId="{31B992FA-1C71-4F0A-A331-B854503DAEC2}" srcOrd="0" destOrd="0" presId="urn:microsoft.com/office/officeart/2005/8/layout/vList2"/>
-    <dgm:cxn modelId="{D3846676-E3F8-436D-99F7-442468769D5C}" srcId="{EA0F1308-7CE9-4B0D-B605-59DAD9D9B472}" destId="{515943EF-2265-4029-8F3B-D84FDE1F640A}" srcOrd="0" destOrd="0" parTransId="{B65B5A59-8794-4D46-B4B6-F81628D6E7CB}" sibTransId="{796F9AEA-2307-4E83-B031-843E229EF9B4}"/>
-    <dgm:cxn modelId="{5482089A-E703-4BE3-BA56-AE7698B8E710}" type="presOf" srcId="{C7DB6D70-8185-4A8D-B6C4-31A38212C308}" destId="{59A4E54E-7941-4883-9367-F8FA043E8803}" srcOrd="0" destOrd="0" presId="urn:microsoft.com/office/officeart/2005/8/layout/vList2"/>
-    <dgm:cxn modelId="{06ED299C-7AE2-49A3-8C68-96FAF677D0E6}" type="presOf" srcId="{95987CFB-C787-4212-A142-D0D372ADBA16}" destId="{C2FA5577-DE80-4AD9-A974-E44324A5B61C}" srcOrd="0" destOrd="0" presId="urn:microsoft.com/office/officeart/2005/8/layout/vList2"/>
-    <dgm:cxn modelId="{FF993EBB-98E3-4A44-8F56-827756B77265}" srcId="{95987CFB-C787-4212-A142-D0D372ADBA16}" destId="{3B880D4F-5B2C-4A76-B221-50C8D9B9A35E}" srcOrd="2" destOrd="0" parTransId="{1ADBA4A6-36CA-41E7-BCBB-C17D26ECB14A}" sibTransId="{7D646712-F59E-40AC-8298-7F499A9554DC}"/>
-    <dgm:cxn modelId="{497EF2D1-719C-4110-B576-2C04FC3BF31A}" type="presOf" srcId="{CA4C151A-4C6E-43C5-AB33-6ADA8C9CC8A3}" destId="{85EABC74-0301-42D3-B6C6-B80A35738FDB}" srcOrd="0" destOrd="0" presId="urn:microsoft.com/office/officeart/2005/8/layout/vList2"/>
-    <dgm:cxn modelId="{89B305D6-8757-41CB-ACFB-E2EAD9A16289}" srcId="{C7DB6D70-8185-4A8D-B6C4-31A38212C308}" destId="{CA4C151A-4C6E-43C5-AB33-6ADA8C9CC8A3}" srcOrd="0" destOrd="0" parTransId="{961109DA-A8FB-4CD4-AA12-0974740B48F0}" sibTransId="{F8FF074A-BBC9-4009-BD05-11F7C85389F5}"/>
-    <dgm:cxn modelId="{2BA176E2-74B4-4346-A7EB-D8495407AFA7}" srcId="{95987CFB-C787-4212-A142-D0D372ADBA16}" destId="{C7DB6D70-8185-4A8D-B6C4-31A38212C308}" srcOrd="1" destOrd="0" parTransId="{C81ACE72-7B0A-4A37-A17D-9B9544AC20E3}" sibTransId="{5E4D73C5-007E-47C3-BB5B-AF5C44C34551}"/>
-    <dgm:cxn modelId="{28A5B6FF-179C-46B8-9764-2DB2AF8500D4}" srcId="{3B880D4F-5B2C-4A76-B221-50C8D9B9A35E}" destId="{5B5D6497-48FC-4D4C-9CC9-58EDE2BFFE04}" srcOrd="0" destOrd="0" parTransId="{87540B26-7DEB-4C77-AD13-9F3530D51DD1}" sibTransId="{F22E4507-5B55-46F2-A2DB-390E208B8B87}"/>
-    <dgm:cxn modelId="{B6996EBE-D250-4486-AE60-DA448560F6C8}" type="presParOf" srcId="{C2FA5577-DE80-4AD9-A974-E44324A5B61C}" destId="{A9B0BCAB-5CCE-4FC9-A54E-F50BCAF94814}" srcOrd="0" destOrd="0" presId="urn:microsoft.com/office/officeart/2005/8/layout/vList2"/>
-    <dgm:cxn modelId="{15A56C11-8702-4C6C-AA54-35AEF591DE5F}" type="presParOf" srcId="{C2FA5577-DE80-4AD9-A974-E44324A5B61C}" destId="{32C9EE75-A0BE-4BD4-B39B-CC6BA884D281}" srcOrd="1" destOrd="0" presId="urn:microsoft.com/office/officeart/2005/8/layout/vList2"/>
-    <dgm:cxn modelId="{02B31080-07BB-4A8A-A200-4F49520A9C4C}" type="presParOf" srcId="{C2FA5577-DE80-4AD9-A974-E44324A5B61C}" destId="{59A4E54E-7941-4883-9367-F8FA043E8803}" srcOrd="2" destOrd="0" presId="urn:microsoft.com/office/officeart/2005/8/layout/vList2"/>
-    <dgm:cxn modelId="{73A36ECB-4D79-4EEA-8F85-E30446693E86}" type="presParOf" srcId="{C2FA5577-DE80-4AD9-A974-E44324A5B61C}" destId="{85EABC74-0301-42D3-B6C6-B80A35738FDB}" srcOrd="3" destOrd="0" presId="urn:microsoft.com/office/officeart/2005/8/layout/vList2"/>
-    <dgm:cxn modelId="{772C9E97-BC02-46F6-85FC-E4D9F1DD5A8F}" type="presParOf" srcId="{C2FA5577-DE80-4AD9-A974-E44324A5B61C}" destId="{19091E62-5FD3-42FE-B4C7-36B2500CEFBD}" srcOrd="4" destOrd="0" presId="urn:microsoft.com/office/officeart/2005/8/layout/vList2"/>
-    <dgm:cxn modelId="{FD4CE585-6D24-47FE-B5A0-CA6AF8FE4B86}" type="presParOf" srcId="{C2FA5577-DE80-4AD9-A974-E44324A5B61C}" destId="{31B992FA-1C71-4F0A-A331-B854503DAEC2}" srcOrd="5" destOrd="0" presId="urn:microsoft.com/office/officeart/2005/8/layout/vList2"/>
-  </dgm:cxnLst>
-  <dgm:bg/>
-  <dgm:whole/>
-  <dgm:extLst>
-    <a:ext uri="http://schemas.microsoft.com/office/drawing/2008/diagram">
-      <dsp:dataModelExt xmlns:dsp="http://schemas.microsoft.com/office/drawing/2008/diagram" relId="rId6" minVer="http://schemas.openxmlformats.org/drawingml/2006/diagram"/>
-    </a:ext>
-  </dgm:extLst>
-</dgm:dataModel>
-</file>
-
 <file path=ppt/diagrams/drawing1.xml><?xml version="1.0" encoding="utf-8"?>
 <dsp:drawing xmlns:dgm="http://schemas.openxmlformats.org/drawingml/2006/diagram" xmlns:dsp="http://schemas.microsoft.com/office/drawing/2008/diagram" xmlns:a="http://schemas.openxmlformats.org/drawingml/2006/main">
   <dsp:spTree>
@@ -4989,461 +3884,6 @@
       <dsp:txXfrm>
         <a:off x="0" y="4391739"/>
         <a:ext cx="10896609" cy="269110"/>
-      </dsp:txXfrm>
-    </dsp:sp>
-  </dsp:spTree>
-</dsp:drawing>
-</file>
-
-<file path=ppt/diagrams/drawing3.xml><?xml version="1.0" encoding="utf-8"?>
-<dsp:drawing xmlns:dgm="http://schemas.openxmlformats.org/drawingml/2006/diagram" xmlns:dsp="http://schemas.microsoft.com/office/drawing/2008/diagram" xmlns:a="http://schemas.openxmlformats.org/drawingml/2006/main">
-  <dsp:spTree>
-    <dsp:nvGrpSpPr>
-      <dsp:cNvPr id="0" name=""/>
-      <dsp:cNvGrpSpPr/>
-    </dsp:nvGrpSpPr>
-    <dsp:grpSpPr/>
-    <dsp:sp modelId="{A9B0BCAB-5CCE-4FC9-A54E-F50BCAF94814}">
-      <dsp:nvSpPr>
-        <dsp:cNvPr id="0" name=""/>
-        <dsp:cNvSpPr/>
-      </dsp:nvSpPr>
-      <dsp:spPr>
-        <a:xfrm>
-          <a:off x="0" y="543"/>
-          <a:ext cx="11157741" cy="804960"/>
-        </a:xfrm>
-        <a:prstGeom prst="roundRect">
-          <a:avLst/>
-        </a:prstGeom>
-        <a:solidFill>
-          <a:schemeClr val="dk2">
-            <a:hueOff val="0"/>
-            <a:satOff val="0"/>
-            <a:lumOff val="0"/>
-            <a:alphaOff val="0"/>
-          </a:schemeClr>
-        </a:solidFill>
-        <a:ln w="12700" cap="flat" cmpd="sng" algn="ctr">
-          <a:solidFill>
-            <a:schemeClr val="lt2">
-              <a:hueOff val="0"/>
-              <a:satOff val="0"/>
-              <a:lumOff val="0"/>
-              <a:alphaOff val="0"/>
-            </a:schemeClr>
-          </a:solidFill>
-          <a:prstDash val="solid"/>
-          <a:miter lim="800000"/>
-        </a:ln>
-        <a:effectLst/>
-      </dsp:spPr>
-      <dsp:style>
-        <a:lnRef idx="2">
-          <a:scrgbClr r="0" g="0" b="0"/>
-        </a:lnRef>
-        <a:fillRef idx="1">
-          <a:scrgbClr r="0" g="0" b="0"/>
-        </a:fillRef>
-        <a:effectRef idx="0">
-          <a:scrgbClr r="0" g="0" b="0"/>
-        </a:effectRef>
-        <a:fontRef idx="minor">
-          <a:schemeClr val="lt1"/>
-        </a:fontRef>
-      </dsp:style>
-      <dsp:txBody>
-        <a:bodyPr spcFirstLastPara="0" vert="horz" wrap="square" lIns="80010" tIns="80010" rIns="80010" bIns="80010" numCol="1" spcCol="1270" anchor="ctr" anchorCtr="0">
-          <a:noAutofit/>
-        </a:bodyPr>
-        <a:lstStyle/>
-        <a:p>
-          <a:pPr marL="0" lvl="0" indent="0" algn="l" defTabSz="933450">
-            <a:lnSpc>
-              <a:spcPct val="90000"/>
-            </a:lnSpc>
-            <a:spcBef>
-              <a:spcPct val="0"/>
-            </a:spcBef>
-            <a:spcAft>
-              <a:spcPct val="35000"/>
-            </a:spcAft>
-            <a:buNone/>
-          </a:pPr>
-          <a:r>
-            <a:rPr lang="de-DE" sz="2100" u="none" kern="1200" dirty="0"/>
-            <a:t>1. Datensatz mit bekannten </a:t>
-          </a:r>
-          <a:r>
-            <a:rPr lang="de-DE" sz="2100" u="none" kern="1200" dirty="0" err="1"/>
-            <a:t>Biases</a:t>
-          </a:r>
-          <a:endParaRPr lang="de-DE" sz="2100" u="none" kern="1200" dirty="0"/>
-        </a:p>
-      </dsp:txBody>
-      <dsp:txXfrm>
-        <a:off x="39295" y="39838"/>
-        <a:ext cx="11079151" cy="726370"/>
-      </dsp:txXfrm>
-    </dsp:sp>
-    <dsp:sp modelId="{32C9EE75-A0BE-4BD4-B39B-CC6BA884D281}">
-      <dsp:nvSpPr>
-        <dsp:cNvPr id="0" name=""/>
-        <dsp:cNvSpPr/>
-      </dsp:nvSpPr>
-      <dsp:spPr>
-        <a:xfrm>
-          <a:off x="0" y="847747"/>
-          <a:ext cx="11157741" cy="890100"/>
-        </a:xfrm>
-        <a:prstGeom prst="rect">
-          <a:avLst/>
-        </a:prstGeom>
-        <a:noFill/>
-        <a:ln>
-          <a:noFill/>
-        </a:ln>
-        <a:effectLst/>
-      </dsp:spPr>
-      <dsp:style>
-        <a:lnRef idx="0">
-          <a:scrgbClr r="0" g="0" b="0"/>
-        </a:lnRef>
-        <a:fillRef idx="0">
-          <a:scrgbClr r="0" g="0" b="0"/>
-        </a:fillRef>
-        <a:effectRef idx="0">
-          <a:scrgbClr r="0" g="0" b="0"/>
-        </a:effectRef>
-        <a:fontRef idx="minor"/>
-      </dsp:style>
-      <dsp:txBody>
-        <a:bodyPr spcFirstLastPara="0" vert="horz" wrap="square" lIns="354258" tIns="20320" rIns="113792" bIns="20320" numCol="1" spcCol="1270" anchor="t" anchorCtr="0">
-          <a:noAutofit/>
-        </a:bodyPr>
-        <a:lstStyle/>
-        <a:p>
-          <a:pPr marL="171450" lvl="1" indent="-171450" algn="l" defTabSz="711200">
-            <a:lnSpc>
-              <a:spcPct val="90000"/>
-            </a:lnSpc>
-            <a:spcBef>
-              <a:spcPct val="0"/>
-            </a:spcBef>
-            <a:spcAft>
-              <a:spcPct val="20000"/>
-            </a:spcAft>
-            <a:buFont typeface="Arial" panose="020B0604020202020204" pitchFamily="34" charset="0"/>
-            <a:buChar char="•"/>
-          </a:pPr>
-          <a:r>
-            <a:rPr lang="de-DE" sz="1600" kern="1200" dirty="0"/>
-            <a:t>Der Datensatz wird dem Artefakt mit dem benötigten Kontext übergeben, das Ergebnis des Artefakts wird mit dem Metawissen über den Datensatz verglichen.</a:t>
-          </a:r>
-          <a:br>
-            <a:rPr lang="de-DE" sz="1600" kern="1200" dirty="0"/>
-          </a:br>
-          <a:r>
-            <a:rPr lang="de-DE" sz="1600" kern="1200" dirty="0"/>
-            <a:t>Bsp. Wenn ein Datensatz Frauen bei Beförderungen benachteiligen sollte, wir überprüft, ob das Artefakt das auch herausfinden kann</a:t>
-          </a:r>
-        </a:p>
-      </dsp:txBody>
-      <dsp:txXfrm>
-        <a:off x="0" y="847747"/>
-        <a:ext cx="11157741" cy="890100"/>
-      </dsp:txXfrm>
-    </dsp:sp>
-    <dsp:sp modelId="{59A4E54E-7941-4883-9367-F8FA043E8803}">
-      <dsp:nvSpPr>
-        <dsp:cNvPr id="0" name=""/>
-        <dsp:cNvSpPr/>
-      </dsp:nvSpPr>
-      <dsp:spPr>
-        <a:xfrm>
-          <a:off x="0" y="1733129"/>
-          <a:ext cx="11157741" cy="804960"/>
-        </a:xfrm>
-        <a:prstGeom prst="roundRect">
-          <a:avLst/>
-        </a:prstGeom>
-        <a:solidFill>
-          <a:schemeClr val="dk2">
-            <a:hueOff val="0"/>
-            <a:satOff val="0"/>
-            <a:lumOff val="0"/>
-            <a:alphaOff val="0"/>
-          </a:schemeClr>
-        </a:solidFill>
-        <a:ln w="12700" cap="flat" cmpd="sng" algn="ctr">
-          <a:solidFill>
-            <a:schemeClr val="lt2">
-              <a:hueOff val="0"/>
-              <a:satOff val="0"/>
-              <a:lumOff val="0"/>
-              <a:alphaOff val="0"/>
-            </a:schemeClr>
-          </a:solidFill>
-          <a:prstDash val="solid"/>
-          <a:miter lim="800000"/>
-        </a:ln>
-        <a:effectLst/>
-      </dsp:spPr>
-      <dsp:style>
-        <a:lnRef idx="2">
-          <a:scrgbClr r="0" g="0" b="0"/>
-        </a:lnRef>
-        <a:fillRef idx="1">
-          <a:scrgbClr r="0" g="0" b="0"/>
-        </a:fillRef>
-        <a:effectRef idx="0">
-          <a:scrgbClr r="0" g="0" b="0"/>
-        </a:effectRef>
-        <a:fontRef idx="minor">
-          <a:schemeClr val="lt1"/>
-        </a:fontRef>
-      </dsp:style>
-      <dsp:txBody>
-        <a:bodyPr spcFirstLastPara="0" vert="horz" wrap="square" lIns="80010" tIns="80010" rIns="80010" bIns="80010" numCol="1" spcCol="1270" anchor="ctr" anchorCtr="0">
-          <a:noAutofit/>
-        </a:bodyPr>
-        <a:lstStyle/>
-        <a:p>
-          <a:pPr marL="0" lvl="0" indent="0" algn="l" defTabSz="933450">
-            <a:lnSpc>
-              <a:spcPct val="90000"/>
-            </a:lnSpc>
-            <a:spcBef>
-              <a:spcPct val="0"/>
-            </a:spcBef>
-            <a:spcAft>
-              <a:spcPct val="35000"/>
-            </a:spcAft>
-            <a:buNone/>
-          </a:pPr>
-          <a:r>
-            <a:rPr lang="de-DE" sz="2100" u="none" kern="1200" dirty="0"/>
-            <a:t>2. Datensatz mit bekannten </a:t>
-          </a:r>
-          <a:r>
-            <a:rPr lang="de-DE" sz="2100" u="none" kern="1200" dirty="0" err="1"/>
-            <a:t>Biases</a:t>
-          </a:r>
-          <a:r>
-            <a:rPr lang="de-DE" sz="2100" u="none" kern="1200" dirty="0"/>
-            <a:t> und bereinigte Version des Datensatzes</a:t>
-          </a:r>
-        </a:p>
-      </dsp:txBody>
-      <dsp:txXfrm>
-        <a:off x="39295" y="1772424"/>
-        <a:ext cx="11079151" cy="726370"/>
-      </dsp:txXfrm>
-    </dsp:sp>
-    <dsp:sp modelId="{85EABC74-0301-42D3-B6C6-B80A35738FDB}">
-      <dsp:nvSpPr>
-        <dsp:cNvPr id="0" name=""/>
-        <dsp:cNvSpPr/>
-      </dsp:nvSpPr>
-      <dsp:spPr>
-        <a:xfrm>
-          <a:off x="0" y="2553368"/>
-          <a:ext cx="11157741" cy="890100"/>
-        </a:xfrm>
-        <a:prstGeom prst="rect">
-          <a:avLst/>
-        </a:prstGeom>
-        <a:noFill/>
-        <a:ln>
-          <a:noFill/>
-        </a:ln>
-        <a:effectLst/>
-      </dsp:spPr>
-      <dsp:style>
-        <a:lnRef idx="0">
-          <a:scrgbClr r="0" g="0" b="0"/>
-        </a:lnRef>
-        <a:fillRef idx="0">
-          <a:scrgbClr r="0" g="0" b="0"/>
-        </a:fillRef>
-        <a:effectRef idx="0">
-          <a:scrgbClr r="0" g="0" b="0"/>
-        </a:effectRef>
-        <a:fontRef idx="minor"/>
-      </dsp:style>
-      <dsp:txBody>
-        <a:bodyPr spcFirstLastPara="0" vert="horz" wrap="square" lIns="354258" tIns="20320" rIns="113792" bIns="20320" numCol="1" spcCol="1270" anchor="t" anchorCtr="0">
-          <a:noAutofit/>
-        </a:bodyPr>
-        <a:lstStyle/>
-        <a:p>
-          <a:pPr marL="171450" lvl="1" indent="-171450" algn="l" defTabSz="711200">
-            <a:lnSpc>
-              <a:spcPct val="90000"/>
-            </a:lnSpc>
-            <a:spcBef>
-              <a:spcPct val="0"/>
-            </a:spcBef>
-            <a:spcAft>
-              <a:spcPct val="20000"/>
-            </a:spcAft>
-            <a:buChar char="•"/>
-          </a:pPr>
-          <a:r>
-            <a:rPr lang="de-DE" sz="1600" kern="1200" dirty="0"/>
-            <a:t>Gleiches Prozedere wie bei der ersten Art, aber darauffolgend wird dem Artefakt noch eine bereinigte Version von dem Datensatz übergeben. Die beiden Ergebnisse werden danach verglichen.</a:t>
-          </a:r>
-          <a:br>
-            <a:rPr lang="de-DE" sz="1600" kern="1200" dirty="0"/>
-          </a:br>
-          <a:r>
-            <a:rPr lang="de-DE" sz="1600" kern="1200" dirty="0"/>
-            <a:t>Bsp. Wenn ein Datensatz Frauen benachteiligt, der bereinigte Datensatz benachteiligt Frauen nicht mehr. Das Artefakt sollte bei beiden Datensätzen nicht das selbe Ergebnis liefern</a:t>
-          </a:r>
-          <a:endParaRPr lang="de-DE" sz="1600" u="sng" kern="1200" dirty="0"/>
-        </a:p>
-      </dsp:txBody>
-      <dsp:txXfrm>
-        <a:off x="0" y="2553368"/>
-        <a:ext cx="11157741" cy="890100"/>
-      </dsp:txXfrm>
-    </dsp:sp>
-    <dsp:sp modelId="{19091E62-5FD3-42FE-B4C7-36B2500CEFBD}">
-      <dsp:nvSpPr>
-        <dsp:cNvPr id="0" name=""/>
-        <dsp:cNvSpPr/>
-      </dsp:nvSpPr>
-      <dsp:spPr>
-        <a:xfrm>
-          <a:off x="0" y="3424202"/>
-          <a:ext cx="11157741" cy="804960"/>
-        </a:xfrm>
-        <a:prstGeom prst="roundRect">
-          <a:avLst/>
-        </a:prstGeom>
-        <a:solidFill>
-          <a:schemeClr val="dk2">
-            <a:hueOff val="0"/>
-            <a:satOff val="0"/>
-            <a:lumOff val="0"/>
-            <a:alphaOff val="0"/>
-          </a:schemeClr>
-        </a:solidFill>
-        <a:ln w="12700" cap="flat" cmpd="sng" algn="ctr">
-          <a:solidFill>
-            <a:schemeClr val="lt2">
-              <a:hueOff val="0"/>
-              <a:satOff val="0"/>
-              <a:lumOff val="0"/>
-              <a:alphaOff val="0"/>
-            </a:schemeClr>
-          </a:solidFill>
-          <a:prstDash val="solid"/>
-          <a:miter lim="800000"/>
-        </a:ln>
-        <a:effectLst/>
-      </dsp:spPr>
-      <dsp:style>
-        <a:lnRef idx="2">
-          <a:scrgbClr r="0" g="0" b="0"/>
-        </a:lnRef>
-        <a:fillRef idx="1">
-          <a:scrgbClr r="0" g="0" b="0"/>
-        </a:fillRef>
-        <a:effectRef idx="0">
-          <a:scrgbClr r="0" g="0" b="0"/>
-        </a:effectRef>
-        <a:fontRef idx="minor">
-          <a:schemeClr val="lt1"/>
-        </a:fontRef>
-      </dsp:style>
-      <dsp:txBody>
-        <a:bodyPr spcFirstLastPara="0" vert="horz" wrap="square" lIns="80010" tIns="80010" rIns="80010" bIns="80010" numCol="1" spcCol="1270" anchor="ctr" anchorCtr="0">
-          <a:noAutofit/>
-        </a:bodyPr>
-        <a:lstStyle/>
-        <a:p>
-          <a:pPr marL="0" lvl="0" indent="0" algn="l" defTabSz="933450">
-            <a:lnSpc>
-              <a:spcPct val="90000"/>
-            </a:lnSpc>
-            <a:spcBef>
-              <a:spcPct val="0"/>
-            </a:spcBef>
-            <a:spcAft>
-              <a:spcPct val="35000"/>
-            </a:spcAft>
-            <a:buNone/>
-          </a:pPr>
-          <a:r>
-            <a:rPr lang="de-DE" sz="2100" u="none" kern="1200" dirty="0"/>
-            <a:t>3. Datensatz ohne bekannten Bias</a:t>
-          </a:r>
-        </a:p>
-      </dsp:txBody>
-      <dsp:txXfrm>
-        <a:off x="39295" y="3463497"/>
-        <a:ext cx="11079151" cy="726370"/>
-      </dsp:txXfrm>
-    </dsp:sp>
-    <dsp:sp modelId="{31B992FA-1C71-4F0A-A331-B854503DAEC2}">
-      <dsp:nvSpPr>
-        <dsp:cNvPr id="0" name=""/>
-        <dsp:cNvSpPr/>
-      </dsp:nvSpPr>
-      <dsp:spPr>
-        <a:xfrm>
-          <a:off x="0" y="4196166"/>
-          <a:ext cx="11157741" cy="587430"/>
-        </a:xfrm>
-        <a:prstGeom prst="rect">
-          <a:avLst/>
-        </a:prstGeom>
-        <a:noFill/>
-        <a:ln>
-          <a:noFill/>
-        </a:ln>
-        <a:effectLst/>
-      </dsp:spPr>
-      <dsp:style>
-        <a:lnRef idx="0">
-          <a:scrgbClr r="0" g="0" b="0"/>
-        </a:lnRef>
-        <a:fillRef idx="0">
-          <a:scrgbClr r="0" g="0" b="0"/>
-        </a:fillRef>
-        <a:effectRef idx="0">
-          <a:scrgbClr r="0" g="0" b="0"/>
-        </a:effectRef>
-        <a:fontRef idx="minor"/>
-      </dsp:style>
-      <dsp:txBody>
-        <a:bodyPr spcFirstLastPara="0" vert="horz" wrap="square" lIns="354258" tIns="20320" rIns="113792" bIns="20320" numCol="1" spcCol="1270" anchor="t" anchorCtr="0">
-          <a:noAutofit/>
-        </a:bodyPr>
-        <a:lstStyle/>
-        <a:p>
-          <a:pPr marL="171450" lvl="1" indent="-171450" algn="l" defTabSz="711200">
-            <a:lnSpc>
-              <a:spcPct val="90000"/>
-            </a:lnSpc>
-            <a:spcBef>
-              <a:spcPct val="0"/>
-            </a:spcBef>
-            <a:spcAft>
-              <a:spcPct val="20000"/>
-            </a:spcAft>
-            <a:buChar char="•"/>
-          </a:pPr>
-          <a:r>
-            <a:rPr lang="de-DE" sz="1600" kern="1200" dirty="0"/>
-            <a:t>Gleicher Ablauf wie bei der ersten Art, nur sind keine Metainformationen vorhanden. Die Ergebnisse werden dann erfasst.</a:t>
-          </a:r>
-        </a:p>
-      </dsp:txBody>
-      <dsp:txXfrm>
-        <a:off x="0" y="4196166"/>
-        <a:ext cx="11157741" cy="587430"/>
       </dsp:txXfrm>
     </dsp:sp>
   </dsp:spTree>
@@ -6729,173 +5169,6 @@
 </file>
 
 <file path=ppt/diagrams/layout2.xml><?xml version="1.0" encoding="utf-8"?>
-<dgm:layoutDef xmlns:dgm="http://schemas.openxmlformats.org/drawingml/2006/diagram" xmlns:a="http://schemas.openxmlformats.org/drawingml/2006/main" uniqueId="urn:microsoft.com/office/officeart/2005/8/layout/vList2">
-  <dgm:title val=""/>
-  <dgm:desc val=""/>
-  <dgm:catLst>
-    <dgm:cat type="list" pri="3000"/>
-    <dgm:cat type="convert" pri="1000"/>
-  </dgm:catLst>
-  <dgm:sampData>
-    <dgm:dataModel>
-      <dgm:ptLst>
-        <dgm:pt modelId="0" type="doc"/>
-        <dgm:pt modelId="1">
-          <dgm:prSet phldr="1"/>
-        </dgm:pt>
-        <dgm:pt modelId="11">
-          <dgm:prSet phldr="1"/>
-        </dgm:pt>
-        <dgm:pt modelId="2">
-          <dgm:prSet phldr="1"/>
-        </dgm:pt>
-        <dgm:pt modelId="21">
-          <dgm:prSet phldr="1"/>
-        </dgm:pt>
-      </dgm:ptLst>
-      <dgm:cxnLst>
-        <dgm:cxn modelId="4" srcId="0" destId="1" srcOrd="0" destOrd="0"/>
-        <dgm:cxn modelId="5" srcId="0" destId="2" srcOrd="1" destOrd="0"/>
-        <dgm:cxn modelId="12" srcId="1" destId="11" srcOrd="0" destOrd="0"/>
-        <dgm:cxn modelId="23" srcId="2" destId="21" srcOrd="0" destOrd="0"/>
-      </dgm:cxnLst>
-      <dgm:bg/>
-      <dgm:whole/>
-    </dgm:dataModel>
-  </dgm:sampData>
-  <dgm:styleData>
-    <dgm:dataModel>
-      <dgm:ptLst>
-        <dgm:pt modelId="0" type="doc"/>
-        <dgm:pt modelId="1"/>
-        <dgm:pt modelId="2"/>
-      </dgm:ptLst>
-      <dgm:cxnLst>
-        <dgm:cxn modelId="3" srcId="0" destId="1" srcOrd="0" destOrd="0"/>
-        <dgm:cxn modelId="4" srcId="0" destId="2" srcOrd="1" destOrd="0"/>
-      </dgm:cxnLst>
-      <dgm:bg/>
-      <dgm:whole/>
-    </dgm:dataModel>
-  </dgm:styleData>
-  <dgm:clrData>
-    <dgm:dataModel>
-      <dgm:ptLst>
-        <dgm:pt modelId="0" type="doc"/>
-        <dgm:pt modelId="1"/>
-        <dgm:pt modelId="2"/>
-        <dgm:pt modelId="3"/>
-        <dgm:pt modelId="4"/>
-      </dgm:ptLst>
-      <dgm:cxnLst>
-        <dgm:cxn modelId="5" srcId="0" destId="1" srcOrd="0" destOrd="0"/>
-        <dgm:cxn modelId="6" srcId="0" destId="2" srcOrd="1" destOrd="0"/>
-        <dgm:cxn modelId="7" srcId="0" destId="3" srcOrd="2" destOrd="0"/>
-        <dgm:cxn modelId="8" srcId="0" destId="4" srcOrd="3" destOrd="0"/>
-      </dgm:cxnLst>
-      <dgm:bg/>
-      <dgm:whole/>
-    </dgm:dataModel>
-  </dgm:clrData>
-  <dgm:layoutNode name="linear">
-    <dgm:varLst>
-      <dgm:animLvl val="lvl"/>
-      <dgm:resizeHandles val="exact"/>
-    </dgm:varLst>
-    <dgm:alg type="lin">
-      <dgm:param type="linDir" val="fromT"/>
-      <dgm:param type="vertAlign" val="mid"/>
-    </dgm:alg>
-    <dgm:shape xmlns:r="http://schemas.openxmlformats.org/officeDocument/2006/relationships" r:blip="">
-      <dgm:adjLst/>
-    </dgm:shape>
-    <dgm:presOf/>
-    <dgm:constrLst>
-      <dgm:constr type="w" for="ch" forName="parentText" refType="w"/>
-      <dgm:constr type="h" for="ch" forName="parentText" refType="primFontSz" refFor="ch" refForName="parentText" fact="0.52"/>
-      <dgm:constr type="w" for="ch" forName="childText" refType="w"/>
-      <dgm:constr type="h" for="ch" forName="childText" refType="primFontSz" refFor="ch" refForName="parentText" fact="0.46"/>
-      <dgm:constr type="h" for="ch" forName="parentText" op="equ"/>
-      <dgm:constr type="primFontSz" for="ch" forName="parentText" op="equ" val="65"/>
-      <dgm:constr type="primFontSz" for="ch" forName="childText" refType="primFontSz" refFor="ch" refForName="parentText" op="equ"/>
-      <dgm:constr type="h" for="ch" forName="spacer" refType="primFontSz" refFor="ch" refForName="parentText" fact="0.08"/>
-    </dgm:constrLst>
-    <dgm:ruleLst>
-      <dgm:rule type="primFontSz" for="ch" forName="parentText" val="5" fact="NaN" max="NaN"/>
-    </dgm:ruleLst>
-    <dgm:forEach name="Name0" axis="ch" ptType="node">
-      <dgm:layoutNode name="parentText" styleLbl="node1">
-        <dgm:varLst>
-          <dgm:chMax val="0"/>
-          <dgm:bulletEnabled val="1"/>
-        </dgm:varLst>
-        <dgm:alg type="tx">
-          <dgm:param type="parTxLTRAlign" val="l"/>
-          <dgm:param type="parTxRTLAlign" val="r"/>
-        </dgm:alg>
-        <dgm:shape xmlns:r="http://schemas.openxmlformats.org/officeDocument/2006/relationships" type="roundRect" r:blip="">
-          <dgm:adjLst/>
-        </dgm:shape>
-        <dgm:presOf axis="self"/>
-        <dgm:constrLst>
-          <dgm:constr type="tMarg" refType="primFontSz" fact="0.3"/>
-          <dgm:constr type="bMarg" refType="primFontSz" fact="0.3"/>
-          <dgm:constr type="lMarg" refType="primFontSz" fact="0.3"/>
-          <dgm:constr type="rMarg" refType="primFontSz" fact="0.3"/>
-        </dgm:constrLst>
-        <dgm:ruleLst>
-          <dgm:rule type="h" val="INF" fact="NaN" max="NaN"/>
-        </dgm:ruleLst>
-      </dgm:layoutNode>
-      <dgm:choose name="Name1">
-        <dgm:if name="Name2" axis="ch" ptType="node" func="cnt" op="gte" val="1">
-          <dgm:layoutNode name="childText" styleLbl="revTx">
-            <dgm:varLst>
-              <dgm:bulletEnabled val="1"/>
-            </dgm:varLst>
-            <dgm:alg type="tx">
-              <dgm:param type="stBulletLvl" val="1"/>
-              <dgm:param type="lnSpAfChP" val="20"/>
-            </dgm:alg>
-            <dgm:shape xmlns:r="http://schemas.openxmlformats.org/officeDocument/2006/relationships" type="rect" r:blip="">
-              <dgm:adjLst/>
-            </dgm:shape>
-            <dgm:presOf axis="des" ptType="node"/>
-            <dgm:constrLst>
-              <dgm:constr type="tMarg" refType="primFontSz" fact="0.1"/>
-              <dgm:constr type="bMarg" refType="primFontSz" fact="0.1"/>
-              <dgm:constr type="lMarg" refType="w" fact="0.09"/>
-            </dgm:constrLst>
-            <dgm:ruleLst>
-              <dgm:rule type="h" val="INF" fact="NaN" max="NaN"/>
-            </dgm:ruleLst>
-          </dgm:layoutNode>
-        </dgm:if>
-        <dgm:else name="Name3">
-          <dgm:choose name="Name4">
-            <dgm:if name="Name5" axis="par ch" ptType="doc node" func="cnt" op="gte" val="2">
-              <dgm:forEach name="Name6" axis="followSib" ptType="sibTrans" cnt="1">
-                <dgm:layoutNode name="spacer">
-                  <dgm:alg type="sp"/>
-                  <dgm:shape xmlns:r="http://schemas.openxmlformats.org/officeDocument/2006/relationships" r:blip="">
-                    <dgm:adjLst/>
-                  </dgm:shape>
-                  <dgm:presOf/>
-                  <dgm:constrLst/>
-                  <dgm:ruleLst/>
-                </dgm:layoutNode>
-              </dgm:forEach>
-            </dgm:if>
-            <dgm:else name="Name7"/>
-          </dgm:choose>
-        </dgm:else>
-      </dgm:choose>
-    </dgm:forEach>
-  </dgm:layoutNode>
-</dgm:layoutDef>
-</file>
-
-<file path=ppt/diagrams/layout3.xml><?xml version="1.0" encoding="utf-8"?>
 <dgm:layoutDef xmlns:dgm="http://schemas.openxmlformats.org/drawingml/2006/diagram" xmlns:a="http://schemas.openxmlformats.org/drawingml/2006/main" uniqueId="urn:microsoft.com/office/officeart/2005/8/layout/vList2">
   <dgm:title val=""/>
   <dgm:desc val=""/>
@@ -9130,1040 +7403,6 @@
 </dgm:styleDef>
 </file>
 
-<file path=ppt/diagrams/quickStyle3.xml><?xml version="1.0" encoding="utf-8"?>
-<dgm:styleDef xmlns:dgm="http://schemas.openxmlformats.org/drawingml/2006/diagram" xmlns:a="http://schemas.openxmlformats.org/drawingml/2006/main" uniqueId="urn:microsoft.com/office/officeart/2005/8/quickstyle/simple1">
-  <dgm:title val=""/>
-  <dgm:desc val=""/>
-  <dgm:catLst>
-    <dgm:cat type="simple" pri="10100"/>
-  </dgm:catLst>
-  <dgm:scene3d>
-    <a:camera prst="orthographicFront"/>
-    <a:lightRig rig="threePt" dir="t"/>
-  </dgm:scene3d>
-  <dgm:styleLbl name="node0">
-    <dgm:scene3d>
-      <a:camera prst="orthographicFront"/>
-      <a:lightRig rig="threePt" dir="t"/>
-    </dgm:scene3d>
-    <dgm:sp3d/>
-    <dgm:txPr/>
-    <dgm:style>
-      <a:lnRef idx="2">
-        <a:scrgbClr r="0" g="0" b="0"/>
-      </a:lnRef>
-      <a:fillRef idx="1">
-        <a:scrgbClr r="0" g="0" b="0"/>
-      </a:fillRef>
-      <a:effectRef idx="0">
-        <a:scrgbClr r="0" g="0" b="0"/>
-      </a:effectRef>
-      <a:fontRef idx="minor">
-        <a:schemeClr val="lt1"/>
-      </a:fontRef>
-    </dgm:style>
-  </dgm:styleLbl>
-  <dgm:styleLbl name="lnNode1">
-    <dgm:scene3d>
-      <a:camera prst="orthographicFront"/>
-      <a:lightRig rig="threePt" dir="t"/>
-    </dgm:scene3d>
-    <dgm:sp3d/>
-    <dgm:txPr/>
-    <dgm:style>
-      <a:lnRef idx="2">
-        <a:scrgbClr r="0" g="0" b="0"/>
-      </a:lnRef>
-      <a:fillRef idx="1">
-        <a:scrgbClr r="0" g="0" b="0"/>
-      </a:fillRef>
-      <a:effectRef idx="0">
-        <a:scrgbClr r="0" g="0" b="0"/>
-      </a:effectRef>
-      <a:fontRef idx="minor">
-        <a:schemeClr val="lt1"/>
-      </a:fontRef>
-    </dgm:style>
-  </dgm:styleLbl>
-  <dgm:styleLbl name="vennNode1">
-    <dgm:scene3d>
-      <a:camera prst="orthographicFront"/>
-      <a:lightRig rig="threePt" dir="t"/>
-    </dgm:scene3d>
-    <dgm:sp3d/>
-    <dgm:txPr/>
-    <dgm:style>
-      <a:lnRef idx="2">
-        <a:scrgbClr r="0" g="0" b="0"/>
-      </a:lnRef>
-      <a:fillRef idx="1">
-        <a:scrgbClr r="0" g="0" b="0"/>
-      </a:fillRef>
-      <a:effectRef idx="0">
-        <a:scrgbClr r="0" g="0" b="0"/>
-      </a:effectRef>
-      <a:fontRef idx="minor">
-        <a:schemeClr val="tx1"/>
-      </a:fontRef>
-    </dgm:style>
-  </dgm:styleLbl>
-  <dgm:styleLbl name="alignNode1">
-    <dgm:scene3d>
-      <a:camera prst="orthographicFront"/>
-      <a:lightRig rig="threePt" dir="t"/>
-    </dgm:scene3d>
-    <dgm:sp3d/>
-    <dgm:txPr/>
-    <dgm:style>
-      <a:lnRef idx="2">
-        <a:scrgbClr r="0" g="0" b="0"/>
-      </a:lnRef>
-      <a:fillRef idx="1">
-        <a:scrgbClr r="0" g="0" b="0"/>
-      </a:fillRef>
-      <a:effectRef idx="0">
-        <a:scrgbClr r="0" g="0" b="0"/>
-      </a:effectRef>
-      <a:fontRef idx="minor">
-        <a:schemeClr val="lt1"/>
-      </a:fontRef>
-    </dgm:style>
-  </dgm:styleLbl>
-  <dgm:styleLbl name="node1">
-    <dgm:scene3d>
-      <a:camera prst="orthographicFront"/>
-      <a:lightRig rig="threePt" dir="t"/>
-    </dgm:scene3d>
-    <dgm:sp3d/>
-    <dgm:txPr/>
-    <dgm:style>
-      <a:lnRef idx="2">
-        <a:scrgbClr r="0" g="0" b="0"/>
-      </a:lnRef>
-      <a:fillRef idx="1">
-        <a:scrgbClr r="0" g="0" b="0"/>
-      </a:fillRef>
-      <a:effectRef idx="0">
-        <a:scrgbClr r="0" g="0" b="0"/>
-      </a:effectRef>
-      <a:fontRef idx="minor">
-        <a:schemeClr val="lt1"/>
-      </a:fontRef>
-    </dgm:style>
-  </dgm:styleLbl>
-  <dgm:styleLbl name="node2">
-    <dgm:scene3d>
-      <a:camera prst="orthographicFront"/>
-      <a:lightRig rig="threePt" dir="t"/>
-    </dgm:scene3d>
-    <dgm:sp3d/>
-    <dgm:txPr/>
-    <dgm:style>
-      <a:lnRef idx="2">
-        <a:scrgbClr r="0" g="0" b="0"/>
-      </a:lnRef>
-      <a:fillRef idx="1">
-        <a:scrgbClr r="0" g="0" b="0"/>
-      </a:fillRef>
-      <a:effectRef idx="0">
-        <a:scrgbClr r="0" g="0" b="0"/>
-      </a:effectRef>
-      <a:fontRef idx="minor">
-        <a:schemeClr val="lt1"/>
-      </a:fontRef>
-    </dgm:style>
-  </dgm:styleLbl>
-  <dgm:styleLbl name="node3">
-    <dgm:scene3d>
-      <a:camera prst="orthographicFront"/>
-      <a:lightRig rig="threePt" dir="t"/>
-    </dgm:scene3d>
-    <dgm:sp3d/>
-    <dgm:txPr/>
-    <dgm:style>
-      <a:lnRef idx="2">
-        <a:scrgbClr r="0" g="0" b="0"/>
-      </a:lnRef>
-      <a:fillRef idx="1">
-        <a:scrgbClr r="0" g="0" b="0"/>
-      </a:fillRef>
-      <a:effectRef idx="0">
-        <a:scrgbClr r="0" g="0" b="0"/>
-      </a:effectRef>
-      <a:fontRef idx="minor">
-        <a:schemeClr val="lt1"/>
-      </a:fontRef>
-    </dgm:style>
-  </dgm:styleLbl>
-  <dgm:styleLbl name="node4">
-    <dgm:scene3d>
-      <a:camera prst="orthographicFront"/>
-      <a:lightRig rig="threePt" dir="t"/>
-    </dgm:scene3d>
-    <dgm:sp3d/>
-    <dgm:txPr/>
-    <dgm:style>
-      <a:lnRef idx="2">
-        <a:scrgbClr r="0" g="0" b="0"/>
-      </a:lnRef>
-      <a:fillRef idx="1">
-        <a:scrgbClr r="0" g="0" b="0"/>
-      </a:fillRef>
-      <a:effectRef idx="0">
-        <a:scrgbClr r="0" g="0" b="0"/>
-      </a:effectRef>
-      <a:fontRef idx="minor">
-        <a:schemeClr val="lt1"/>
-      </a:fontRef>
-    </dgm:style>
-  </dgm:styleLbl>
-  <dgm:styleLbl name="fgImgPlace1">
-    <dgm:scene3d>
-      <a:camera prst="orthographicFront"/>
-      <a:lightRig rig="threePt" dir="t"/>
-    </dgm:scene3d>
-    <dgm:sp3d/>
-    <dgm:txPr/>
-    <dgm:style>
-      <a:lnRef idx="2">
-        <a:scrgbClr r="0" g="0" b="0"/>
-      </a:lnRef>
-      <a:fillRef idx="1">
-        <a:scrgbClr r="0" g="0" b="0"/>
-      </a:fillRef>
-      <a:effectRef idx="0">
-        <a:scrgbClr r="0" g="0" b="0"/>
-      </a:effectRef>
-      <a:fontRef idx="minor"/>
-    </dgm:style>
-  </dgm:styleLbl>
-  <dgm:styleLbl name="alignImgPlace1">
-    <dgm:scene3d>
-      <a:camera prst="orthographicFront"/>
-      <a:lightRig rig="threePt" dir="t"/>
-    </dgm:scene3d>
-    <dgm:sp3d/>
-    <dgm:txPr/>
-    <dgm:style>
-      <a:lnRef idx="2">
-        <a:scrgbClr r="0" g="0" b="0"/>
-      </a:lnRef>
-      <a:fillRef idx="1">
-        <a:scrgbClr r="0" g="0" b="0"/>
-      </a:fillRef>
-      <a:effectRef idx="0">
-        <a:scrgbClr r="0" g="0" b="0"/>
-      </a:effectRef>
-      <a:fontRef idx="minor"/>
-    </dgm:style>
-  </dgm:styleLbl>
-  <dgm:styleLbl name="bgImgPlace1">
-    <dgm:scene3d>
-      <a:camera prst="orthographicFront"/>
-      <a:lightRig rig="threePt" dir="t"/>
-    </dgm:scene3d>
-    <dgm:sp3d/>
-    <dgm:txPr/>
-    <dgm:style>
-      <a:lnRef idx="2">
-        <a:scrgbClr r="0" g="0" b="0"/>
-      </a:lnRef>
-      <a:fillRef idx="1">
-        <a:scrgbClr r="0" g="0" b="0"/>
-      </a:fillRef>
-      <a:effectRef idx="0">
-        <a:scrgbClr r="0" g="0" b="0"/>
-      </a:effectRef>
-      <a:fontRef idx="minor"/>
-    </dgm:style>
-  </dgm:styleLbl>
-  <dgm:styleLbl name="sibTrans2D1">
-    <dgm:scene3d>
-      <a:camera prst="orthographicFront"/>
-      <a:lightRig rig="threePt" dir="t"/>
-    </dgm:scene3d>
-    <dgm:sp3d/>
-    <dgm:txPr/>
-    <dgm:style>
-      <a:lnRef idx="0">
-        <a:scrgbClr r="0" g="0" b="0"/>
-      </a:lnRef>
-      <a:fillRef idx="1">
-        <a:scrgbClr r="0" g="0" b="0"/>
-      </a:fillRef>
-      <a:effectRef idx="0">
-        <a:scrgbClr r="0" g="0" b="0"/>
-      </a:effectRef>
-      <a:fontRef idx="minor">
-        <a:schemeClr val="lt1"/>
-      </a:fontRef>
-    </dgm:style>
-  </dgm:styleLbl>
-  <dgm:styleLbl name="fgSibTrans2D1">
-    <dgm:scene3d>
-      <a:camera prst="orthographicFront"/>
-      <a:lightRig rig="threePt" dir="t"/>
-    </dgm:scene3d>
-    <dgm:sp3d/>
-    <dgm:txPr/>
-    <dgm:style>
-      <a:lnRef idx="0">
-        <a:scrgbClr r="0" g="0" b="0"/>
-      </a:lnRef>
-      <a:fillRef idx="1">
-        <a:scrgbClr r="0" g="0" b="0"/>
-      </a:fillRef>
-      <a:effectRef idx="0">
-        <a:scrgbClr r="0" g="0" b="0"/>
-      </a:effectRef>
-      <a:fontRef idx="minor">
-        <a:schemeClr val="lt1"/>
-      </a:fontRef>
-    </dgm:style>
-  </dgm:styleLbl>
-  <dgm:styleLbl name="bgSibTrans2D1">
-    <dgm:scene3d>
-      <a:camera prst="orthographicFront"/>
-      <a:lightRig rig="threePt" dir="t"/>
-    </dgm:scene3d>
-    <dgm:sp3d/>
-    <dgm:txPr/>
-    <dgm:style>
-      <a:lnRef idx="0">
-        <a:scrgbClr r="0" g="0" b="0"/>
-      </a:lnRef>
-      <a:fillRef idx="1">
-        <a:scrgbClr r="0" g="0" b="0"/>
-      </a:fillRef>
-      <a:effectRef idx="0">
-        <a:scrgbClr r="0" g="0" b="0"/>
-      </a:effectRef>
-      <a:fontRef idx="minor">
-        <a:schemeClr val="lt1"/>
-      </a:fontRef>
-    </dgm:style>
-  </dgm:styleLbl>
-  <dgm:styleLbl name="sibTrans1D1">
-    <dgm:scene3d>
-      <a:camera prst="orthographicFront"/>
-      <a:lightRig rig="threePt" dir="t"/>
-    </dgm:scene3d>
-    <dgm:sp3d/>
-    <dgm:txPr/>
-    <dgm:style>
-      <a:lnRef idx="1">
-        <a:scrgbClr r="0" g="0" b="0"/>
-      </a:lnRef>
-      <a:fillRef idx="0">
-        <a:scrgbClr r="0" g="0" b="0"/>
-      </a:fillRef>
-      <a:effectRef idx="0">
-        <a:scrgbClr r="0" g="0" b="0"/>
-      </a:effectRef>
-      <a:fontRef idx="minor"/>
-    </dgm:style>
-  </dgm:styleLbl>
-  <dgm:styleLbl name="callout">
-    <dgm:scene3d>
-      <a:camera prst="orthographicFront"/>
-      <a:lightRig rig="threePt" dir="t"/>
-    </dgm:scene3d>
-    <dgm:sp3d/>
-    <dgm:txPr/>
-    <dgm:style>
-      <a:lnRef idx="2">
-        <a:scrgbClr r="0" g="0" b="0"/>
-      </a:lnRef>
-      <a:fillRef idx="1">
-        <a:scrgbClr r="0" g="0" b="0"/>
-      </a:fillRef>
-      <a:effectRef idx="0">
-        <a:scrgbClr r="0" g="0" b="0"/>
-      </a:effectRef>
-      <a:fontRef idx="minor"/>
-    </dgm:style>
-  </dgm:styleLbl>
-  <dgm:styleLbl name="asst0">
-    <dgm:scene3d>
-      <a:camera prst="orthographicFront"/>
-      <a:lightRig rig="threePt" dir="t"/>
-    </dgm:scene3d>
-    <dgm:sp3d/>
-    <dgm:txPr/>
-    <dgm:style>
-      <a:lnRef idx="2">
-        <a:scrgbClr r="0" g="0" b="0"/>
-      </a:lnRef>
-      <a:fillRef idx="1">
-        <a:scrgbClr r="0" g="0" b="0"/>
-      </a:fillRef>
-      <a:effectRef idx="0">
-        <a:scrgbClr r="0" g="0" b="0"/>
-      </a:effectRef>
-      <a:fontRef idx="minor">
-        <a:schemeClr val="lt1"/>
-      </a:fontRef>
-    </dgm:style>
-  </dgm:styleLbl>
-  <dgm:styleLbl name="asst1">
-    <dgm:scene3d>
-      <a:camera prst="orthographicFront"/>
-      <a:lightRig rig="threePt" dir="t"/>
-    </dgm:scene3d>
-    <dgm:sp3d/>
-    <dgm:txPr/>
-    <dgm:style>
-      <a:lnRef idx="2">
-        <a:scrgbClr r="0" g="0" b="0"/>
-      </a:lnRef>
-      <a:fillRef idx="1">
-        <a:scrgbClr r="0" g="0" b="0"/>
-      </a:fillRef>
-      <a:effectRef idx="0">
-        <a:scrgbClr r="0" g="0" b="0"/>
-      </a:effectRef>
-      <a:fontRef idx="minor">
-        <a:schemeClr val="lt1"/>
-      </a:fontRef>
-    </dgm:style>
-  </dgm:styleLbl>
-  <dgm:styleLbl name="asst2">
-    <dgm:scene3d>
-      <a:camera prst="orthographicFront"/>
-      <a:lightRig rig="threePt" dir="t"/>
-    </dgm:scene3d>
-    <dgm:sp3d/>
-    <dgm:txPr/>
-    <dgm:style>
-      <a:lnRef idx="2">
-        <a:scrgbClr r="0" g="0" b="0"/>
-      </a:lnRef>
-      <a:fillRef idx="1">
-        <a:scrgbClr r="0" g="0" b="0"/>
-      </a:fillRef>
-      <a:effectRef idx="0">
-        <a:scrgbClr r="0" g="0" b="0"/>
-      </a:effectRef>
-      <a:fontRef idx="minor">
-        <a:schemeClr val="lt1"/>
-      </a:fontRef>
-    </dgm:style>
-  </dgm:styleLbl>
-  <dgm:styleLbl name="asst3">
-    <dgm:scene3d>
-      <a:camera prst="orthographicFront"/>
-      <a:lightRig rig="threePt" dir="t"/>
-    </dgm:scene3d>
-    <dgm:sp3d/>
-    <dgm:txPr/>
-    <dgm:style>
-      <a:lnRef idx="2">
-        <a:scrgbClr r="0" g="0" b="0"/>
-      </a:lnRef>
-      <a:fillRef idx="1">
-        <a:scrgbClr r="0" g="0" b="0"/>
-      </a:fillRef>
-      <a:effectRef idx="0">
-        <a:scrgbClr r="0" g="0" b="0"/>
-      </a:effectRef>
-      <a:fontRef idx="minor">
-        <a:schemeClr val="lt1"/>
-      </a:fontRef>
-    </dgm:style>
-  </dgm:styleLbl>
-  <dgm:styleLbl name="asst4">
-    <dgm:scene3d>
-      <a:camera prst="orthographicFront"/>
-      <a:lightRig rig="threePt" dir="t"/>
-    </dgm:scene3d>
-    <dgm:sp3d/>
-    <dgm:txPr/>
-    <dgm:style>
-      <a:lnRef idx="2">
-        <a:scrgbClr r="0" g="0" b="0"/>
-      </a:lnRef>
-      <a:fillRef idx="1">
-        <a:scrgbClr r="0" g="0" b="0"/>
-      </a:fillRef>
-      <a:effectRef idx="0">
-        <a:scrgbClr r="0" g="0" b="0"/>
-      </a:effectRef>
-      <a:fontRef idx="minor">
-        <a:schemeClr val="lt1"/>
-      </a:fontRef>
-    </dgm:style>
-  </dgm:styleLbl>
-  <dgm:styleLbl name="parChTrans2D1">
-    <dgm:scene3d>
-      <a:camera prst="orthographicFront"/>
-      <a:lightRig rig="threePt" dir="t"/>
-    </dgm:scene3d>
-    <dgm:sp3d/>
-    <dgm:txPr/>
-    <dgm:style>
-      <a:lnRef idx="2">
-        <a:scrgbClr r="0" g="0" b="0"/>
-      </a:lnRef>
-      <a:fillRef idx="1">
-        <a:scrgbClr r="0" g="0" b="0"/>
-      </a:fillRef>
-      <a:effectRef idx="0">
-        <a:scrgbClr r="0" g="0" b="0"/>
-      </a:effectRef>
-      <a:fontRef idx="minor">
-        <a:schemeClr val="lt1"/>
-      </a:fontRef>
-    </dgm:style>
-  </dgm:styleLbl>
-  <dgm:styleLbl name="parChTrans2D2">
-    <dgm:scene3d>
-      <a:camera prst="orthographicFront"/>
-      <a:lightRig rig="threePt" dir="t"/>
-    </dgm:scene3d>
-    <dgm:sp3d/>
-    <dgm:txPr/>
-    <dgm:style>
-      <a:lnRef idx="2">
-        <a:scrgbClr r="0" g="0" b="0"/>
-      </a:lnRef>
-      <a:fillRef idx="1">
-        <a:scrgbClr r="0" g="0" b="0"/>
-      </a:fillRef>
-      <a:effectRef idx="0">
-        <a:scrgbClr r="0" g="0" b="0"/>
-      </a:effectRef>
-      <a:fontRef idx="minor">
-        <a:schemeClr val="lt1"/>
-      </a:fontRef>
-    </dgm:style>
-  </dgm:styleLbl>
-  <dgm:styleLbl name="parChTrans2D3">
-    <dgm:scene3d>
-      <a:camera prst="orthographicFront"/>
-      <a:lightRig rig="threePt" dir="t"/>
-    </dgm:scene3d>
-    <dgm:sp3d/>
-    <dgm:txPr/>
-    <dgm:style>
-      <a:lnRef idx="2">
-        <a:scrgbClr r="0" g="0" b="0"/>
-      </a:lnRef>
-      <a:fillRef idx="1">
-        <a:scrgbClr r="0" g="0" b="0"/>
-      </a:fillRef>
-      <a:effectRef idx="0">
-        <a:scrgbClr r="0" g="0" b="0"/>
-      </a:effectRef>
-      <a:fontRef idx="minor">
-        <a:schemeClr val="lt1"/>
-      </a:fontRef>
-    </dgm:style>
-  </dgm:styleLbl>
-  <dgm:styleLbl name="parChTrans2D4">
-    <dgm:scene3d>
-      <a:camera prst="orthographicFront"/>
-      <a:lightRig rig="threePt" dir="t"/>
-    </dgm:scene3d>
-    <dgm:sp3d/>
-    <dgm:txPr/>
-    <dgm:style>
-      <a:lnRef idx="2">
-        <a:scrgbClr r="0" g="0" b="0"/>
-      </a:lnRef>
-      <a:fillRef idx="1">
-        <a:scrgbClr r="0" g="0" b="0"/>
-      </a:fillRef>
-      <a:effectRef idx="0">
-        <a:scrgbClr r="0" g="0" b="0"/>
-      </a:effectRef>
-      <a:fontRef idx="minor">
-        <a:schemeClr val="lt1"/>
-      </a:fontRef>
-    </dgm:style>
-  </dgm:styleLbl>
-  <dgm:styleLbl name="parChTrans1D1">
-    <dgm:scene3d>
-      <a:camera prst="orthographicFront"/>
-      <a:lightRig rig="threePt" dir="t"/>
-    </dgm:scene3d>
-    <dgm:sp3d/>
-    <dgm:txPr/>
-    <dgm:style>
-      <a:lnRef idx="2">
-        <a:scrgbClr r="0" g="0" b="0"/>
-      </a:lnRef>
-      <a:fillRef idx="0">
-        <a:scrgbClr r="0" g="0" b="0"/>
-      </a:fillRef>
-      <a:effectRef idx="0">
-        <a:scrgbClr r="0" g="0" b="0"/>
-      </a:effectRef>
-      <a:fontRef idx="minor"/>
-    </dgm:style>
-  </dgm:styleLbl>
-  <dgm:styleLbl name="parChTrans1D2">
-    <dgm:scene3d>
-      <a:camera prst="orthographicFront"/>
-      <a:lightRig rig="threePt" dir="t"/>
-    </dgm:scene3d>
-    <dgm:sp3d/>
-    <dgm:txPr/>
-    <dgm:style>
-      <a:lnRef idx="2">
-        <a:scrgbClr r="0" g="0" b="0"/>
-      </a:lnRef>
-      <a:fillRef idx="0">
-        <a:scrgbClr r="0" g="0" b="0"/>
-      </a:fillRef>
-      <a:effectRef idx="0">
-        <a:scrgbClr r="0" g="0" b="0"/>
-      </a:effectRef>
-      <a:fontRef idx="minor"/>
-    </dgm:style>
-  </dgm:styleLbl>
-  <dgm:styleLbl name="parChTrans1D3">
-    <dgm:scene3d>
-      <a:camera prst="orthographicFront"/>
-      <a:lightRig rig="threePt" dir="t"/>
-    </dgm:scene3d>
-    <dgm:sp3d/>
-    <dgm:txPr/>
-    <dgm:style>
-      <a:lnRef idx="2">
-        <a:scrgbClr r="0" g="0" b="0"/>
-      </a:lnRef>
-      <a:fillRef idx="0">
-        <a:scrgbClr r="0" g="0" b="0"/>
-      </a:fillRef>
-      <a:effectRef idx="0">
-        <a:scrgbClr r="0" g="0" b="0"/>
-      </a:effectRef>
-      <a:fontRef idx="minor"/>
-    </dgm:style>
-  </dgm:styleLbl>
-  <dgm:styleLbl name="parChTrans1D4">
-    <dgm:scene3d>
-      <a:camera prst="orthographicFront"/>
-      <a:lightRig rig="threePt" dir="t"/>
-    </dgm:scene3d>
-    <dgm:sp3d/>
-    <dgm:txPr/>
-    <dgm:style>
-      <a:lnRef idx="2">
-        <a:scrgbClr r="0" g="0" b="0"/>
-      </a:lnRef>
-      <a:fillRef idx="0">
-        <a:scrgbClr r="0" g="0" b="0"/>
-      </a:fillRef>
-      <a:effectRef idx="0">
-        <a:scrgbClr r="0" g="0" b="0"/>
-      </a:effectRef>
-      <a:fontRef idx="minor"/>
-    </dgm:style>
-  </dgm:styleLbl>
-  <dgm:styleLbl name="fgAcc1">
-    <dgm:scene3d>
-      <a:camera prst="orthographicFront"/>
-      <a:lightRig rig="threePt" dir="t"/>
-    </dgm:scene3d>
-    <dgm:sp3d/>
-    <dgm:txPr/>
-    <dgm:style>
-      <a:lnRef idx="2">
-        <a:scrgbClr r="0" g="0" b="0"/>
-      </a:lnRef>
-      <a:fillRef idx="1">
-        <a:scrgbClr r="0" g="0" b="0"/>
-      </a:fillRef>
-      <a:effectRef idx="0">
-        <a:scrgbClr r="0" g="0" b="0"/>
-      </a:effectRef>
-      <a:fontRef idx="minor"/>
-    </dgm:style>
-  </dgm:styleLbl>
-  <dgm:styleLbl name="conFgAcc1">
-    <dgm:scene3d>
-      <a:camera prst="orthographicFront"/>
-      <a:lightRig rig="threePt" dir="t"/>
-    </dgm:scene3d>
-    <dgm:sp3d/>
-    <dgm:txPr/>
-    <dgm:style>
-      <a:lnRef idx="2">
-        <a:scrgbClr r="0" g="0" b="0"/>
-      </a:lnRef>
-      <a:fillRef idx="1">
-        <a:scrgbClr r="0" g="0" b="0"/>
-      </a:fillRef>
-      <a:effectRef idx="0">
-        <a:scrgbClr r="0" g="0" b="0"/>
-      </a:effectRef>
-      <a:fontRef idx="minor"/>
-    </dgm:style>
-  </dgm:styleLbl>
-  <dgm:styleLbl name="alignAcc1">
-    <dgm:scene3d>
-      <a:camera prst="orthographicFront"/>
-      <a:lightRig rig="threePt" dir="t"/>
-    </dgm:scene3d>
-    <dgm:sp3d/>
-    <dgm:txPr/>
-    <dgm:style>
-      <a:lnRef idx="2">
-        <a:scrgbClr r="0" g="0" b="0"/>
-      </a:lnRef>
-      <a:fillRef idx="1">
-        <a:scrgbClr r="0" g="0" b="0"/>
-      </a:fillRef>
-      <a:effectRef idx="0">
-        <a:scrgbClr r="0" g="0" b="0"/>
-      </a:effectRef>
-      <a:fontRef idx="minor"/>
-    </dgm:style>
-  </dgm:styleLbl>
-  <dgm:styleLbl name="trAlignAcc1">
-    <dgm:scene3d>
-      <a:camera prst="orthographicFront"/>
-      <a:lightRig rig="threePt" dir="t"/>
-    </dgm:scene3d>
-    <dgm:sp3d/>
-    <dgm:txPr/>
-    <dgm:style>
-      <a:lnRef idx="1">
-        <a:scrgbClr r="0" g="0" b="0"/>
-      </a:lnRef>
-      <a:fillRef idx="1">
-        <a:scrgbClr r="0" g="0" b="0"/>
-      </a:fillRef>
-      <a:effectRef idx="0">
-        <a:scrgbClr r="0" g="0" b="0"/>
-      </a:effectRef>
-      <a:fontRef idx="minor"/>
-    </dgm:style>
-  </dgm:styleLbl>
-  <dgm:styleLbl name="bgAcc1">
-    <dgm:scene3d>
-      <a:camera prst="orthographicFront"/>
-      <a:lightRig rig="threePt" dir="t"/>
-    </dgm:scene3d>
-    <dgm:sp3d/>
-    <dgm:txPr/>
-    <dgm:style>
-      <a:lnRef idx="2">
-        <a:scrgbClr r="0" g="0" b="0"/>
-      </a:lnRef>
-      <a:fillRef idx="1">
-        <a:scrgbClr r="0" g="0" b="0"/>
-      </a:fillRef>
-      <a:effectRef idx="0">
-        <a:scrgbClr r="0" g="0" b="0"/>
-      </a:effectRef>
-      <a:fontRef idx="minor"/>
-    </dgm:style>
-  </dgm:styleLbl>
-  <dgm:styleLbl name="solidFgAcc1">
-    <dgm:scene3d>
-      <a:camera prst="orthographicFront"/>
-      <a:lightRig rig="threePt" dir="t"/>
-    </dgm:scene3d>
-    <dgm:sp3d/>
-    <dgm:txPr/>
-    <dgm:style>
-      <a:lnRef idx="2">
-        <a:scrgbClr r="0" g="0" b="0"/>
-      </a:lnRef>
-      <a:fillRef idx="1">
-        <a:scrgbClr r="0" g="0" b="0"/>
-      </a:fillRef>
-      <a:effectRef idx="0">
-        <a:scrgbClr r="0" g="0" b="0"/>
-      </a:effectRef>
-      <a:fontRef idx="minor"/>
-    </dgm:style>
-  </dgm:styleLbl>
-  <dgm:styleLbl name="solidAlignAcc1">
-    <dgm:scene3d>
-      <a:camera prst="orthographicFront"/>
-      <a:lightRig rig="threePt" dir="t"/>
-    </dgm:scene3d>
-    <dgm:sp3d/>
-    <dgm:txPr/>
-    <dgm:style>
-      <a:lnRef idx="2">
-        <a:scrgbClr r="0" g="0" b="0"/>
-      </a:lnRef>
-      <a:fillRef idx="1">
-        <a:scrgbClr r="0" g="0" b="0"/>
-      </a:fillRef>
-      <a:effectRef idx="0">
-        <a:scrgbClr r="0" g="0" b="0"/>
-      </a:effectRef>
-      <a:fontRef idx="minor"/>
-    </dgm:style>
-  </dgm:styleLbl>
-  <dgm:styleLbl name="solidBgAcc1">
-    <dgm:scene3d>
-      <a:camera prst="orthographicFront"/>
-      <a:lightRig rig="threePt" dir="t"/>
-    </dgm:scene3d>
-    <dgm:sp3d/>
-    <dgm:txPr/>
-    <dgm:style>
-      <a:lnRef idx="2">
-        <a:scrgbClr r="0" g="0" b="0"/>
-      </a:lnRef>
-      <a:fillRef idx="1">
-        <a:scrgbClr r="0" g="0" b="0"/>
-      </a:fillRef>
-      <a:effectRef idx="0">
-        <a:scrgbClr r="0" g="0" b="0"/>
-      </a:effectRef>
-      <a:fontRef idx="minor"/>
-    </dgm:style>
-  </dgm:styleLbl>
-  <dgm:styleLbl name="fgAccFollowNode1">
-    <dgm:scene3d>
-      <a:camera prst="orthographicFront"/>
-      <a:lightRig rig="threePt" dir="t"/>
-    </dgm:scene3d>
-    <dgm:sp3d/>
-    <dgm:txPr/>
-    <dgm:style>
-      <a:lnRef idx="2">
-        <a:scrgbClr r="0" g="0" b="0"/>
-      </a:lnRef>
-      <a:fillRef idx="1">
-        <a:scrgbClr r="0" g="0" b="0"/>
-      </a:fillRef>
-      <a:effectRef idx="0">
-        <a:scrgbClr r="0" g="0" b="0"/>
-      </a:effectRef>
-      <a:fontRef idx="minor"/>
-    </dgm:style>
-  </dgm:styleLbl>
-  <dgm:styleLbl name="alignAccFollowNode1">
-    <dgm:scene3d>
-      <a:camera prst="orthographicFront"/>
-      <a:lightRig rig="threePt" dir="t"/>
-    </dgm:scene3d>
-    <dgm:sp3d/>
-    <dgm:txPr/>
-    <dgm:style>
-      <a:lnRef idx="2">
-        <a:scrgbClr r="0" g="0" b="0"/>
-      </a:lnRef>
-      <a:fillRef idx="1">
-        <a:scrgbClr r="0" g="0" b="0"/>
-      </a:fillRef>
-      <a:effectRef idx="0">
-        <a:scrgbClr r="0" g="0" b="0"/>
-      </a:effectRef>
-      <a:fontRef idx="minor"/>
-    </dgm:style>
-  </dgm:styleLbl>
-  <dgm:styleLbl name="bgAccFollowNode1">
-    <dgm:scene3d>
-      <a:camera prst="orthographicFront"/>
-      <a:lightRig rig="threePt" dir="t"/>
-    </dgm:scene3d>
-    <dgm:sp3d/>
-    <dgm:txPr/>
-    <dgm:style>
-      <a:lnRef idx="2">
-        <a:scrgbClr r="0" g="0" b="0"/>
-      </a:lnRef>
-      <a:fillRef idx="1">
-        <a:scrgbClr r="0" g="0" b="0"/>
-      </a:fillRef>
-      <a:effectRef idx="0">
-        <a:scrgbClr r="0" g="0" b="0"/>
-      </a:effectRef>
-      <a:fontRef idx="minor"/>
-    </dgm:style>
-  </dgm:styleLbl>
-  <dgm:styleLbl name="fgAcc0">
-    <dgm:scene3d>
-      <a:camera prst="orthographicFront"/>
-      <a:lightRig rig="threePt" dir="t"/>
-    </dgm:scene3d>
-    <dgm:sp3d/>
-    <dgm:txPr/>
-    <dgm:style>
-      <a:lnRef idx="2">
-        <a:scrgbClr r="0" g="0" b="0"/>
-      </a:lnRef>
-      <a:fillRef idx="1">
-        <a:scrgbClr r="0" g="0" b="0"/>
-      </a:fillRef>
-      <a:effectRef idx="0">
-        <a:scrgbClr r="0" g="0" b="0"/>
-      </a:effectRef>
-      <a:fontRef idx="minor"/>
-    </dgm:style>
-  </dgm:styleLbl>
-  <dgm:styleLbl name="fgAcc2">
-    <dgm:scene3d>
-      <a:camera prst="orthographicFront"/>
-      <a:lightRig rig="threePt" dir="t"/>
-    </dgm:scene3d>
-    <dgm:sp3d/>
-    <dgm:txPr/>
-    <dgm:style>
-      <a:lnRef idx="2">
-        <a:scrgbClr r="0" g="0" b="0"/>
-      </a:lnRef>
-      <a:fillRef idx="1">
-        <a:scrgbClr r="0" g="0" b="0"/>
-      </a:fillRef>
-      <a:effectRef idx="0">
-        <a:scrgbClr r="0" g="0" b="0"/>
-      </a:effectRef>
-      <a:fontRef idx="minor"/>
-    </dgm:style>
-  </dgm:styleLbl>
-  <dgm:styleLbl name="fgAcc3">
-    <dgm:scene3d>
-      <a:camera prst="orthographicFront"/>
-      <a:lightRig rig="threePt" dir="t"/>
-    </dgm:scene3d>
-    <dgm:sp3d/>
-    <dgm:txPr/>
-    <dgm:style>
-      <a:lnRef idx="2">
-        <a:scrgbClr r="0" g="0" b="0"/>
-      </a:lnRef>
-      <a:fillRef idx="1">
-        <a:scrgbClr r="0" g="0" b="0"/>
-      </a:fillRef>
-      <a:effectRef idx="0">
-        <a:scrgbClr r="0" g="0" b="0"/>
-      </a:effectRef>
-      <a:fontRef idx="minor"/>
-    </dgm:style>
-  </dgm:styleLbl>
-  <dgm:styleLbl name="fgAcc4">
-    <dgm:scene3d>
-      <a:camera prst="orthographicFront"/>
-      <a:lightRig rig="threePt" dir="t"/>
-    </dgm:scene3d>
-    <dgm:sp3d/>
-    <dgm:txPr/>
-    <dgm:style>
-      <a:lnRef idx="2">
-        <a:scrgbClr r="0" g="0" b="0"/>
-      </a:lnRef>
-      <a:fillRef idx="1">
-        <a:scrgbClr r="0" g="0" b="0"/>
-      </a:fillRef>
-      <a:effectRef idx="0">
-        <a:scrgbClr r="0" g="0" b="0"/>
-      </a:effectRef>
-      <a:fontRef idx="minor"/>
-    </dgm:style>
-  </dgm:styleLbl>
-  <dgm:styleLbl name="bgShp">
-    <dgm:scene3d>
-      <a:camera prst="orthographicFront"/>
-      <a:lightRig rig="threePt" dir="t"/>
-    </dgm:scene3d>
-    <dgm:sp3d/>
-    <dgm:txPr/>
-    <dgm:style>
-      <a:lnRef idx="0">
-        <a:scrgbClr r="0" g="0" b="0"/>
-      </a:lnRef>
-      <a:fillRef idx="1">
-        <a:scrgbClr r="0" g="0" b="0"/>
-      </a:fillRef>
-      <a:effectRef idx="0">
-        <a:scrgbClr r="0" g="0" b="0"/>
-      </a:effectRef>
-      <a:fontRef idx="minor"/>
-    </dgm:style>
-  </dgm:styleLbl>
-  <dgm:styleLbl name="dkBgShp">
-    <dgm:scene3d>
-      <a:camera prst="orthographicFront"/>
-      <a:lightRig rig="threePt" dir="t"/>
-    </dgm:scene3d>
-    <dgm:sp3d/>
-    <dgm:txPr/>
-    <dgm:style>
-      <a:lnRef idx="0">
-        <a:scrgbClr r="0" g="0" b="0"/>
-      </a:lnRef>
-      <a:fillRef idx="1">
-        <a:scrgbClr r="0" g="0" b="0"/>
-      </a:fillRef>
-      <a:effectRef idx="0">
-        <a:scrgbClr r="0" g="0" b="0"/>
-      </a:effectRef>
-      <a:fontRef idx="minor"/>
-    </dgm:style>
-  </dgm:styleLbl>
-  <dgm:styleLbl name="trBgShp">
-    <dgm:scene3d>
-      <a:camera prst="orthographicFront"/>
-      <a:lightRig rig="threePt" dir="t"/>
-    </dgm:scene3d>
-    <dgm:sp3d/>
-    <dgm:txPr/>
-    <dgm:style>
-      <a:lnRef idx="0">
-        <a:scrgbClr r="0" g="0" b="0"/>
-      </a:lnRef>
-      <a:fillRef idx="1">
-        <a:scrgbClr r="0" g="0" b="0"/>
-      </a:fillRef>
-      <a:effectRef idx="0">
-        <a:scrgbClr r="0" g="0" b="0"/>
-      </a:effectRef>
-      <a:fontRef idx="minor"/>
-    </dgm:style>
-  </dgm:styleLbl>
-  <dgm:styleLbl name="fgShp">
-    <dgm:scene3d>
-      <a:camera prst="orthographicFront"/>
-      <a:lightRig rig="threePt" dir="t"/>
-    </dgm:scene3d>
-    <dgm:sp3d/>
-    <dgm:txPr/>
-    <dgm:style>
-      <a:lnRef idx="2">
-        <a:scrgbClr r="0" g="0" b="0"/>
-      </a:lnRef>
-      <a:fillRef idx="1">
-        <a:scrgbClr r="0" g="0" b="0"/>
-      </a:fillRef>
-      <a:effectRef idx="0">
-        <a:scrgbClr r="0" g="0" b="0"/>
-      </a:effectRef>
-      <a:fontRef idx="minor"/>
-    </dgm:style>
-  </dgm:styleLbl>
-  <dgm:styleLbl name="revTx">
-    <dgm:scene3d>
-      <a:camera prst="orthographicFront"/>
-      <a:lightRig rig="threePt" dir="t"/>
-    </dgm:scene3d>
-    <dgm:sp3d/>
-    <dgm:txPr/>
-    <dgm:style>
-      <a:lnRef idx="0">
-        <a:scrgbClr r="0" g="0" b="0"/>
-      </a:lnRef>
-      <a:fillRef idx="0">
-        <a:scrgbClr r="0" g="0" b="0"/>
-      </a:fillRef>
-      <a:effectRef idx="0">
-        <a:scrgbClr r="0" g="0" b="0"/>
-      </a:effectRef>
-      <a:fontRef idx="minor"/>
-    </dgm:style>
-  </dgm:styleLbl>
-</dgm:styleDef>
-</file>
-
 <file path=ppt/handoutMasters/handoutMaster1.xml><?xml version="1.0" encoding="utf-8"?>
 <p:handoutMaster xmlns:a="http://schemas.openxmlformats.org/drawingml/2006/main" xmlns:r="http://schemas.openxmlformats.org/officeDocument/2006/relationships" xmlns:p="http://schemas.openxmlformats.org/presentationml/2006/main">
   <p:cSld>
@@ -10258,7 +7497,7 @@
           <a:p>
             <a:fld id="{C88CE87A-16FF-4C7D-8292-0CB980715C8B}" type="datetimeFigureOut">
               <a:rPr lang="de-DE" smtClean="0"/>
-              <a:t>19.12.2022</a:t>
+              <a:t>20.12.2022</a:t>
             </a:fld>
             <a:endParaRPr lang="de-DE"/>
           </a:p>
@@ -10435,7 +7674,7 @@
           <a:p>
             <a:fld id="{9DECA62E-2216-4960-A875-4D2633F4A404}" type="datetimeFigureOut">
               <a:rPr lang="de-DE" smtClean="0"/>
-              <a:t>19.12.2022</a:t>
+              <a:t>20.12.2022</a:t>
             </a:fld>
             <a:endParaRPr lang="de-DE"/>
           </a:p>
@@ -12241,7 +9480,7 @@
           <a:p>
             <a:fld id="{E4F67F0B-0D69-4F2E-A0A2-F8FA26E3BF7C}" type="datetime4">
               <a:rPr lang="de-DE" smtClean="0"/>
-              <a:t>19. Dezember 2022</a:t>
+              <a:t>20. Dezember 2022</a:t>
             </a:fld>
             <a:endParaRPr lang="de-DE" dirty="0"/>
           </a:p>
@@ -12647,7 +9886,7 @@
           <a:p>
             <a:fld id="{BE42F941-E76D-416A-AF33-65B53D3785A5}" type="datetime4">
               <a:rPr lang="de-DE" smtClean="0"/>
-              <a:t>19. Dezember 2022</a:t>
+              <a:t>20. Dezember 2022</a:t>
             </a:fld>
             <a:endParaRPr lang="de-DE" dirty="0"/>
           </a:p>
@@ -13201,7 +10440,7 @@
           <a:p>
             <a:fld id="{383FEB1C-484B-4899-98E6-EB362BE13A10}" type="datetime4">
               <a:rPr lang="de-DE" smtClean="0"/>
-              <a:t>19. Dezember 2022</a:t>
+              <a:t>20. Dezember 2022</a:t>
             </a:fld>
             <a:endParaRPr lang="de-DE" dirty="0"/>
           </a:p>
@@ -13592,7 +10831,7 @@
           <a:p>
             <a:fld id="{FDEAF896-8D1C-46DE-9E9E-9010894131BC}" type="datetime4">
               <a:rPr lang="de-DE" smtClean="0"/>
-              <a:t>19. Dezember 2022</a:t>
+              <a:t>20. Dezember 2022</a:t>
             </a:fld>
             <a:endParaRPr lang="de-DE" dirty="0"/>
           </a:p>
@@ -14083,7 +11322,7 @@
           <a:p>
             <a:fld id="{F23CC76E-A77D-4F48-8F46-063559FB155D}" type="datetime4">
               <a:rPr lang="de-DE" smtClean="0"/>
-              <a:t>19. Dezember 2022</a:t>
+              <a:t>20. Dezember 2022</a:t>
             </a:fld>
             <a:endParaRPr lang="de-DE" dirty="0"/>
           </a:p>
@@ -14674,7 +11913,7 @@
           <a:p>
             <a:fld id="{8321F75B-8E06-41EA-9095-78DA6F8CBA18}" type="datetime4">
               <a:rPr lang="de-DE" smtClean="0"/>
-              <a:t>19. Dezember 2022</a:t>
+              <a:t>20. Dezember 2022</a:t>
             </a:fld>
             <a:endParaRPr lang="de-DE" dirty="0"/>
           </a:p>
@@ -15003,7 +12242,7 @@
           <a:p>
             <a:fld id="{089DCD38-B7CE-40BA-8A02-00BA6D6B4613}" type="datetime4">
               <a:rPr lang="de-DE" smtClean="0"/>
-              <a:t>19. Dezember 2022</a:t>
+              <a:t>20. Dezember 2022</a:t>
             </a:fld>
             <a:endParaRPr lang="de-DE" dirty="0"/>
           </a:p>
@@ -15370,7 +12609,7 @@
           <a:p>
             <a:fld id="{97BF881E-3DED-43D6-A417-A7C186EE56EA}" type="datetime4">
               <a:rPr lang="de-DE" smtClean="0"/>
-              <a:t>19. Dezember 2022</a:t>
+              <a:t>20. Dezember 2022</a:t>
             </a:fld>
             <a:endParaRPr lang="de-DE" dirty="0"/>
           </a:p>
@@ -15757,7 +12996,7 @@
           <a:p>
             <a:fld id="{236023A5-0DD9-4EDE-B3F8-AE8B566D171E}" type="datetime4">
               <a:rPr lang="de-DE" smtClean="0"/>
-              <a:t>19. Dezember 2022</a:t>
+              <a:t>20. Dezember 2022</a:t>
             </a:fld>
             <a:endParaRPr lang="de-DE" dirty="0"/>
           </a:p>
@@ -18820,7 +16059,7 @@
           <a:p>
             <a:fld id="{5F2FFFAF-2C94-4296-A519-F2AFC9B633BB}" type="datetime4">
               <a:rPr lang="de-DE" smtClean="0"/>
-              <a:t>19. Dezember 2022</a:t>
+              <a:t>20. Dezember 2022</a:t>
             </a:fld>
             <a:endParaRPr lang="de-DE" dirty="0"/>
           </a:p>
@@ -19119,7 +16358,7 @@
           <a:p>
             <a:fld id="{278214D8-8053-4DB4-874E-70E28250261A}" type="datetime4">
               <a:rPr lang="de-DE" smtClean="0"/>
-              <a:t>19. Dezember 2022</a:t>
+              <a:t>20. Dezember 2022</a:t>
             </a:fld>
             <a:endParaRPr lang="de-DE" dirty="0"/>
           </a:p>
@@ -27134,7 +24373,7 @@
           <a:p>
             <a:fld id="{974F31EF-6EA6-4A24-8992-69DC7A69151C}" type="datetime4">
               <a:rPr lang="de-DE" smtClean="0"/>
-              <a:t>19. Dezember 2022</a:t>
+              <a:t>20. Dezember 2022</a:t>
             </a:fld>
             <a:endParaRPr lang="de-DE"/>
           </a:p>
@@ -29892,7 +27131,7 @@
           <a:p>
             <a:fld id="{C7DD0C8E-4653-4FE0-9AB6-B157E51E80B8}" type="datetime4">
               <a:rPr lang="de-DE" smtClean="0"/>
-              <a:t>19. Dezember 2022</a:t>
+              <a:t>20. Dezember 2022</a:t>
             </a:fld>
             <a:endParaRPr lang="de-DE" dirty="0"/>
           </a:p>
@@ -31145,7 +28384,7 @@
           <a:p>
             <a:fld id="{701BB78D-0F7C-433E-93C8-011F3F257B2F}" type="datetime4">
               <a:rPr lang="de-DE" smtClean="0"/>
-              <a:t>19. Dezember 2022</a:t>
+              <a:t>20. Dezember 2022</a:t>
             </a:fld>
             <a:endParaRPr lang="de-DE" dirty="0"/>
           </a:p>
@@ -32033,7 +29272,7 @@
           <a:p>
             <a:fld id="{5C89B0C6-E378-43D9-87B6-F295F13B6DA2}" type="datetime4">
               <a:rPr lang="de-DE" smtClean="0"/>
-              <a:t>19. Dezember 2022</a:t>
+              <a:t>20. Dezember 2022</a:t>
             </a:fld>
             <a:endParaRPr lang="de-DE" dirty="0"/>
           </a:p>
@@ -33456,7 +30695,7 @@
           <a:p>
             <a:fld id="{37276614-C801-48D1-BE5E-3E261D899ED8}" type="datetime4">
               <a:rPr lang="de-DE" smtClean="0"/>
-              <a:t>19. Dezember 2022</a:t>
+              <a:t>20. Dezember 2022</a:t>
             </a:fld>
             <a:endParaRPr lang="de-DE" dirty="0"/>
           </a:p>
@@ -33900,7 +31139,7 @@
           <a:p>
             <a:fld id="{A9FB17B1-4EF5-4E82-B64D-6D9D06630995}" type="datetime4">
               <a:rPr lang="de-DE" smtClean="0"/>
-              <a:t>19. Dezember 2022</a:t>
+              <a:t>20. Dezember 2022</a:t>
             </a:fld>
             <a:endParaRPr lang="de-DE" dirty="0"/>
           </a:p>
@@ -34336,7 +31575,7 @@
           <a:p>
             <a:fld id="{0B15DED9-9AF1-49E6-842A-BFCE5BF99E9D}" type="datetime4">
               <a:rPr lang="de-DE" smtClean="0"/>
-              <a:t>19. Dezember 2022</a:t>
+              <a:t>20. Dezember 2022</a:t>
             </a:fld>
             <a:endParaRPr lang="de-DE" dirty="0"/>
           </a:p>
@@ -35063,7 +32302,7 @@
           <a:p>
             <a:fld id="{B4AF76AE-F8CA-4CAE-8890-6E3DCFB786A6}" type="datetime4">
               <a:rPr lang="de-DE" smtClean="0"/>
-              <a:t>19. Dezember 2022</a:t>
+              <a:t>20. Dezember 2022</a:t>
             </a:fld>
             <a:endParaRPr lang="de-DE" dirty="0"/>
           </a:p>
@@ -36993,7 +34232,7 @@
           <a:p>
             <a:fld id="{5C89B0C6-E378-43D9-87B6-F295F13B6DA2}" type="datetime4">
               <a:rPr lang="de-DE" smtClean="0"/>
-              <a:t>19. Dezember 2022</a:t>
+              <a:t>20. Dezember 2022</a:t>
             </a:fld>
             <a:endParaRPr lang="de-DE" dirty="0"/>
           </a:p>
@@ -37257,7 +34496,7 @@
             <a:fld id="{D529D632-EE07-48FA-B475-B0D49CBC7F92}" type="datetime4">
               <a:rPr lang="de-DE" smtClean="0"/>
               <a:pPr/>
-              <a:t>19. Dezember 2022</a:t>
+              <a:t>20. Dezember 2022</a:t>
             </a:fld>
             <a:endParaRPr lang="de-DE" dirty="0"/>
           </a:p>
@@ -37378,7 +34617,7 @@
           <a:p>
             <a:fld id="{5C89B0C6-E378-43D9-87B6-F295F13B6DA2}" type="datetime4">
               <a:rPr lang="de-DE" smtClean="0"/>
-              <a:t>19. Dezember 2022</a:t>
+              <a:t>20. Dezember 2022</a:t>
             </a:fld>
             <a:endParaRPr lang="de-DE" dirty="0"/>
           </a:p>
@@ -37616,7 +34855,7 @@
           <a:p>
             <a:fld id="{5C89B0C6-E378-43D9-87B6-F295F13B6DA2}" type="datetime4">
               <a:rPr lang="de-DE" smtClean="0"/>
-              <a:t>19. Dezember 2022</a:t>
+              <a:t>20. Dezember 2022</a:t>
             </a:fld>
             <a:endParaRPr lang="de-DE" dirty="0"/>
           </a:p>
@@ -38364,7 +35603,7 @@
           <a:p>
             <a:fld id="{5C89B0C6-E378-43D9-87B6-F295F13B6DA2}" type="datetime4">
               <a:rPr lang="de-DE" smtClean="0"/>
-              <a:t>19. Dezember 2022</a:t>
+              <a:t>20. Dezember 2022</a:t>
             </a:fld>
             <a:endParaRPr lang="de-DE" dirty="0"/>
           </a:p>
@@ -39348,7 +36587,7 @@
           <a:p>
             <a:fld id="{5C89B0C6-E378-43D9-87B6-F295F13B6DA2}" type="datetime4">
               <a:rPr lang="de-DE" smtClean="0"/>
-              <a:t>19. Dezember 2022</a:t>
+              <a:t>20. Dezember 2022</a:t>
             </a:fld>
             <a:endParaRPr lang="de-DE" dirty="0"/>
           </a:p>
@@ -39561,7 +36800,7 @@
           <a:p>
             <a:fld id="{5C89B0C6-E378-43D9-87B6-F295F13B6DA2}" type="datetime4">
               <a:rPr lang="de-DE" smtClean="0"/>
-              <a:t>19. Dezember 2022</a:t>
+              <a:t>20. Dezember 2022</a:t>
             </a:fld>
             <a:endParaRPr lang="de-DE" dirty="0"/>
           </a:p>
@@ -41643,7 +38882,7 @@
             <a:fld id="{D529D632-EE07-48FA-B475-B0D49CBC7F92}" type="datetime4">
               <a:rPr lang="de-DE" smtClean="0"/>
               <a:pPr/>
-              <a:t>19. Dezember 2022</a:t>
+              <a:t>20. Dezember 2022</a:t>
             </a:fld>
             <a:endParaRPr lang="de-DE" dirty="0"/>
           </a:p>
@@ -41764,7 +39003,7 @@
           <a:p>
             <a:fld id="{5C89B0C6-E378-43D9-87B6-F295F13B6DA2}" type="datetime4">
               <a:rPr lang="de-DE" smtClean="0"/>
-              <a:t>19. Dezember 2022</a:t>
+              <a:t>20. Dezember 2022</a:t>
             </a:fld>
             <a:endParaRPr lang="de-DE" dirty="0"/>
           </a:p>
@@ -42055,7 +39294,7 @@
 </file>
 
 <file path=ppt/slides/slide19.xml><?xml version="1.0" encoding="utf-8"?>
-<p:sld xmlns:a="http://schemas.openxmlformats.org/drawingml/2006/main" xmlns:r="http://schemas.openxmlformats.org/officeDocument/2006/relationships" xmlns:p="http://schemas.openxmlformats.org/presentationml/2006/main" show="0">
+<p:sld xmlns:a="http://schemas.openxmlformats.org/drawingml/2006/main" xmlns:r="http://schemas.openxmlformats.org/officeDocument/2006/relationships" xmlns:p="http://schemas.openxmlformats.org/presentationml/2006/main">
   <p:cSld>
     <p:spTree>
       <p:nvGrpSpPr>
@@ -42073,10 +39312,43 @@
       </p:grpSpPr>
       <p:sp>
         <p:nvSpPr>
+          <p:cNvPr id="21" name="Titel 20">
+            <a:extLst>
+              <a:ext uri="{FF2B5EF4-FFF2-40B4-BE49-F238E27FC236}">
+                <a16:creationId xmlns:a16="http://schemas.microsoft.com/office/drawing/2014/main" id="{3018BD05-96D8-43F2-A6AA-CC40E7C32CCE}"/>
+              </a:ext>
+            </a:extLst>
+          </p:cNvPr>
+          <p:cNvSpPr>
+            <a:spLocks noGrp="1"/>
+          </p:cNvSpPr>
+          <p:nvPr>
+            <p:ph type="title"/>
+          </p:nvPr>
+        </p:nvSpPr>
+        <p:spPr>
+          <a:xfrm>
+            <a:off x="518318" y="3152001"/>
+            <a:ext cx="11157743" cy="553998"/>
+          </a:xfrm>
+        </p:spPr>
+        <p:txBody>
+          <a:bodyPr/>
+          <a:lstStyle/>
+          <a:p>
+            <a:r>
+              <a:rPr lang="de-DE" dirty="0"/>
+              <a:t>6. Nächste Schritte</a:t>
+            </a:r>
+          </a:p>
+        </p:txBody>
+      </p:sp>
+      <p:sp>
+        <p:nvSpPr>
           <p:cNvPr id="2" name="Datumsplatzhalter 1">
             <a:extLst>
               <a:ext uri="{FF2B5EF4-FFF2-40B4-BE49-F238E27FC236}">
-                <a16:creationId xmlns:a16="http://schemas.microsoft.com/office/drawing/2014/main" id="{F39906C2-6025-E2F7-0371-BB94EECE2FC9}"/>
+                <a16:creationId xmlns:a16="http://schemas.microsoft.com/office/drawing/2014/main" id="{FE7214E1-5D14-4D0B-BADD-2E239FECEC10}"/>
               </a:ext>
             </a:extLst>
           </p:cNvPr>
@@ -42092,9 +39364,10 @@
           <a:bodyPr/>
           <a:lstStyle/>
           <a:p>
-            <a:fld id="{0B15DED9-9AF1-49E6-842A-BFCE5BF99E9D}" type="datetime4">
+            <a:fld id="{D529D632-EE07-48FA-B475-B0D49CBC7F92}" type="datetime4">
               <a:rPr lang="de-DE" smtClean="0"/>
-              <a:t>19. Dezember 2022</a:t>
+              <a:pPr/>
+              <a:t>20. Dezember 2022</a:t>
             </a:fld>
             <a:endParaRPr lang="de-DE" dirty="0"/>
           </a:p>
@@ -42105,7 +39378,7 @@
           <p:cNvPr id="3" name="Fußzeilenplatzhalter 2">
             <a:extLst>
               <a:ext uri="{FF2B5EF4-FFF2-40B4-BE49-F238E27FC236}">
-                <a16:creationId xmlns:a16="http://schemas.microsoft.com/office/drawing/2014/main" id="{A905B58A-073C-F6BA-EB19-03190B59ABD2}"/>
+                <a16:creationId xmlns:a16="http://schemas.microsoft.com/office/drawing/2014/main" id="{6A6AD034-0F65-47AF-9CAA-C4B0CEB30D4D}"/>
               </a:ext>
             </a:extLst>
           </p:cNvPr>
@@ -42116,29 +39389,19 @@
             <p:ph type="ftr" sz="quarter" idx="11"/>
           </p:nvPr>
         </p:nvSpPr>
-        <p:spPr>
-          <a:xfrm>
-            <a:off x="515937" y="6634666"/>
-            <a:ext cx="9574509" cy="123111"/>
-          </a:xfrm>
-        </p:spPr>
+        <p:spPr/>
         <p:txBody>
           <a:bodyPr/>
           <a:lstStyle/>
           <a:p>
             <a:r>
+              <a:rPr lang="de-DE" b="1" dirty="0"/>
+              <a:t>Philippe Huber</a:t>
+            </a:r>
+            <a:r>
               <a:rPr lang="de-DE" dirty="0"/>
-              <a:t>Philippe Huber, </a:t>
-            </a:r>
-            <a:r>
-              <a:rPr lang="de-DE" b="1" dirty="0"/>
-              <a:t>Rene </a:t>
-            </a:r>
-            <a:r>
-              <a:rPr lang="de-DE" b="1" dirty="0" err="1"/>
-              <a:t>Jokiel</a:t>
-            </a:r>
-            <a:endParaRPr lang="de-DE" b="1" dirty="0"/>
+              <a:t>, Rene Jokiel</a:t>
+            </a:r>
           </a:p>
         </p:txBody>
       </p:sp>
@@ -42147,7 +39410,7 @@
           <p:cNvPr id="4" name="Foliennummernplatzhalter 3">
             <a:extLst>
               <a:ext uri="{FF2B5EF4-FFF2-40B4-BE49-F238E27FC236}">
-                <a16:creationId xmlns:a16="http://schemas.microsoft.com/office/drawing/2014/main" id="{0F17EF73-399D-0059-4FC0-6586625F48E0}"/>
+                <a16:creationId xmlns:a16="http://schemas.microsoft.com/office/drawing/2014/main" id="{00F7E098-F740-40F7-A085-7034627D9148}"/>
               </a:ext>
             </a:extLst>
           </p:cNvPr>
@@ -42172,119 +39435,10 @@
           </a:p>
         </p:txBody>
       </p:sp>
-      <p:sp>
-        <p:nvSpPr>
-          <p:cNvPr id="6" name="Textplatzhalter 5">
-            <a:extLst>
-              <a:ext uri="{FF2B5EF4-FFF2-40B4-BE49-F238E27FC236}">
-                <a16:creationId xmlns:a16="http://schemas.microsoft.com/office/drawing/2014/main" id="{A68230CC-D21F-BCDE-CFF2-9CB67D9ED100}"/>
-              </a:ext>
-            </a:extLst>
-          </p:cNvPr>
-          <p:cNvSpPr>
-            <a:spLocks noGrp="1"/>
-          </p:cNvSpPr>
-          <p:nvPr>
-            <p:ph type="body" sz="quarter" idx="39"/>
-          </p:nvPr>
-        </p:nvSpPr>
-        <p:spPr/>
-        <p:txBody>
-          <a:bodyPr/>
-          <a:lstStyle/>
-          <a:p>
-            <a:endParaRPr lang="de-DE"/>
-          </a:p>
-        </p:txBody>
-      </p:sp>
-      <p:sp>
-        <p:nvSpPr>
-          <p:cNvPr id="7" name="Titel 6">
-            <a:extLst>
-              <a:ext uri="{FF2B5EF4-FFF2-40B4-BE49-F238E27FC236}">
-                <a16:creationId xmlns:a16="http://schemas.microsoft.com/office/drawing/2014/main" id="{2673039A-069E-EF08-CCAD-FC1692DB88AC}"/>
-              </a:ext>
-            </a:extLst>
-          </p:cNvPr>
-          <p:cNvSpPr>
-            <a:spLocks noGrp="1"/>
-          </p:cNvSpPr>
-          <p:nvPr>
-            <p:ph type="title"/>
-          </p:nvPr>
-        </p:nvSpPr>
-        <p:spPr/>
-        <p:txBody>
-          <a:bodyPr/>
-          <a:lstStyle/>
-          <a:p>
-            <a:r>
-              <a:rPr lang="de-DE" dirty="0"/>
-              <a:t>Insgesamt werden 3 verschiedene Experimentarten durchgeführt</a:t>
-            </a:r>
-          </a:p>
-        </p:txBody>
-      </p:sp>
-      <p:sp>
-        <p:nvSpPr>
-          <p:cNvPr id="8" name="Textplatzhalter 7">
-            <a:extLst>
-              <a:ext uri="{FF2B5EF4-FFF2-40B4-BE49-F238E27FC236}">
-                <a16:creationId xmlns:a16="http://schemas.microsoft.com/office/drawing/2014/main" id="{E89C2102-9E8E-1A85-731D-1C8BF240E82B}"/>
-              </a:ext>
-            </a:extLst>
-          </p:cNvPr>
-          <p:cNvSpPr>
-            <a:spLocks noGrp="1"/>
-          </p:cNvSpPr>
-          <p:nvPr>
-            <p:ph type="body" sz="quarter" idx="13"/>
-          </p:nvPr>
-        </p:nvSpPr>
-        <p:spPr/>
-        <p:txBody>
-          <a:bodyPr/>
-          <a:lstStyle/>
-          <a:p>
-            <a:r>
-              <a:rPr lang="de-DE" dirty="0"/>
-              <a:t>Experimentarten</a:t>
-            </a:r>
-          </a:p>
-        </p:txBody>
-      </p:sp>
-      <p:graphicFrame>
-        <p:nvGraphicFramePr>
-          <p:cNvPr id="12" name="Diagramm 11">
-            <a:extLst>
-              <a:ext uri="{FF2B5EF4-FFF2-40B4-BE49-F238E27FC236}">
-                <a16:creationId xmlns:a16="http://schemas.microsoft.com/office/drawing/2014/main" id="{5F4D04F3-E56C-C45C-C41F-46D6426F29B5}"/>
-              </a:ext>
-            </a:extLst>
-          </p:cNvPr>
-          <p:cNvGraphicFramePr/>
-          <p:nvPr>
-            <p:extLst>
-              <p:ext uri="{D42A27DB-BD31-4B8C-83A1-F6EECF244321}">
-                <p14:modId xmlns:p14="http://schemas.microsoft.com/office/powerpoint/2010/main" val="2375663671"/>
-              </p:ext>
-            </p:extLst>
-          </p:nvPr>
-        </p:nvGraphicFramePr>
-        <p:xfrm>
-          <a:off x="515937" y="1549746"/>
-          <a:ext cx="11157742" cy="4783597"/>
-        </p:xfrm>
-        <a:graphic>
-          <a:graphicData uri="http://schemas.openxmlformats.org/drawingml/2006/diagram">
-            <dgm:relIds xmlns:dgm="http://schemas.openxmlformats.org/drawingml/2006/diagram" xmlns:r="http://schemas.openxmlformats.org/officeDocument/2006/relationships" r:dm="rId2" r:lo="rId3" r:qs="rId4" r:cs="rId5"/>
-          </a:graphicData>
-        </a:graphic>
-      </p:graphicFrame>
     </p:spTree>
     <p:extLst>
       <p:ext uri="{BB962C8B-B14F-4D97-AF65-F5344CB8AC3E}">
-        <p14:creationId xmlns:p14="http://schemas.microsoft.com/office/powerpoint/2010/main" val="1362705819"/>
+        <p14:creationId xmlns:p14="http://schemas.microsoft.com/office/powerpoint/2010/main" val="622162571"/>
       </p:ext>
     </p:extLst>
   </p:cSld>
@@ -42334,7 +39488,7 @@
           <a:p>
             <a:fld id="{974F31EF-6EA6-4A24-8992-69DC7A69151C}" type="datetime4">
               <a:rPr lang="de-DE" smtClean="0"/>
-              <a:t>19. Dezember 2022</a:t>
+              <a:t>20. Dezember 2022</a:t>
             </a:fld>
             <a:endParaRPr lang="de-DE"/>
           </a:p>
@@ -43107,161 +40261,6 @@
 </file>
 
 <file path=ppt/slides/slide20.xml><?xml version="1.0" encoding="utf-8"?>
-<p:sld xmlns:a="http://schemas.openxmlformats.org/drawingml/2006/main" xmlns:r="http://schemas.openxmlformats.org/officeDocument/2006/relationships" xmlns:p="http://schemas.openxmlformats.org/presentationml/2006/main">
-  <p:cSld>
-    <p:spTree>
-      <p:nvGrpSpPr>
-        <p:cNvPr id="1" name=""/>
-        <p:cNvGrpSpPr/>
-        <p:nvPr/>
-      </p:nvGrpSpPr>
-      <p:grpSpPr>
-        <a:xfrm>
-          <a:off x="0" y="0"/>
-          <a:ext cx="0" cy="0"/>
-          <a:chOff x="0" y="0"/>
-          <a:chExt cx="0" cy="0"/>
-        </a:xfrm>
-      </p:grpSpPr>
-      <p:sp>
-        <p:nvSpPr>
-          <p:cNvPr id="21" name="Titel 20">
-            <a:extLst>
-              <a:ext uri="{FF2B5EF4-FFF2-40B4-BE49-F238E27FC236}">
-                <a16:creationId xmlns:a16="http://schemas.microsoft.com/office/drawing/2014/main" id="{3018BD05-96D8-43F2-A6AA-CC40E7C32CCE}"/>
-              </a:ext>
-            </a:extLst>
-          </p:cNvPr>
-          <p:cNvSpPr>
-            <a:spLocks noGrp="1"/>
-          </p:cNvSpPr>
-          <p:nvPr>
-            <p:ph type="title"/>
-          </p:nvPr>
-        </p:nvSpPr>
-        <p:spPr>
-          <a:xfrm>
-            <a:off x="518318" y="3152001"/>
-            <a:ext cx="11157743" cy="553998"/>
-          </a:xfrm>
-        </p:spPr>
-        <p:txBody>
-          <a:bodyPr/>
-          <a:lstStyle/>
-          <a:p>
-            <a:r>
-              <a:rPr lang="de-DE" dirty="0"/>
-              <a:t>6. Nächste Schritte</a:t>
-            </a:r>
-          </a:p>
-        </p:txBody>
-      </p:sp>
-      <p:sp>
-        <p:nvSpPr>
-          <p:cNvPr id="2" name="Datumsplatzhalter 1">
-            <a:extLst>
-              <a:ext uri="{FF2B5EF4-FFF2-40B4-BE49-F238E27FC236}">
-                <a16:creationId xmlns:a16="http://schemas.microsoft.com/office/drawing/2014/main" id="{FE7214E1-5D14-4D0B-BADD-2E239FECEC10}"/>
-              </a:ext>
-            </a:extLst>
-          </p:cNvPr>
-          <p:cNvSpPr>
-            <a:spLocks noGrp="1"/>
-          </p:cNvSpPr>
-          <p:nvPr>
-            <p:ph type="dt" sz="half" idx="10"/>
-          </p:nvPr>
-        </p:nvSpPr>
-        <p:spPr/>
-        <p:txBody>
-          <a:bodyPr/>
-          <a:lstStyle/>
-          <a:p>
-            <a:fld id="{D529D632-EE07-48FA-B475-B0D49CBC7F92}" type="datetime4">
-              <a:rPr lang="de-DE" smtClean="0"/>
-              <a:pPr/>
-              <a:t>19. Dezember 2022</a:t>
-            </a:fld>
-            <a:endParaRPr lang="de-DE" dirty="0"/>
-          </a:p>
-        </p:txBody>
-      </p:sp>
-      <p:sp>
-        <p:nvSpPr>
-          <p:cNvPr id="3" name="Fußzeilenplatzhalter 2">
-            <a:extLst>
-              <a:ext uri="{FF2B5EF4-FFF2-40B4-BE49-F238E27FC236}">
-                <a16:creationId xmlns:a16="http://schemas.microsoft.com/office/drawing/2014/main" id="{6A6AD034-0F65-47AF-9CAA-C4B0CEB30D4D}"/>
-              </a:ext>
-            </a:extLst>
-          </p:cNvPr>
-          <p:cNvSpPr>
-            <a:spLocks noGrp="1"/>
-          </p:cNvSpPr>
-          <p:nvPr>
-            <p:ph type="ftr" sz="quarter" idx="11"/>
-          </p:nvPr>
-        </p:nvSpPr>
-        <p:spPr/>
-        <p:txBody>
-          <a:bodyPr/>
-          <a:lstStyle/>
-          <a:p>
-            <a:r>
-              <a:rPr lang="de-DE" b="1" dirty="0"/>
-              <a:t>Philippe Huber</a:t>
-            </a:r>
-            <a:r>
-              <a:rPr lang="de-DE" dirty="0"/>
-              <a:t>, Rene Jokiel</a:t>
-            </a:r>
-          </a:p>
-        </p:txBody>
-      </p:sp>
-      <p:sp>
-        <p:nvSpPr>
-          <p:cNvPr id="4" name="Foliennummernplatzhalter 3">
-            <a:extLst>
-              <a:ext uri="{FF2B5EF4-FFF2-40B4-BE49-F238E27FC236}">
-                <a16:creationId xmlns:a16="http://schemas.microsoft.com/office/drawing/2014/main" id="{00F7E098-F740-40F7-A085-7034627D9148}"/>
-              </a:ext>
-            </a:extLst>
-          </p:cNvPr>
-          <p:cNvSpPr>
-            <a:spLocks noGrp="1"/>
-          </p:cNvSpPr>
-          <p:nvPr>
-            <p:ph type="sldNum" sz="quarter" idx="12"/>
-          </p:nvPr>
-        </p:nvSpPr>
-        <p:spPr/>
-        <p:txBody>
-          <a:bodyPr/>
-          <a:lstStyle/>
-          <a:p>
-            <a:fld id="{D949F9DF-37BD-4CD6-BF49-65BA579E1D7A}" type="slidenum">
-              <a:rPr lang="de-DE" smtClean="0"/>
-              <a:pPr/>
-              <a:t>20</a:t>
-            </a:fld>
-            <a:endParaRPr lang="de-DE"/>
-          </a:p>
-        </p:txBody>
-      </p:sp>
-    </p:spTree>
-    <p:extLst>
-      <p:ext uri="{BB962C8B-B14F-4D97-AF65-F5344CB8AC3E}">
-        <p14:creationId xmlns:p14="http://schemas.microsoft.com/office/powerpoint/2010/main" val="622162571"/>
-      </p:ext>
-    </p:extLst>
-  </p:cSld>
-  <p:clrMapOvr>
-    <a:masterClrMapping/>
-  </p:clrMapOvr>
-</p:sld>
-</file>
-
-<file path=ppt/slides/slide21.xml><?xml version="1.0" encoding="utf-8"?>
 <p:sld xmlns:a="http://schemas.openxmlformats.org/drawingml/2006/main" xmlns:r="http://schemas.openxmlformats.org/officeDocument/2006/relationships" xmlns:p="http://schemas.openxmlformats.org/presentationml/2006/main">
   <p:cSld>
     <p:spTree>
@@ -43301,7 +40300,7 @@
           <a:p>
             <a:fld id="{5C89B0C6-E378-43D9-87B6-F295F13B6DA2}" type="datetime4">
               <a:rPr lang="de-DE" smtClean="0"/>
-              <a:t>19. Dezember 2022</a:t>
+              <a:t>20. Dezember 2022</a:t>
             </a:fld>
             <a:endParaRPr lang="de-DE" dirty="0"/>
           </a:p>
@@ -43363,7 +40362,7 @@
             <a:fld id="{D949F9DF-37BD-4CD6-BF49-65BA579E1D7A}" type="slidenum">
               <a:rPr lang="de-DE" smtClean="0"/>
               <a:pPr/>
-              <a:t>21</a:t>
+              <a:t>20</a:t>
             </a:fld>
             <a:endParaRPr lang="de-DE"/>
           </a:p>
@@ -43914,7 +40913,7 @@
 </p:sld>
 </file>
 
-<file path=ppt/slides/slide22.xml><?xml version="1.0" encoding="utf-8"?>
+<file path=ppt/slides/slide21.xml><?xml version="1.0" encoding="utf-8"?>
 <p:sld xmlns:a="http://schemas.openxmlformats.org/drawingml/2006/main" xmlns:r="http://schemas.openxmlformats.org/officeDocument/2006/relationships" xmlns:p="http://schemas.openxmlformats.org/presentationml/2006/main">
   <p:cSld>
     <p:spTree>
@@ -43954,7 +40953,7 @@
           <a:p>
             <a:fld id="{5C89B0C6-E378-43D9-87B6-F295F13B6DA2}" type="datetime4">
               <a:rPr lang="de-DE" smtClean="0"/>
-              <a:t>19. Dezember 2022</a:t>
+              <a:t>20. Dezember 2022</a:t>
             </a:fld>
             <a:endParaRPr lang="de-DE" dirty="0"/>
           </a:p>
@@ -44016,7 +41015,7 @@
             <a:fld id="{D949F9DF-37BD-4CD6-BF49-65BA579E1D7A}" type="slidenum">
               <a:rPr lang="de-DE" smtClean="0"/>
               <a:pPr/>
-              <a:t>22</a:t>
+              <a:t>21</a:t>
             </a:fld>
             <a:endParaRPr lang="de-DE"/>
           </a:p>
@@ -45114,7 +42113,7 @@
 </p:sld>
 </file>
 
-<file path=ppt/slides/slide23.xml><?xml version="1.0" encoding="utf-8"?>
+<file path=ppt/slides/slide22.xml><?xml version="1.0" encoding="utf-8"?>
 <p:sld xmlns:a="http://schemas.openxmlformats.org/drawingml/2006/main" xmlns:r="http://schemas.openxmlformats.org/officeDocument/2006/relationships" xmlns:p="http://schemas.openxmlformats.org/presentationml/2006/main">
   <p:cSld>
     <p:spTree>
@@ -45198,7 +42197,7 @@
           <a:p>
             <a:fld id="{974F31EF-6EA6-4A24-8992-69DC7A69151C}" type="datetime4">
               <a:rPr lang="de-DE" smtClean="0"/>
-              <a:t>19. Dezember 2022</a:t>
+              <a:t>20. Dezember 2022</a:t>
             </a:fld>
             <a:endParaRPr lang="de-DE"/>
           </a:p>
@@ -45266,7 +42265,7 @@
             <a:fld id="{D949F9DF-37BD-4CD6-BF49-65BA579E1D7A}" type="slidenum">
               <a:rPr lang="de-DE" smtClean="0"/>
               <a:pPr/>
-              <a:t>23</a:t>
+              <a:t>22</a:t>
             </a:fld>
             <a:endParaRPr lang="de-DE"/>
           </a:p>
@@ -45276,6 +42275,754 @@
     <p:extLst>
       <p:ext uri="{BB962C8B-B14F-4D97-AF65-F5344CB8AC3E}">
         <p14:creationId xmlns:p14="http://schemas.microsoft.com/office/powerpoint/2010/main" val="661126707"/>
+      </p:ext>
+    </p:extLst>
+  </p:cSld>
+  <p:clrMapOvr>
+    <a:masterClrMapping/>
+  </p:clrMapOvr>
+</p:sld>
+</file>
+
+<file path=ppt/slides/slide23.xml><?xml version="1.0" encoding="utf-8"?>
+<p:sld xmlns:a="http://schemas.openxmlformats.org/drawingml/2006/main" xmlns:r="http://schemas.openxmlformats.org/officeDocument/2006/relationships" xmlns:p="http://schemas.openxmlformats.org/presentationml/2006/main">
+  <p:cSld>
+    <p:spTree>
+      <p:nvGrpSpPr>
+        <p:cNvPr id="1" name=""/>
+        <p:cNvGrpSpPr/>
+        <p:nvPr/>
+      </p:nvGrpSpPr>
+      <p:grpSpPr>
+        <a:xfrm>
+          <a:off x="0" y="0"/>
+          <a:ext cx="0" cy="0"/>
+          <a:chOff x="0" y="0"/>
+          <a:chExt cx="0" cy="0"/>
+        </a:xfrm>
+      </p:grpSpPr>
+      <p:sp>
+        <p:nvSpPr>
+          <p:cNvPr id="3" name="Datumsplatzhalter 2">
+            <a:extLst>
+              <a:ext uri="{FF2B5EF4-FFF2-40B4-BE49-F238E27FC236}">
+                <a16:creationId xmlns:a16="http://schemas.microsoft.com/office/drawing/2014/main" id="{2A351964-2BB6-97F3-6B22-336C5567411D}"/>
+              </a:ext>
+            </a:extLst>
+          </p:cNvPr>
+          <p:cNvSpPr>
+            <a:spLocks noGrp="1"/>
+          </p:cNvSpPr>
+          <p:nvPr>
+            <p:ph type="dt" sz="half" idx="10"/>
+          </p:nvPr>
+        </p:nvSpPr>
+        <p:spPr/>
+        <p:txBody>
+          <a:bodyPr/>
+          <a:lstStyle/>
+          <a:p>
+            <a:fld id="{5C89B0C6-E378-43D9-87B6-F295F13B6DA2}" type="datetime4">
+              <a:rPr lang="de-DE" smtClean="0"/>
+              <a:t>20. Dezember 2022</a:t>
+            </a:fld>
+            <a:endParaRPr lang="de-DE" dirty="0"/>
+          </a:p>
+        </p:txBody>
+      </p:sp>
+      <p:sp>
+        <p:nvSpPr>
+          <p:cNvPr id="4" name="Fußzeilenplatzhalter 3">
+            <a:extLst>
+              <a:ext uri="{FF2B5EF4-FFF2-40B4-BE49-F238E27FC236}">
+                <a16:creationId xmlns:a16="http://schemas.microsoft.com/office/drawing/2014/main" id="{1408DCD8-0AA7-E516-1759-8D2382782060}"/>
+              </a:ext>
+            </a:extLst>
+          </p:cNvPr>
+          <p:cNvSpPr>
+            <a:spLocks noGrp="1"/>
+          </p:cNvSpPr>
+          <p:nvPr>
+            <p:ph type="ftr" sz="quarter" idx="11"/>
+          </p:nvPr>
+        </p:nvSpPr>
+        <p:spPr/>
+        <p:txBody>
+          <a:bodyPr/>
+          <a:lstStyle/>
+          <a:p>
+            <a:r>
+              <a:rPr lang="de-DE" dirty="0"/>
+              <a:t>Philippe Huber, Rene Jokiel</a:t>
+            </a:r>
+          </a:p>
+        </p:txBody>
+      </p:sp>
+      <p:sp>
+        <p:nvSpPr>
+          <p:cNvPr id="5" name="Foliennummernplatzhalter 4">
+            <a:extLst>
+              <a:ext uri="{FF2B5EF4-FFF2-40B4-BE49-F238E27FC236}">
+                <a16:creationId xmlns:a16="http://schemas.microsoft.com/office/drawing/2014/main" id="{7CC781B4-8E2A-7EAA-0553-BD86241E8C36}"/>
+              </a:ext>
+            </a:extLst>
+          </p:cNvPr>
+          <p:cNvSpPr>
+            <a:spLocks noGrp="1"/>
+          </p:cNvSpPr>
+          <p:nvPr>
+            <p:ph type="sldNum" sz="quarter" idx="12"/>
+          </p:nvPr>
+        </p:nvSpPr>
+        <p:spPr/>
+        <p:txBody>
+          <a:bodyPr/>
+          <a:lstStyle/>
+          <a:p>
+            <a:fld id="{D949F9DF-37BD-4CD6-BF49-65BA579E1D7A}" type="slidenum">
+              <a:rPr lang="de-DE" smtClean="0"/>
+              <a:pPr/>
+              <a:t>23</a:t>
+            </a:fld>
+            <a:endParaRPr lang="de-DE"/>
+          </a:p>
+        </p:txBody>
+      </p:sp>
+      <p:sp>
+        <p:nvSpPr>
+          <p:cNvPr id="6" name="Titel 5">
+            <a:extLst>
+              <a:ext uri="{FF2B5EF4-FFF2-40B4-BE49-F238E27FC236}">
+                <a16:creationId xmlns:a16="http://schemas.microsoft.com/office/drawing/2014/main" id="{141A52E9-C3AF-262C-EBCF-F1578441CFAF}"/>
+              </a:ext>
+            </a:extLst>
+          </p:cNvPr>
+          <p:cNvSpPr>
+            <a:spLocks noGrp="1"/>
+          </p:cNvSpPr>
+          <p:nvPr>
+            <p:ph type="title"/>
+          </p:nvPr>
+        </p:nvSpPr>
+        <p:spPr/>
+        <p:txBody>
+          <a:bodyPr/>
+          <a:lstStyle/>
+          <a:p>
+            <a:r>
+              <a:rPr lang="de-DE" dirty="0"/>
+              <a:t>Literatur</a:t>
+            </a:r>
+          </a:p>
+        </p:txBody>
+      </p:sp>
+      <p:sp>
+        <p:nvSpPr>
+          <p:cNvPr id="7" name="Textplatzhalter 6">
+            <a:extLst>
+              <a:ext uri="{FF2B5EF4-FFF2-40B4-BE49-F238E27FC236}">
+                <a16:creationId xmlns:a16="http://schemas.microsoft.com/office/drawing/2014/main" id="{729D91F5-AF69-2294-FA98-A806524F9A08}"/>
+              </a:ext>
+            </a:extLst>
+          </p:cNvPr>
+          <p:cNvSpPr>
+            <a:spLocks noGrp="1"/>
+          </p:cNvSpPr>
+          <p:nvPr>
+            <p:ph type="body" sz="quarter" idx="13"/>
+          </p:nvPr>
+        </p:nvSpPr>
+        <p:spPr/>
+        <p:txBody>
+          <a:bodyPr/>
+          <a:lstStyle/>
+          <a:p>
+            <a:r>
+              <a:rPr lang="de-DE" dirty="0"/>
+              <a:t>Literatur</a:t>
+            </a:r>
+          </a:p>
+        </p:txBody>
+      </p:sp>
+      <p:sp>
+        <p:nvSpPr>
+          <p:cNvPr id="2" name="Textfeld 1">
+            <a:extLst>
+              <a:ext uri="{FF2B5EF4-FFF2-40B4-BE49-F238E27FC236}">
+                <a16:creationId xmlns:a16="http://schemas.microsoft.com/office/drawing/2014/main" id="{4D79FA6A-9E0A-E503-7EC4-D7635311DF6A}"/>
+              </a:ext>
+            </a:extLst>
+          </p:cNvPr>
+          <p:cNvSpPr txBox="1"/>
+          <p:nvPr/>
+        </p:nvSpPr>
+        <p:spPr>
+          <a:xfrm>
+            <a:off x="515937" y="1638939"/>
+            <a:ext cx="11505487" cy="5057282"/>
+          </a:xfrm>
+          <a:prstGeom prst="rect">
+            <a:avLst/>
+          </a:prstGeom>
+          <a:noFill/>
+        </p:spPr>
+        <p:txBody>
+          <a:bodyPr wrap="square" lIns="0" tIns="0" rIns="0" bIns="0" rtlCol="0">
+            <a:spAutoFit/>
+          </a:bodyPr>
+          <a:lstStyle/>
+          <a:p>
+            <a:pPr marL="285750" marR="0" indent="-285750" algn="l" defTabSz="914400" rtl="0" eaLnBrk="1" fontAlgn="auto" latinLnBrk="0" hangingPunct="1">
+              <a:lnSpc>
+                <a:spcPct val="110000"/>
+              </a:lnSpc>
+              <a:spcBef>
+                <a:spcPts val="0"/>
+              </a:spcBef>
+              <a:spcAft>
+                <a:spcPts val="1200"/>
+              </a:spcAft>
+              <a:buClrTx/>
+              <a:buSzTx/>
+              <a:buFont typeface="Arial" panose="020B0604020202020204" pitchFamily="34" charset="0"/>
+              <a:buChar char="•"/>
+              <a:tabLst/>
+            </a:pPr>
+            <a:r>
+              <a:rPr kumimoji="0" lang="de-DE" sz="1400" b="0" i="0" u="none" strike="noStrike" kern="1200" cap="none" spc="0" normalizeH="0" baseline="0" noProof="0" dirty="0" err="1">
+                <a:ln>
+                  <a:noFill/>
+                </a:ln>
+                <a:solidFill>
+                  <a:prstClr val="black"/>
+                </a:solidFill>
+                <a:effectLst/>
+                <a:uLnTx/>
+                <a:uFillTx/>
+                <a:latin typeface="Arial"/>
+                <a:ea typeface="+mn-ea"/>
+                <a:cs typeface="+mn-cs"/>
+              </a:rPr>
+              <a:t>Roselli</a:t>
+            </a:r>
+            <a:r>
+              <a:rPr kumimoji="0" lang="de-DE" sz="1400" b="0" i="0" u="none" strike="noStrike" kern="1200" cap="none" spc="0" normalizeH="0" baseline="0" noProof="0" dirty="0">
+                <a:ln>
+                  <a:noFill/>
+                </a:ln>
+                <a:solidFill>
+                  <a:prstClr val="black"/>
+                </a:solidFill>
+                <a:effectLst/>
+                <a:uLnTx/>
+                <a:uFillTx/>
+                <a:latin typeface="Arial"/>
+                <a:ea typeface="+mn-ea"/>
+                <a:cs typeface="+mn-cs"/>
+              </a:rPr>
+              <a:t>, Matthews, </a:t>
+            </a:r>
+            <a:r>
+              <a:rPr kumimoji="0" lang="de-DE" sz="1400" b="0" i="0" u="none" strike="noStrike" kern="1200" cap="none" spc="0" normalizeH="0" baseline="0" noProof="0" dirty="0" err="1">
+                <a:ln>
+                  <a:noFill/>
+                </a:ln>
+                <a:solidFill>
+                  <a:prstClr val="black"/>
+                </a:solidFill>
+                <a:effectLst/>
+                <a:uLnTx/>
+                <a:uFillTx/>
+                <a:latin typeface="Arial"/>
+                <a:ea typeface="+mn-ea"/>
+                <a:cs typeface="+mn-cs"/>
+              </a:rPr>
+              <a:t>Talagala</a:t>
+            </a:r>
+            <a:r>
+              <a:rPr lang="de-DE" sz="1400" dirty="0">
+                <a:solidFill>
+                  <a:prstClr val="black"/>
+                </a:solidFill>
+                <a:latin typeface="Arial"/>
+              </a:rPr>
+              <a:t> (2019). </a:t>
+            </a:r>
+            <a:r>
+              <a:rPr lang="de-DE" sz="1400" dirty="0"/>
+              <a:t>Managing Bias in AI</a:t>
+            </a:r>
+          </a:p>
+          <a:p>
+            <a:pPr marL="285750" marR="0" indent="-285750" algn="l" defTabSz="914400" rtl="0" eaLnBrk="1" fontAlgn="auto" latinLnBrk="0" hangingPunct="1">
+              <a:lnSpc>
+                <a:spcPct val="110000"/>
+              </a:lnSpc>
+              <a:spcBef>
+                <a:spcPts val="0"/>
+              </a:spcBef>
+              <a:spcAft>
+                <a:spcPts val="1200"/>
+              </a:spcAft>
+              <a:buClrTx/>
+              <a:buSzTx/>
+              <a:buFont typeface="Arial" panose="020B0604020202020204" pitchFamily="34" charset="0"/>
+              <a:buChar char="•"/>
+              <a:tabLst/>
+            </a:pPr>
+            <a:r>
+              <a:rPr lang="de-DE" sz="1400" dirty="0"/>
+              <a:t>Mehrabi, Gupta, </a:t>
+            </a:r>
+            <a:r>
+              <a:rPr lang="de-DE" sz="1400" dirty="0" err="1"/>
+              <a:t>Morstatter</a:t>
+            </a:r>
+            <a:r>
+              <a:rPr lang="de-DE" sz="1400" dirty="0"/>
+              <a:t>, Ver Steeg, </a:t>
+            </a:r>
+            <a:r>
+              <a:rPr lang="de-DE" sz="1400" dirty="0" err="1"/>
+              <a:t>Galstyan</a:t>
+            </a:r>
+            <a:r>
+              <a:rPr lang="de-DE" sz="1400" dirty="0"/>
+              <a:t> (2021). </a:t>
+            </a:r>
+            <a:r>
+              <a:rPr lang="en-US" sz="1400" dirty="0"/>
+              <a:t>Attributing Fair Decisions with Attention Interventions</a:t>
+            </a:r>
+          </a:p>
+          <a:p>
+            <a:pPr marL="285750" marR="0" indent="-285750" algn="l" defTabSz="914400" rtl="0" eaLnBrk="1" fontAlgn="auto" latinLnBrk="0" hangingPunct="1">
+              <a:lnSpc>
+                <a:spcPct val="110000"/>
+              </a:lnSpc>
+              <a:spcBef>
+                <a:spcPts val="0"/>
+              </a:spcBef>
+              <a:spcAft>
+                <a:spcPts val="1200"/>
+              </a:spcAft>
+              <a:buClrTx/>
+              <a:buSzTx/>
+              <a:buFont typeface="Arial" panose="020B0604020202020204" pitchFamily="34" charset="0"/>
+              <a:buChar char="•"/>
+              <a:tabLst/>
+            </a:pPr>
+            <a:r>
+              <a:rPr lang="de-DE" sz="1400" dirty="0" err="1"/>
+              <a:t>Friedler</a:t>
+            </a:r>
+            <a:r>
+              <a:rPr lang="en-US" sz="1400" dirty="0"/>
+              <a:t>, </a:t>
+            </a:r>
+            <a:r>
+              <a:rPr lang="de-DE" sz="1400" dirty="0" err="1"/>
+              <a:t>Scheidegger</a:t>
+            </a:r>
+            <a:r>
+              <a:rPr lang="en-US" sz="1400" dirty="0"/>
+              <a:t>, </a:t>
+            </a:r>
+            <a:r>
+              <a:rPr lang="de-DE" sz="1400" dirty="0" err="1"/>
+              <a:t>Venkatasubramanian</a:t>
+            </a:r>
+            <a:r>
+              <a:rPr lang="en-US" sz="1400" dirty="0"/>
+              <a:t>, </a:t>
+            </a:r>
+            <a:r>
+              <a:rPr lang="de-DE" sz="1400" dirty="0" err="1"/>
+              <a:t>Choudhary</a:t>
+            </a:r>
+            <a:r>
+              <a:rPr lang="en-US" sz="1400" dirty="0"/>
+              <a:t>, </a:t>
+            </a:r>
+            <a:r>
+              <a:rPr lang="de-DE" sz="1400" dirty="0"/>
+              <a:t>Hamilton</a:t>
+            </a:r>
+            <a:r>
+              <a:rPr lang="en-US" sz="1400" dirty="0"/>
+              <a:t>, </a:t>
+            </a:r>
+            <a:r>
+              <a:rPr lang="de-DE" sz="1400" dirty="0"/>
+              <a:t>Roth</a:t>
+            </a:r>
+            <a:r>
+              <a:rPr lang="en-US" sz="1400" dirty="0"/>
+              <a:t> (2019). A comparative study of fairness-enhancing interventions in machine learning</a:t>
+            </a:r>
+          </a:p>
+          <a:p>
+            <a:pPr marL="285750" marR="0" indent="-285750" algn="l" defTabSz="914400" rtl="0" eaLnBrk="1" fontAlgn="auto" latinLnBrk="0" hangingPunct="1">
+              <a:lnSpc>
+                <a:spcPct val="110000"/>
+              </a:lnSpc>
+              <a:spcBef>
+                <a:spcPts val="0"/>
+              </a:spcBef>
+              <a:spcAft>
+                <a:spcPts val="1200"/>
+              </a:spcAft>
+              <a:buClrTx/>
+              <a:buSzTx/>
+              <a:buFont typeface="Arial" panose="020B0604020202020204" pitchFamily="34" charset="0"/>
+              <a:buChar char="•"/>
+              <a:tabLst/>
+            </a:pPr>
+            <a:r>
+              <a:rPr lang="de-DE" sz="1400" dirty="0"/>
+              <a:t>Robert, Pierce, Marquis, Kim, </a:t>
+            </a:r>
+            <a:r>
+              <a:rPr lang="de-DE" sz="1400" dirty="0" err="1"/>
+              <a:t>Alahmad</a:t>
+            </a:r>
+            <a:r>
+              <a:rPr lang="de-DE" sz="1400" dirty="0"/>
+              <a:t> (2020). </a:t>
+            </a:r>
+            <a:r>
+              <a:rPr lang="en-US" sz="1400" dirty="0"/>
+              <a:t>Designing fair AI for managing employees in organizations: a review, critique, and design agenda </a:t>
+            </a:r>
+          </a:p>
+          <a:p>
+            <a:pPr marL="285750" marR="0" indent="-285750" algn="l" defTabSz="914400" rtl="0" eaLnBrk="1" fontAlgn="auto" latinLnBrk="0" hangingPunct="1">
+              <a:lnSpc>
+                <a:spcPct val="110000"/>
+              </a:lnSpc>
+              <a:spcBef>
+                <a:spcPts val="0"/>
+              </a:spcBef>
+              <a:spcAft>
+                <a:spcPts val="1200"/>
+              </a:spcAft>
+              <a:buClrTx/>
+              <a:buSzTx/>
+              <a:buFont typeface="Arial" panose="020B0604020202020204" pitchFamily="34" charset="0"/>
+              <a:buChar char="•"/>
+              <a:tabLst/>
+            </a:pPr>
+            <a:r>
+              <a:rPr lang="de-DE" sz="1400" dirty="0" err="1"/>
+              <a:t>Agarwal</a:t>
+            </a:r>
+            <a:r>
+              <a:rPr lang="en-US" sz="1400" dirty="0"/>
+              <a:t>, </a:t>
+            </a:r>
+            <a:r>
+              <a:rPr lang="de-DE" sz="1400" dirty="0" err="1"/>
+              <a:t>Muku</a:t>
+            </a:r>
+            <a:r>
+              <a:rPr lang="en-US" sz="1400" dirty="0"/>
+              <a:t>, </a:t>
+            </a:r>
+            <a:r>
+              <a:rPr lang="de-DE" sz="1400" dirty="0"/>
+              <a:t>Anand, Arora (2022). </a:t>
+            </a:r>
+            <a:r>
+              <a:rPr lang="en-US" sz="1400" dirty="0"/>
+              <a:t>Does Data Repair Lead to Fair Models? Curating Contextually Fair Data To Reduce Model Bias</a:t>
+            </a:r>
+          </a:p>
+          <a:p>
+            <a:pPr marL="285750" marR="0" indent="-285750" algn="l" defTabSz="914400" rtl="0" eaLnBrk="1" fontAlgn="auto" latinLnBrk="0" hangingPunct="1">
+              <a:lnSpc>
+                <a:spcPct val="110000"/>
+              </a:lnSpc>
+              <a:spcBef>
+                <a:spcPts val="0"/>
+              </a:spcBef>
+              <a:spcAft>
+                <a:spcPts val="1200"/>
+              </a:spcAft>
+              <a:buClrTx/>
+              <a:buSzTx/>
+              <a:buFont typeface="Arial" panose="020B0604020202020204" pitchFamily="34" charset="0"/>
+              <a:buChar char="•"/>
+              <a:tabLst/>
+            </a:pPr>
+            <a:r>
+              <a:rPr lang="de-DE" sz="1400" dirty="0" err="1"/>
+              <a:t>Dwork</a:t>
+            </a:r>
+            <a:r>
+              <a:rPr lang="en-US" sz="1400" dirty="0"/>
+              <a:t>, </a:t>
+            </a:r>
+            <a:r>
+              <a:rPr lang="de-DE" sz="1400" dirty="0"/>
+              <a:t>Hardt</a:t>
+            </a:r>
+            <a:r>
+              <a:rPr lang="en-US" sz="1400" dirty="0"/>
+              <a:t>, </a:t>
+            </a:r>
+            <a:r>
+              <a:rPr lang="de-DE" sz="1400" dirty="0" err="1"/>
+              <a:t>Pitassi</a:t>
+            </a:r>
+            <a:r>
+              <a:rPr lang="en-US" sz="1400" dirty="0"/>
+              <a:t>, </a:t>
+            </a:r>
+            <a:r>
+              <a:rPr lang="de-DE" sz="1400" dirty="0" err="1"/>
+              <a:t>Reingold</a:t>
+            </a:r>
+            <a:r>
+              <a:rPr lang="en-US" sz="1400" dirty="0"/>
+              <a:t>, </a:t>
+            </a:r>
+            <a:r>
+              <a:rPr lang="de-DE" sz="1400" dirty="0" err="1"/>
+              <a:t>Zemel</a:t>
+            </a:r>
+            <a:r>
+              <a:rPr lang="en-US" sz="1400" dirty="0"/>
+              <a:t> (2012). </a:t>
+            </a:r>
+            <a:r>
+              <a:rPr lang="de-DE" sz="1400" dirty="0"/>
+              <a:t>Fairness Through Awareness </a:t>
+            </a:r>
+          </a:p>
+          <a:p>
+            <a:pPr marL="285750" marR="0" indent="-285750" algn="l" defTabSz="914400" rtl="0" eaLnBrk="1" fontAlgn="auto" latinLnBrk="0" hangingPunct="1">
+              <a:lnSpc>
+                <a:spcPct val="110000"/>
+              </a:lnSpc>
+              <a:spcBef>
+                <a:spcPts val="0"/>
+              </a:spcBef>
+              <a:spcAft>
+                <a:spcPts val="1200"/>
+              </a:spcAft>
+              <a:buClrTx/>
+              <a:buSzTx/>
+              <a:buFont typeface="Arial" panose="020B0604020202020204" pitchFamily="34" charset="0"/>
+              <a:buChar char="•"/>
+              <a:tabLst/>
+            </a:pPr>
+            <a:r>
+              <a:rPr lang="de-DE" sz="1400" dirty="0" err="1"/>
+              <a:t>Mazilu</a:t>
+            </a:r>
+            <a:r>
+              <a:rPr lang="de-DE" sz="1400" dirty="0"/>
+              <a:t>, Paton, </a:t>
+            </a:r>
+            <a:r>
+              <a:rPr lang="de-DE" sz="1400" dirty="0" err="1"/>
+              <a:t>Konstantinou</a:t>
+            </a:r>
+            <a:r>
+              <a:rPr lang="de-DE" sz="1400" dirty="0"/>
+              <a:t>, Fernandes (2020). Fairness in Data </a:t>
+            </a:r>
+            <a:r>
+              <a:rPr lang="de-DE" sz="1400" dirty="0" err="1"/>
+              <a:t>Wrangling</a:t>
+            </a:r>
+            <a:endParaRPr lang="de-DE" sz="1400" dirty="0"/>
+          </a:p>
+          <a:p>
+            <a:pPr marL="285750" marR="0" indent="-285750" algn="l" defTabSz="914400" rtl="0" eaLnBrk="1" fontAlgn="auto" latinLnBrk="0" hangingPunct="1">
+              <a:lnSpc>
+                <a:spcPct val="110000"/>
+              </a:lnSpc>
+              <a:spcBef>
+                <a:spcPts val="0"/>
+              </a:spcBef>
+              <a:spcAft>
+                <a:spcPts val="1200"/>
+              </a:spcAft>
+              <a:buClrTx/>
+              <a:buSzTx/>
+              <a:buFont typeface="Arial" panose="020B0604020202020204" pitchFamily="34" charset="0"/>
+              <a:buChar char="•"/>
+              <a:tabLst/>
+            </a:pPr>
+            <a:r>
+              <a:rPr lang="de-DE" sz="1400" dirty="0" err="1"/>
+              <a:t>Brotcke</a:t>
+            </a:r>
+            <a:r>
+              <a:rPr lang="de-DE" sz="1400" dirty="0"/>
+              <a:t> (2022). </a:t>
+            </a:r>
+            <a:r>
+              <a:rPr lang="en-US" sz="1400" dirty="0"/>
+              <a:t>Time to Assess Bias in Machine Learning Models for Credit Decisions</a:t>
+            </a:r>
+          </a:p>
+          <a:p>
+            <a:pPr marL="285750" marR="0" indent="-285750" algn="l" defTabSz="914400" rtl="0" eaLnBrk="1" fontAlgn="auto" latinLnBrk="0" hangingPunct="1">
+              <a:lnSpc>
+                <a:spcPct val="110000"/>
+              </a:lnSpc>
+              <a:spcBef>
+                <a:spcPts val="0"/>
+              </a:spcBef>
+              <a:spcAft>
+                <a:spcPts val="1200"/>
+              </a:spcAft>
+              <a:buClrTx/>
+              <a:buSzTx/>
+              <a:buFont typeface="Arial" panose="020B0604020202020204" pitchFamily="34" charset="0"/>
+              <a:buChar char="•"/>
+              <a:tabLst/>
+            </a:pPr>
+            <a:r>
+              <a:rPr lang="de-DE" sz="1400" dirty="0"/>
+              <a:t>Beattie</a:t>
+            </a:r>
+            <a:r>
+              <a:rPr lang="en-US" sz="1400" dirty="0"/>
+              <a:t>, </a:t>
+            </a:r>
+            <a:r>
+              <a:rPr lang="de-DE" sz="1400" dirty="0"/>
+              <a:t>Watkins</a:t>
+            </a:r>
+            <a:r>
+              <a:rPr lang="en-US" sz="1400" dirty="0"/>
+              <a:t>, </a:t>
+            </a:r>
+            <a:r>
+              <a:rPr lang="de-DE" sz="1400" dirty="0"/>
+              <a:t>Robinson</a:t>
+            </a:r>
+            <a:r>
+              <a:rPr lang="en-US" sz="1400" dirty="0"/>
+              <a:t>, </a:t>
+            </a:r>
+            <a:r>
+              <a:rPr lang="de-DE" sz="1400" dirty="0"/>
+              <a:t>Rubin</a:t>
+            </a:r>
+            <a:r>
+              <a:rPr lang="en-US" sz="1400" dirty="0"/>
+              <a:t>, </a:t>
+            </a:r>
+            <a:r>
+              <a:rPr lang="de-DE" sz="1400" dirty="0"/>
+              <a:t>Watkins</a:t>
+            </a:r>
+            <a:r>
+              <a:rPr lang="en-US" sz="1400" dirty="0"/>
+              <a:t> (2022). Measuring and Mitigating Bias in AI-Chatbots </a:t>
+            </a:r>
+          </a:p>
+          <a:p>
+            <a:pPr marL="285750" marR="0" indent="-285750" algn="l" defTabSz="914400" rtl="0" eaLnBrk="1" fontAlgn="auto" latinLnBrk="0" hangingPunct="1">
+              <a:lnSpc>
+                <a:spcPct val="110000"/>
+              </a:lnSpc>
+              <a:spcBef>
+                <a:spcPts val="0"/>
+              </a:spcBef>
+              <a:spcAft>
+                <a:spcPts val="1200"/>
+              </a:spcAft>
+              <a:buClrTx/>
+              <a:buSzTx/>
+              <a:buFont typeface="Arial" panose="020B0604020202020204" pitchFamily="34" charset="0"/>
+              <a:buChar char="•"/>
+              <a:tabLst/>
+            </a:pPr>
+            <a:r>
+              <a:rPr lang="de-DE" sz="1400" dirty="0" err="1"/>
+              <a:t>Kamiran</a:t>
+            </a:r>
+            <a:r>
+              <a:rPr lang="en-US" sz="1400" dirty="0"/>
+              <a:t>, </a:t>
+            </a:r>
+            <a:r>
+              <a:rPr lang="de-DE" sz="1400" dirty="0"/>
+              <a:t>Calders</a:t>
+            </a:r>
+            <a:r>
+              <a:rPr lang="en-US" sz="1400" dirty="0"/>
+              <a:t> (2012). Data preprocessing techniques for classification without discrimination</a:t>
+            </a:r>
+            <a:endParaRPr lang="de-DE" sz="1400" dirty="0"/>
+          </a:p>
+          <a:p>
+            <a:pPr marL="0" marR="0" indent="0" algn="l" defTabSz="914400" rtl="0" eaLnBrk="1" fontAlgn="auto" latinLnBrk="0" hangingPunct="1">
+              <a:lnSpc>
+                <a:spcPct val="110000"/>
+              </a:lnSpc>
+              <a:spcBef>
+                <a:spcPts val="0"/>
+              </a:spcBef>
+              <a:spcAft>
+                <a:spcPts val="1200"/>
+              </a:spcAft>
+              <a:buClrTx/>
+              <a:buSzTx/>
+              <a:buFont typeface="Arial" panose="020B0604020202020204" pitchFamily="34" charset="0"/>
+              <a:buNone/>
+              <a:tabLst/>
+            </a:pPr>
+            <a:endParaRPr lang="de-DE" sz="1600" dirty="0">
+              <a:solidFill>
+                <a:prstClr val="black"/>
+              </a:solidFill>
+              <a:latin typeface="Arial"/>
+            </a:endParaRPr>
+          </a:p>
+          <a:p>
+            <a:pPr marL="0" marR="0" indent="0" algn="l" defTabSz="914400" rtl="0" eaLnBrk="1" fontAlgn="auto" latinLnBrk="0" hangingPunct="1">
+              <a:lnSpc>
+                <a:spcPct val="110000"/>
+              </a:lnSpc>
+              <a:spcBef>
+                <a:spcPts val="0"/>
+              </a:spcBef>
+              <a:spcAft>
+                <a:spcPts val="1200"/>
+              </a:spcAft>
+              <a:buClrTx/>
+              <a:buSzTx/>
+              <a:buFont typeface="Arial" panose="020B0604020202020204" pitchFamily="34" charset="0"/>
+              <a:buNone/>
+              <a:tabLst/>
+            </a:pPr>
+            <a:endParaRPr kumimoji="0" lang="de-DE" sz="1600" b="0" i="0" u="none" strike="noStrike" kern="1200" cap="none" spc="0" normalizeH="0" baseline="0" noProof="0" dirty="0">
+              <a:ln>
+                <a:noFill/>
+              </a:ln>
+              <a:solidFill>
+                <a:prstClr val="black"/>
+              </a:solidFill>
+              <a:effectLst/>
+              <a:uLnTx/>
+              <a:uFillTx/>
+              <a:latin typeface="Arial"/>
+              <a:ea typeface="+mn-ea"/>
+              <a:cs typeface="+mn-cs"/>
+            </a:endParaRPr>
+          </a:p>
+        </p:txBody>
+      </p:sp>
+    </p:spTree>
+    <p:extLst>
+      <p:ext uri="{BB962C8B-B14F-4D97-AF65-F5344CB8AC3E}">
+        <p14:creationId xmlns:p14="http://schemas.microsoft.com/office/powerpoint/2010/main" val="1138522101"/>
       </p:ext>
     </p:extLst>
   </p:cSld>
@@ -45359,7 +43106,7 @@
             <a:fld id="{D529D632-EE07-48FA-B475-B0D49CBC7F92}" type="datetime4">
               <a:rPr lang="de-DE" smtClean="0"/>
               <a:pPr/>
-              <a:t>19. Dezember 2022</a:t>
+              <a:t>20. Dezember 2022</a:t>
             </a:fld>
             <a:endParaRPr lang="de-DE" dirty="0"/>
           </a:p>
@@ -45480,7 +43227,7 @@
           <a:p>
             <a:fld id="{5C89B0C6-E378-43D9-87B6-F295F13B6DA2}" type="datetime4">
               <a:rPr lang="de-DE" smtClean="0"/>
-              <a:t>19. Dezember 2022</a:t>
+              <a:t>20. Dezember 2022</a:t>
             </a:fld>
             <a:endParaRPr lang="de-DE" dirty="0"/>
           </a:p>
@@ -45744,7 +43491,7 @@
             <a:fld id="{D529D632-EE07-48FA-B475-B0D49CBC7F92}" type="datetime4">
               <a:rPr lang="de-DE" smtClean="0"/>
               <a:pPr/>
-              <a:t>19. Dezember 2022</a:t>
+              <a:t>20. Dezember 2022</a:t>
             </a:fld>
             <a:endParaRPr lang="de-DE" dirty="0"/>
           </a:p>
@@ -45865,7 +43612,7 @@
           <a:p>
             <a:fld id="{37276614-C801-48D1-BE5E-3E261D899ED8}" type="datetime4">
               <a:rPr lang="de-DE" smtClean="0"/>
-              <a:t>19. Dezember 2022</a:t>
+              <a:t>20. Dezember 2022</a:t>
             </a:fld>
             <a:endParaRPr lang="de-DE" dirty="0"/>
           </a:p>
@@ -47187,7 +44934,7 @@
           <a:p>
             <a:fld id="{37276614-C801-48D1-BE5E-3E261D899ED8}" type="datetime4">
               <a:rPr lang="de-DE" smtClean="0"/>
-              <a:t>19. Dezember 2022</a:t>
+              <a:t>20. Dezember 2022</a:t>
             </a:fld>
             <a:endParaRPr lang="de-DE" dirty="0"/>
           </a:p>
@@ -48693,7 +46440,7 @@
           <a:p>
             <a:fld id="{37276614-C801-48D1-BE5E-3E261D899ED8}" type="datetime4">
               <a:rPr lang="de-DE" smtClean="0"/>
-              <a:t>19. Dezember 2022</a:t>
+              <a:t>20. Dezember 2022</a:t>
             </a:fld>
             <a:endParaRPr lang="de-DE" dirty="0"/>
           </a:p>
@@ -49483,7 +47230,7 @@
             <a:fld id="{D529D632-EE07-48FA-B475-B0D49CBC7F92}" type="datetime4">
               <a:rPr lang="de-DE" smtClean="0"/>
               <a:pPr/>
-              <a:t>19. Dezember 2022</a:t>
+              <a:t>20. Dezember 2022</a:t>
             </a:fld>
             <a:endParaRPr lang="de-DE" dirty="0"/>
           </a:p>

</xml_diff>